<commit_message>
Added ILSVRC competition slide.
</commit_message>
<xml_diff>
--- a/presentations/02.1_ai_intro.pptx
+++ b/presentations/02.1_ai_intro.pptx
@@ -5,7 +5,7 @@
     <p:sldMasterId id="2147483648" r:id="rId1"/>
   </p:sldMasterIdLst>
   <p:notesMasterIdLst>
-    <p:notesMasterId r:id="rId22"/>
+    <p:notesMasterId r:id="rId23"/>
   </p:notesMasterIdLst>
   <p:sldIdLst>
     <p:sldId id="322" r:id="rId2"/>
@@ -13,21 +13,22 @@
     <p:sldId id="332" r:id="rId4"/>
     <p:sldId id="324" r:id="rId5"/>
     <p:sldId id="337" r:id="rId6"/>
-    <p:sldId id="336" r:id="rId7"/>
-    <p:sldId id="334" r:id="rId8"/>
-    <p:sldId id="335" r:id="rId9"/>
-    <p:sldId id="281" r:id="rId10"/>
-    <p:sldId id="353" r:id="rId11"/>
-    <p:sldId id="323" r:id="rId12"/>
-    <p:sldId id="310" r:id="rId13"/>
-    <p:sldId id="307" r:id="rId14"/>
-    <p:sldId id="308" r:id="rId15"/>
-    <p:sldId id="309" r:id="rId16"/>
-    <p:sldId id="315" r:id="rId17"/>
-    <p:sldId id="303" r:id="rId18"/>
-    <p:sldId id="312" r:id="rId19"/>
-    <p:sldId id="305" r:id="rId20"/>
-    <p:sldId id="304" r:id="rId21"/>
+    <p:sldId id="354" r:id="rId7"/>
+    <p:sldId id="336" r:id="rId8"/>
+    <p:sldId id="334" r:id="rId9"/>
+    <p:sldId id="335" r:id="rId10"/>
+    <p:sldId id="281" r:id="rId11"/>
+    <p:sldId id="353" r:id="rId12"/>
+    <p:sldId id="323" r:id="rId13"/>
+    <p:sldId id="310" r:id="rId14"/>
+    <p:sldId id="307" r:id="rId15"/>
+    <p:sldId id="308" r:id="rId16"/>
+    <p:sldId id="309" r:id="rId17"/>
+    <p:sldId id="315" r:id="rId18"/>
+    <p:sldId id="303" r:id="rId19"/>
+    <p:sldId id="312" r:id="rId20"/>
+    <p:sldId id="305" r:id="rId21"/>
+    <p:sldId id="304" r:id="rId22"/>
   </p:sldIdLst>
   <p:sldSz cx="12192000" cy="6858000"/>
   <p:notesSz cx="7023100" cy="9309100"/>
@@ -227,7 +228,7 @@
           <a:p>
             <a:fld id="{FD93C9B2-20F6-4DB1-B471-224337D0AC79}" type="datetimeFigureOut">
               <a:rPr lang="en-US" smtClean="0"/>
-              <a:t>9/13/2022</a:t>
+              <a:t>9/23/2022</a:t>
             </a:fld>
             <a:endParaRPr lang="en-US"/>
           </a:p>
@@ -640,27 +641,98 @@
           <a:bodyPr/>
           <a:lstStyle/>
           <a:p>
-            <a:pPr marL="0" marR="0" lvl="0" indent="0" algn="l" defTabSz="914400" rtl="0" eaLnBrk="1" fontAlgn="auto" latinLnBrk="0" hangingPunct="1">
-              <a:lnSpc>
-                <a:spcPct val="100000"/>
-              </a:lnSpc>
-              <a:spcBef>
-                <a:spcPts val="0"/>
-              </a:spcBef>
-              <a:spcAft>
-                <a:spcPts val="0"/>
-              </a:spcAft>
-              <a:buClrTx/>
-              <a:buSzTx/>
-              <a:buFontTx/>
+            <a:pPr marL="233309" indent="-233309">
+              <a:buAutoNum type="arabicPeriod"/>
+            </a:pPr>
+            <a:r>
+              <a:rPr lang="en-US" dirty="0"/>
+              <a:t>Again, deep learning is a subfield of machine learning with a focus on </a:t>
+            </a:r>
+            <a:r>
+              <a:rPr lang="en-US" b="1" dirty="0"/>
+              <a:t>neural networks</a:t>
+            </a:r>
+          </a:p>
+          <a:p>
+            <a:pPr marL="233309" indent="-233309">
+              <a:buAutoNum type="arabicPeriod"/>
+            </a:pPr>
+            <a:r>
+              <a:rPr lang="en-US" dirty="0"/>
+              <a:t>A neural network is a special type of learning algorithm, inspired by the billions of interconnected neurons in the human brain.</a:t>
+            </a:r>
+          </a:p>
+          <a:p>
+            <a:pPr marL="233309" indent="-233309">
+              <a:buAutoNum type="arabicPeriod"/>
+            </a:pPr>
+            <a:r>
+              <a:rPr lang="en-US" dirty="0"/>
+              <a:t>In a NN, neurons are grouped together in layers – image of a multi-layered cake – if you have many layers, the cake is “deep” when viewed from above.</a:t>
+            </a:r>
+          </a:p>
+          <a:p>
+            <a:pPr marL="233309" indent="-233309">
+              <a:buAutoNum type="arabicPeriod"/>
+            </a:pPr>
+            <a:endParaRPr lang="en-US" dirty="0"/>
+          </a:p>
+          <a:p>
+            <a:pPr marL="0" indent="0">
               <a:buNone/>
-              <a:tabLst/>
-              <a:defRPr/>
             </a:pPr>
             <a:r>
               <a:rPr lang="en-US" dirty="0"/>
-              <a:t>https://app.wooclap.com/PRACTICUMAI?from=event-page</a:t>
-            </a:r>
+              <a:t>=====</a:t>
+            </a:r>
+          </a:p>
+          <a:p>
+            <a:pPr marL="0" indent="0">
+              <a:buNone/>
+            </a:pPr>
+            <a:r>
+              <a:rPr lang="en-US" dirty="0"/>
+              <a:t>Since 2010, deep learning became possible because:</a:t>
+            </a:r>
+          </a:p>
+          <a:p>
+            <a:pPr marL="699927" lvl="1" indent="-233309">
+              <a:buAutoNum type="arabicPeriod"/>
+            </a:pPr>
+            <a:r>
+              <a:rPr lang="en-US" dirty="0"/>
+              <a:t>Enhanced hardware – GPUs from Nvidia and other suppliers</a:t>
+            </a:r>
+          </a:p>
+          <a:p>
+            <a:pPr marL="699927" lvl="1" indent="-233309">
+              <a:buAutoNum type="arabicPeriod"/>
+            </a:pPr>
+            <a:r>
+              <a:rPr lang="en-US" dirty="0"/>
+              <a:t>Open AI software frameworks – Tensorflow, Pytorch, Keras, etc…</a:t>
+            </a:r>
+          </a:p>
+          <a:p>
+            <a:pPr marL="699927" lvl="1" indent="-233309">
+              <a:buAutoNum type="arabicPeriod"/>
+            </a:pPr>
+            <a:r>
+              <a:rPr lang="en-US" dirty="0"/>
+              <a:t>Big Data</a:t>
+            </a:r>
+          </a:p>
+          <a:p>
+            <a:pPr marL="233309" indent="-233309">
+              <a:buAutoNum type="arabicPeriod"/>
+            </a:pPr>
+            <a:endParaRPr lang="en-US" dirty="0"/>
+          </a:p>
+          <a:p>
+            <a:endParaRPr lang="en-US" dirty="0"/>
+          </a:p>
+          <a:p>
+            <a:endParaRPr lang="en-US" dirty="0"/>
           </a:p>
           <a:p>
             <a:endParaRPr lang="en-US" dirty="0"/>
@@ -693,7 +765,7 @@
     </p:spTree>
     <p:extLst>
       <p:ext uri="{BB962C8B-B14F-4D97-AF65-F5344CB8AC3E}">
-        <p14:creationId xmlns:p14="http://schemas.microsoft.com/office/powerpoint/2010/main" val="2393870311"/>
+        <p14:creationId xmlns:p14="http://schemas.microsoft.com/office/powerpoint/2010/main" val="658380389"/>
       </p:ext>
     </p:extLst>
   </p:cSld>
@@ -747,25 +819,30 @@
           <a:bodyPr/>
           <a:lstStyle/>
           <a:p>
-            <a:pPr defTabSz="933237">
+            <a:pPr marL="0" marR="0" lvl="0" indent="0" algn="l" defTabSz="914400" rtl="0" eaLnBrk="1" fontAlgn="auto" latinLnBrk="0" hangingPunct="1">
+              <a:lnSpc>
+                <a:spcPct val="100000"/>
+              </a:lnSpc>
+              <a:spcBef>
+                <a:spcPts val="0"/>
+              </a:spcBef>
+              <a:spcAft>
+                <a:spcPts val="0"/>
+              </a:spcAft>
+              <a:buClrTx/>
+              <a:buSzTx/>
+              <a:buFontTx/>
+              <a:buNone/>
+              <a:tabLst/>
               <a:defRPr/>
             </a:pPr>
             <a:r>
-              <a:rPr lang="en-US" dirty="0">
-                <a:latin typeface="Palatino Linotype" panose="02040502050505030304" pitchFamily="18" charset="0"/>
-              </a:rPr>
-              <a:t>Hello and welcome to our class (Frontiers of AI).  So, let’s start with Course goals…</a:t>
-            </a:r>
-          </a:p>
-          <a:p>
-            <a:endParaRPr lang="en-US" dirty="0">
-              <a:latin typeface="Palatino Linotype" panose="02040502050505030304" pitchFamily="18" charset="0"/>
-            </a:endParaRPr>
-          </a:p>
-          <a:p>
-            <a:endParaRPr lang="en-US" dirty="0">
-              <a:latin typeface="Palatino Linotype" panose="02040502050505030304" pitchFamily="18" charset="0"/>
-            </a:endParaRPr>
+              <a:rPr lang="en-US" dirty="0"/>
+              <a:t>https://app.wooclap.com/PRACTICUMAI?from=event-page</a:t>
+            </a:r>
+          </a:p>
+          <a:p>
+            <a:endParaRPr lang="en-US" dirty="0"/>
           </a:p>
         </p:txBody>
       </p:sp>
@@ -795,7 +872,7 @@
     </p:spTree>
     <p:extLst>
       <p:ext uri="{BB962C8B-B14F-4D97-AF65-F5344CB8AC3E}">
-        <p14:creationId xmlns:p14="http://schemas.microsoft.com/office/powerpoint/2010/main" val="246808038"/>
+        <p14:creationId xmlns:p14="http://schemas.microsoft.com/office/powerpoint/2010/main" val="2393870311"/>
       </p:ext>
     </p:extLst>
   </p:cSld>
@@ -854,141 +931,20 @@
             </a:pPr>
             <a:r>
               <a:rPr lang="en-US" dirty="0">
-                <a:latin typeface="Arial" pitchFamily="34"/>
-                <a:ea typeface="Arial" pitchFamily="34"/>
-                <a:cs typeface="Arial" pitchFamily="34"/>
+                <a:latin typeface="Palatino Linotype" panose="02040502050505030304" pitchFamily="18" charset="0"/>
               </a:rPr>
-              <a:t>Let’s continue our journey of exploring the question, “What is artificial intelligence?  </a:t>
-            </a:r>
-          </a:p>
-          <a:p>
-            <a:pPr defTabSz="933237">
-              <a:defRPr/>
-            </a:pPr>
+              <a:t>Hello and welcome to our class (Frontiers of AI).  So, let’s start with Course goals…</a:t>
+            </a:r>
+          </a:p>
+          <a:p>
             <a:endParaRPr lang="en-US" dirty="0">
-              <a:latin typeface="Arial" pitchFamily="34"/>
-              <a:ea typeface="Arial" pitchFamily="34"/>
-              <a:cs typeface="Arial" pitchFamily="34"/>
+              <a:latin typeface="Palatino Linotype" panose="02040502050505030304" pitchFamily="18" charset="0"/>
             </a:endParaRPr>
           </a:p>
           <a:p>
-            <a:pPr defTabSz="933237">
-              <a:defRPr/>
-            </a:pPr>
-            <a:r>
-              <a:rPr lang="en-US" dirty="0">
-                <a:latin typeface="Arial" pitchFamily="34"/>
-                <a:ea typeface="Arial" pitchFamily="34"/>
-                <a:cs typeface="Arial" pitchFamily="34"/>
-              </a:rPr>
-              <a:t>Meet Ai-Da, a creative robot named after Ada, the Countess of Lovelace who worked with Charles Babbage to create one of the world’s first computers (the Difference Engine) in the 19</a:t>
-            </a:r>
-            <a:r>
-              <a:rPr lang="en-US" baseline="30000" dirty="0">
-                <a:latin typeface="Arial" pitchFamily="34"/>
-                <a:ea typeface="Arial" pitchFamily="34"/>
-                <a:cs typeface="Arial" pitchFamily="34"/>
-              </a:rPr>
-              <a:t>th</a:t>
-            </a:r>
-            <a:r>
-              <a:rPr lang="en-US" dirty="0">
-                <a:latin typeface="Arial" pitchFamily="34"/>
-                <a:ea typeface="Arial" pitchFamily="34"/>
-                <a:cs typeface="Arial" pitchFamily="34"/>
-              </a:rPr>
-              <a:t> century.  Except for the arms, Ai-Da looks like a person.  Here she stands in front of one of her latest creations.  A couple questions. </a:t>
-            </a:r>
-          </a:p>
-          <a:p>
-            <a:pPr defTabSz="933237">
-              <a:defRPr/>
-            </a:pPr>
             <a:endParaRPr lang="en-US" dirty="0">
-              <a:latin typeface="Arial" pitchFamily="34"/>
-              <a:ea typeface="Arial" pitchFamily="34"/>
-              <a:cs typeface="Arial" pitchFamily="34"/>
+              <a:latin typeface="Palatino Linotype" panose="02040502050505030304" pitchFamily="18" charset="0"/>
             </a:endParaRPr>
-          </a:p>
-          <a:p>
-            <a:pPr marL="171450" indent="-171450" defTabSz="933237">
-              <a:buFont typeface="Courier New" panose="02070309020205020404" pitchFamily="49" charset="0"/>
-              <a:buChar char="o"/>
-              <a:defRPr/>
-            </a:pPr>
-            <a:r>
-              <a:rPr lang="en-US" dirty="0">
-                <a:latin typeface="Arial" pitchFamily="34"/>
-                <a:ea typeface="Arial" pitchFamily="34"/>
-                <a:cs typeface="Arial" pitchFamily="34"/>
-              </a:rPr>
-              <a:t>Is Ai-Da exhibiting intelligent / creative behavior?  </a:t>
-            </a:r>
-          </a:p>
-          <a:p>
-            <a:pPr marL="171450" indent="-171450" defTabSz="933237">
-              <a:buFont typeface="Courier New" panose="02070309020205020404" pitchFamily="49" charset="0"/>
-              <a:buChar char="o"/>
-              <a:defRPr/>
-            </a:pPr>
-            <a:r>
-              <a:rPr lang="en-US" dirty="0">
-                <a:latin typeface="Arial" pitchFamily="34"/>
-                <a:ea typeface="Arial" pitchFamily="34"/>
-                <a:cs typeface="Arial" pitchFamily="34"/>
-              </a:rPr>
-              <a:t>What criteria would you use to assess whether an entity is intelligent?</a:t>
-            </a:r>
-          </a:p>
-          <a:p>
-            <a:pPr marL="171450" indent="-171450" defTabSz="933237">
-              <a:buFont typeface="Courier New" panose="02070309020205020404" pitchFamily="49" charset="0"/>
-              <a:buChar char="o"/>
-              <a:defRPr/>
-            </a:pPr>
-            <a:r>
-              <a:rPr lang="en-US" dirty="0">
-                <a:latin typeface="Arial" pitchFamily="34"/>
-                <a:ea typeface="Arial" pitchFamily="34"/>
-                <a:cs typeface="Arial" pitchFamily="34"/>
-              </a:rPr>
-              <a:t>Is intelligence an emergent property of consciousness?   </a:t>
-            </a:r>
-          </a:p>
-          <a:p>
-            <a:pPr defTabSz="933237">
-              <a:defRPr/>
-            </a:pPr>
-            <a:endParaRPr lang="en-US" dirty="0">
-              <a:latin typeface="Arial" pitchFamily="34"/>
-              <a:ea typeface="Arial" pitchFamily="34"/>
-              <a:cs typeface="Arial" pitchFamily="34"/>
-            </a:endParaRPr>
-          </a:p>
-          <a:p>
-            <a:pPr defTabSz="933237">
-              <a:defRPr/>
-            </a:pPr>
-            <a:r>
-              <a:rPr lang="en-US" dirty="0">
-                <a:latin typeface="Arial" pitchFamily="34"/>
-                <a:ea typeface="Arial" pitchFamily="34"/>
-                <a:cs typeface="Arial" pitchFamily="34"/>
-              </a:rPr>
-              <a:t>The question of what constitutes intelligence is important.  It lies at the heart of AI.  For without a clear definition, how do we know when we have succeeded?  Over time, leading AI researchers have proposed different definitions.  Let’s start with the first one.  </a:t>
-            </a:r>
-          </a:p>
-          <a:p>
-            <a:pPr defTabSz="933237">
-              <a:defRPr/>
-            </a:pPr>
-            <a:endParaRPr lang="en-US" dirty="0">
-              <a:latin typeface="Arial" pitchFamily="34"/>
-              <a:cs typeface="Arial" pitchFamily="34"/>
-            </a:endParaRPr>
-          </a:p>
-          <a:p>
-            <a:endParaRPr lang="en-US" dirty="0"/>
           </a:p>
         </p:txBody>
       </p:sp>
@@ -1018,7 +974,7 @@
     </p:spTree>
     <p:extLst>
       <p:ext uri="{BB962C8B-B14F-4D97-AF65-F5344CB8AC3E}">
-        <p14:creationId xmlns:p14="http://schemas.microsoft.com/office/powerpoint/2010/main" val="3136242698"/>
+        <p14:creationId xmlns:p14="http://schemas.microsoft.com/office/powerpoint/2010/main" val="246808038"/>
       </p:ext>
     </p:extLst>
   </p:cSld>
@@ -1047,271 +1003,201 @@
       </p:grpSpPr>
       <p:sp>
         <p:nvSpPr>
-          <p:cNvPr id="7" name="Slide Number Placeholder 6">
-            <a:extLst>
-              <a:ext uri="{FF2B5EF4-FFF2-40B4-BE49-F238E27FC236}">
-                <a16:creationId xmlns:a16="http://schemas.microsoft.com/office/drawing/2014/main" id="{5B543A9C-E520-124D-A26C-727E7A91B5A6}"/>
-              </a:ext>
-            </a:extLst>
-          </p:cNvPr>
-          <p:cNvSpPr txBox="1">
+          <p:cNvPr id="2" name="Slide Image Placeholder 1"/>
+          <p:cNvSpPr>
+            <a:spLocks noGrp="1" noRot="1" noChangeAspect="1"/>
+          </p:cNvSpPr>
+          <p:nvPr>
+            <p:ph type="sldImg"/>
+          </p:nvPr>
+        </p:nvSpPr>
+        <p:spPr/>
+      </p:sp>
+      <p:sp>
+        <p:nvSpPr>
+          <p:cNvPr id="3" name="Notes Placeholder 2"/>
+          <p:cNvSpPr>
             <a:spLocks noGrp="1"/>
           </p:cNvSpPr>
           <p:nvPr>
+            <p:ph type="body" idx="1"/>
+          </p:nvPr>
+        </p:nvSpPr>
+        <p:spPr/>
+        <p:txBody>
+          <a:bodyPr/>
+          <a:lstStyle/>
+          <a:p>
+            <a:pPr defTabSz="933237">
+              <a:defRPr/>
+            </a:pPr>
+            <a:r>
+              <a:rPr lang="en-US" dirty="0">
+                <a:latin typeface="Arial" pitchFamily="34"/>
+                <a:ea typeface="Arial" pitchFamily="34"/>
+                <a:cs typeface="Arial" pitchFamily="34"/>
+              </a:rPr>
+              <a:t>Let’s continue our journey of exploring the question, “What is artificial intelligence?  </a:t>
+            </a:r>
+          </a:p>
+          <a:p>
+            <a:pPr defTabSz="933237">
+              <a:defRPr/>
+            </a:pPr>
+            <a:endParaRPr lang="en-US" dirty="0">
+              <a:latin typeface="Arial" pitchFamily="34"/>
+              <a:ea typeface="Arial" pitchFamily="34"/>
+              <a:cs typeface="Arial" pitchFamily="34"/>
+            </a:endParaRPr>
+          </a:p>
+          <a:p>
+            <a:pPr defTabSz="933237">
+              <a:defRPr/>
+            </a:pPr>
+            <a:r>
+              <a:rPr lang="en-US" dirty="0">
+                <a:latin typeface="Arial" pitchFamily="34"/>
+                <a:ea typeface="Arial" pitchFamily="34"/>
+                <a:cs typeface="Arial" pitchFamily="34"/>
+              </a:rPr>
+              <a:t>Meet Ai-Da, a creative robot named after Ada, the Countess of Lovelace who worked with Charles Babbage to create one of the world’s first computers (the Difference Engine) in the 19</a:t>
+            </a:r>
+            <a:r>
+              <a:rPr lang="en-US" baseline="30000" dirty="0">
+                <a:latin typeface="Arial" pitchFamily="34"/>
+                <a:ea typeface="Arial" pitchFamily="34"/>
+                <a:cs typeface="Arial" pitchFamily="34"/>
+              </a:rPr>
+              <a:t>th</a:t>
+            </a:r>
+            <a:r>
+              <a:rPr lang="en-US" dirty="0">
+                <a:latin typeface="Arial" pitchFamily="34"/>
+                <a:ea typeface="Arial" pitchFamily="34"/>
+                <a:cs typeface="Arial" pitchFamily="34"/>
+              </a:rPr>
+              <a:t> century.  Except for the arms, Ai-Da looks like a person.  Here she stands in front of one of her latest creations.  A couple questions. </a:t>
+            </a:r>
+          </a:p>
+          <a:p>
+            <a:pPr defTabSz="933237">
+              <a:defRPr/>
+            </a:pPr>
+            <a:endParaRPr lang="en-US" dirty="0">
+              <a:latin typeface="Arial" pitchFamily="34"/>
+              <a:ea typeface="Arial" pitchFamily="34"/>
+              <a:cs typeface="Arial" pitchFamily="34"/>
+            </a:endParaRPr>
+          </a:p>
+          <a:p>
+            <a:pPr marL="171450" indent="-171450" defTabSz="933237">
+              <a:buFont typeface="Courier New" panose="02070309020205020404" pitchFamily="49" charset="0"/>
+              <a:buChar char="o"/>
+              <a:defRPr/>
+            </a:pPr>
+            <a:r>
+              <a:rPr lang="en-US" dirty="0">
+                <a:latin typeface="Arial" pitchFamily="34"/>
+                <a:ea typeface="Arial" pitchFamily="34"/>
+                <a:cs typeface="Arial" pitchFamily="34"/>
+              </a:rPr>
+              <a:t>Is Ai-Da exhibiting intelligent / creative behavior?  </a:t>
+            </a:r>
+          </a:p>
+          <a:p>
+            <a:pPr marL="171450" indent="-171450" defTabSz="933237">
+              <a:buFont typeface="Courier New" panose="02070309020205020404" pitchFamily="49" charset="0"/>
+              <a:buChar char="o"/>
+              <a:defRPr/>
+            </a:pPr>
+            <a:r>
+              <a:rPr lang="en-US" dirty="0">
+                <a:latin typeface="Arial" pitchFamily="34"/>
+                <a:ea typeface="Arial" pitchFamily="34"/>
+                <a:cs typeface="Arial" pitchFamily="34"/>
+              </a:rPr>
+              <a:t>What criteria would you use to assess whether an entity is intelligent?</a:t>
+            </a:r>
+          </a:p>
+          <a:p>
+            <a:pPr marL="171450" indent="-171450" defTabSz="933237">
+              <a:buFont typeface="Courier New" panose="02070309020205020404" pitchFamily="49" charset="0"/>
+              <a:buChar char="o"/>
+              <a:defRPr/>
+            </a:pPr>
+            <a:r>
+              <a:rPr lang="en-US" dirty="0">
+                <a:latin typeface="Arial" pitchFamily="34"/>
+                <a:ea typeface="Arial" pitchFamily="34"/>
+                <a:cs typeface="Arial" pitchFamily="34"/>
+              </a:rPr>
+              <a:t>Is intelligence an emergent property of consciousness?   </a:t>
+            </a:r>
+          </a:p>
+          <a:p>
+            <a:pPr defTabSz="933237">
+              <a:defRPr/>
+            </a:pPr>
+            <a:endParaRPr lang="en-US" dirty="0">
+              <a:latin typeface="Arial" pitchFamily="34"/>
+              <a:ea typeface="Arial" pitchFamily="34"/>
+              <a:cs typeface="Arial" pitchFamily="34"/>
+            </a:endParaRPr>
+          </a:p>
+          <a:p>
+            <a:pPr defTabSz="933237">
+              <a:defRPr/>
+            </a:pPr>
+            <a:r>
+              <a:rPr lang="en-US" dirty="0">
+                <a:latin typeface="Arial" pitchFamily="34"/>
+                <a:ea typeface="Arial" pitchFamily="34"/>
+                <a:cs typeface="Arial" pitchFamily="34"/>
+              </a:rPr>
+              <a:t>The question of what constitutes intelligence is important.  It lies at the heart of AI.  For without a clear definition, how do we know when we have succeeded?  Over time, leading AI researchers have proposed different definitions.  Let’s start with the first one.  </a:t>
+            </a:r>
+          </a:p>
+          <a:p>
+            <a:pPr defTabSz="933237">
+              <a:defRPr/>
+            </a:pPr>
+            <a:endParaRPr lang="en-US" dirty="0">
+              <a:latin typeface="Arial" pitchFamily="34"/>
+              <a:cs typeface="Arial" pitchFamily="34"/>
+            </a:endParaRPr>
+          </a:p>
+          <a:p>
+            <a:endParaRPr lang="en-US" dirty="0"/>
+          </a:p>
+        </p:txBody>
+      </p:sp>
+      <p:sp>
+        <p:nvSpPr>
+          <p:cNvPr id="4" name="Slide Number Placeholder 3"/>
+          <p:cNvSpPr>
+            <a:spLocks noGrp="1"/>
+          </p:cNvSpPr>
+          <p:nvPr>
             <p:ph type="sldNum" sz="quarter" idx="5"/>
           </p:nvPr>
         </p:nvSpPr>
-        <p:spPr>
-          <a:ln/>
-        </p:spPr>
-        <p:txBody>
-          <a:bodyPr lIns="0" tIns="0" rIns="0" bIns="0" anchor="b" anchorCtr="0">
-            <a:noAutofit/>
-          </a:bodyPr>
-          <a:lstStyle/>
-          <a:p>
-            <a:pPr lvl="0"/>
-            <a:fld id="{F26ADB32-8A69-2C4E-BA54-385F30C1B140}" type="slidenum">
+        <p:spPr/>
+        <p:txBody>
+          <a:bodyPr/>
+          <a:lstStyle/>
+          <a:p>
+            <a:fld id="{3148858F-F1DB-4027-9C85-CCA6849540DD}" type="slidenum">
+              <a:rPr lang="en-US" smtClean="0"/>
               <a:t>13</a:t>
             </a:fld>
             <a:endParaRPr lang="en-US"/>
           </a:p>
         </p:txBody>
       </p:sp>
-      <p:sp>
-        <p:nvSpPr>
-          <p:cNvPr id="2" name="Slide Image Placeholder 1">
-            <a:extLst>
-              <a:ext uri="{FF2B5EF4-FFF2-40B4-BE49-F238E27FC236}">
-                <a16:creationId xmlns:a16="http://schemas.microsoft.com/office/drawing/2014/main" id="{A02321D2-BA00-8D41-B3B0-CF9117442E2A}"/>
-              </a:ext>
-            </a:extLst>
-          </p:cNvPr>
-          <p:cNvSpPr>
-            <a:spLocks noGrp="1" noRot="1" noChangeAspect="1" noResize="1"/>
-          </p:cNvSpPr>
-          <p:nvPr>
-            <p:ph type="sldImg"/>
-          </p:nvPr>
-        </p:nvSpPr>
-        <p:spPr>
-          <a:xfrm>
-            <a:off x="565150" y="777875"/>
-            <a:ext cx="6827838" cy="3840163"/>
-          </a:xfrm>
-          <a:solidFill>
-            <a:srgbClr val="729FCF"/>
-          </a:solidFill>
-          <a:ln w="25400">
-            <a:solidFill>
-              <a:srgbClr val="3465A4"/>
-            </a:solidFill>
-            <a:prstDash val="solid"/>
-          </a:ln>
-        </p:spPr>
-      </p:sp>
-      <p:sp>
-        <p:nvSpPr>
-          <p:cNvPr id="3" name="Notes Placeholder 2">
-            <a:extLst>
-              <a:ext uri="{FF2B5EF4-FFF2-40B4-BE49-F238E27FC236}">
-                <a16:creationId xmlns:a16="http://schemas.microsoft.com/office/drawing/2014/main" id="{A04CBDCA-B8FC-AE47-9EA8-9C1755746D8B}"/>
-              </a:ext>
-            </a:extLst>
-          </p:cNvPr>
-          <p:cNvSpPr txBox="1">
-            <a:spLocks noGrp="1"/>
-          </p:cNvSpPr>
-          <p:nvPr>
-            <p:ph type="body" sz="quarter" idx="1"/>
-          </p:nvPr>
-        </p:nvSpPr>
-        <p:spPr>
-          <a:xfrm>
-            <a:off x="702310" y="4480004"/>
-            <a:ext cx="5618480" cy="3787554"/>
-          </a:xfrm>
-        </p:spPr>
-        <p:txBody>
-          <a:bodyPr>
-            <a:spAutoFit/>
-          </a:bodyPr>
-          <a:lstStyle/>
-          <a:p>
-            <a:pPr algn="l"/>
-            <a:r>
-              <a:rPr lang="en-US" b="0" i="0" dirty="0">
-                <a:solidFill>
-                  <a:srgbClr val="202122"/>
-                </a:solidFill>
-                <a:effectLst/>
-                <a:latin typeface="Arial" panose="020B0604020202020204" pitchFamily="34" charset="0"/>
-              </a:rPr>
-              <a:t>In 1955, the first conference on “artificial intelligence” was held at Dartmouth College.  It was attended by the leading computer science researchers of the day – John McCarthy, Marvin Minsky, Nathanial Rochester, and Claude Shannon.  </a:t>
-            </a:r>
-          </a:p>
-          <a:p>
-            <a:pPr algn="l"/>
-            <a:endParaRPr lang="en-US" b="0" i="0" dirty="0">
-              <a:solidFill>
-                <a:srgbClr val="202122"/>
-              </a:solidFill>
-              <a:effectLst/>
-              <a:latin typeface="Arial" panose="020B0604020202020204" pitchFamily="34" charset="0"/>
-            </a:endParaRPr>
-          </a:p>
-          <a:p>
-            <a:pPr marL="228600" indent="-228600" algn="l">
-              <a:buAutoNum type="arabicPeriod"/>
-            </a:pPr>
-            <a:r>
-              <a:rPr lang="en-US" b="0" i="0" dirty="0">
-                <a:solidFill>
-                  <a:srgbClr val="202122"/>
-                </a:solidFill>
-                <a:effectLst/>
-                <a:latin typeface="Arial" panose="020B0604020202020204" pitchFamily="34" charset="0"/>
-              </a:rPr>
-              <a:t>McCarthy coined the phrase “artificial intelligence” when he wrote the funding proposal for the Rockefeller Foundation.   This is where modern AI began.</a:t>
-            </a:r>
-          </a:p>
-          <a:p>
-            <a:pPr marL="228600" indent="-228600" algn="l">
-              <a:buAutoNum type="arabicPeriod"/>
-            </a:pPr>
-            <a:r>
-              <a:rPr lang="en-US" b="0" i="0" dirty="0">
-                <a:solidFill>
-                  <a:srgbClr val="202122"/>
-                </a:solidFill>
-                <a:effectLst/>
-                <a:latin typeface="Arial" panose="020B0604020202020204" pitchFamily="34" charset="0"/>
-              </a:rPr>
-              <a:t>McCarthy also provided a short definition.</a:t>
-            </a:r>
-          </a:p>
-          <a:p>
-            <a:pPr algn="l"/>
-            <a:endParaRPr lang="en-US" b="0" i="0" dirty="0">
-              <a:solidFill>
-                <a:srgbClr val="202122"/>
-              </a:solidFill>
-              <a:effectLst/>
-              <a:latin typeface="Arial" panose="020B0604020202020204" pitchFamily="34" charset="0"/>
-            </a:endParaRPr>
-          </a:p>
-          <a:p>
-            <a:pPr algn="l"/>
-            <a:r>
-              <a:rPr lang="en-US" b="0" i="0" dirty="0">
-                <a:solidFill>
-                  <a:srgbClr val="202122"/>
-                </a:solidFill>
-                <a:effectLst/>
-                <a:latin typeface="Arial" panose="020B0604020202020204" pitchFamily="34" charset="0"/>
-              </a:rPr>
-              <a:t>=====</a:t>
-            </a:r>
-          </a:p>
-          <a:p>
-            <a:pPr algn="l"/>
-            <a:r>
-              <a:rPr lang="en-US" b="0" i="0" dirty="0">
-                <a:solidFill>
-                  <a:srgbClr val="202122"/>
-                </a:solidFill>
-                <a:effectLst/>
-                <a:latin typeface="Arial" panose="020B0604020202020204" pitchFamily="34" charset="0"/>
-              </a:rPr>
-              <a:t>In early 1955, John McCarthy </a:t>
-            </a:r>
-            <a:r>
-              <a:rPr lang="en-US" b="0" i="0" u="none" strike="noStrike" dirty="0">
-                <a:solidFill>
-                  <a:srgbClr val="202122"/>
-                </a:solidFill>
-                <a:effectLst/>
-                <a:latin typeface="Arial" panose="020B0604020202020204" pitchFamily="34" charset="0"/>
-              </a:rPr>
-              <a:t>accepted a position as an Assistant Professor of Mathematics at Dartmouth College.  Soon after, he </a:t>
-            </a:r>
-            <a:r>
-              <a:rPr lang="en-US" b="0" i="0" dirty="0">
-                <a:solidFill>
-                  <a:srgbClr val="202122"/>
-                </a:solidFill>
-                <a:effectLst/>
-                <a:latin typeface="Arial" panose="020B0604020202020204" pitchFamily="34" charset="0"/>
-              </a:rPr>
-              <a:t>organized a group to discuss the future of thinking machines.  In September, he, Marvin Minsky, Nathanial Rochester, and Claude Shannon </a:t>
-            </a:r>
-            <a:r>
-              <a:rPr lang="en-US" b="0" i="0" u="none" strike="noStrike" dirty="0">
-                <a:solidFill>
-                  <a:srgbClr val="0645AD"/>
-                </a:solidFill>
-                <a:effectLst/>
-                <a:latin typeface="Arial" panose="020B0604020202020204" pitchFamily="34" charset="0"/>
-              </a:rPr>
-              <a:t>submitted a proposal to the Rockefeller Foundation, requesting funds to host the </a:t>
-            </a:r>
-            <a:r>
-              <a:rPr lang="en-US" b="0" i="1" u="none" strike="noStrike" dirty="0">
-                <a:solidFill>
-                  <a:srgbClr val="0645AD"/>
-                </a:solidFill>
-                <a:effectLst/>
-                <a:latin typeface="Arial" panose="020B0604020202020204" pitchFamily="34" charset="0"/>
-              </a:rPr>
-              <a:t>Dartmouth Summer Research Project on Artificial Intelligence</a:t>
-            </a:r>
-            <a:r>
-              <a:rPr lang="en-US" b="0" i="0" u="none" strike="noStrike" dirty="0">
-                <a:solidFill>
-                  <a:srgbClr val="0645AD"/>
-                </a:solidFill>
-                <a:effectLst/>
-                <a:latin typeface="Arial" panose="020B0604020202020204" pitchFamily="34" charset="0"/>
-              </a:rPr>
-              <a:t>. </a:t>
-            </a:r>
-            <a:r>
-              <a:rPr lang="en-US" b="0" i="0" dirty="0">
-                <a:solidFill>
-                  <a:srgbClr val="202122"/>
-                </a:solidFill>
-                <a:effectLst/>
-                <a:latin typeface="Arial" panose="020B0604020202020204" pitchFamily="34" charset="0"/>
-              </a:rPr>
-              <a:t>Fortunately, the foundation funded the proposal.  And today, this conference is credited with introducing the term 'artificial intelligence’ to the world.</a:t>
-            </a:r>
-            <a:endParaRPr lang="en-US" b="0" i="0" u="none" strike="noStrike" dirty="0">
-              <a:solidFill>
-                <a:srgbClr val="0645AD"/>
-              </a:solidFill>
-              <a:effectLst/>
-              <a:latin typeface="Arial" panose="020B0604020202020204" pitchFamily="34" charset="0"/>
-            </a:endParaRPr>
-          </a:p>
-          <a:p>
-            <a:pPr algn="l"/>
-            <a:endParaRPr lang="en-US" b="0" i="0" u="none" strike="noStrike" dirty="0">
-              <a:solidFill>
-                <a:srgbClr val="0645AD"/>
-              </a:solidFill>
-              <a:effectLst/>
-              <a:latin typeface="Arial" panose="020B0604020202020204" pitchFamily="34" charset="0"/>
-            </a:endParaRPr>
-          </a:p>
-          <a:p>
-            <a:endParaRPr lang="en-US" dirty="0"/>
-          </a:p>
-        </p:txBody>
-      </p:sp>
     </p:spTree>
     <p:extLst>
       <p:ext uri="{BB962C8B-B14F-4D97-AF65-F5344CB8AC3E}">
-        <p14:creationId xmlns:p14="http://schemas.microsoft.com/office/powerpoint/2010/main" val="2400027281"/>
+        <p14:creationId xmlns:p14="http://schemas.microsoft.com/office/powerpoint/2010/main" val="3136242698"/>
       </p:ext>
     </p:extLst>
   </p:cSld>
@@ -1340,65 +1226,271 @@
       </p:grpSpPr>
       <p:sp>
         <p:nvSpPr>
-          <p:cNvPr id="2" name="Slide Image Placeholder 1"/>
-          <p:cNvSpPr>
-            <a:spLocks noGrp="1" noRot="1" noChangeAspect="1"/>
-          </p:cNvSpPr>
-          <p:nvPr>
-            <p:ph type="sldImg"/>
-          </p:nvPr>
-        </p:nvSpPr>
-        <p:spPr/>
-      </p:sp>
-      <p:sp>
-        <p:nvSpPr>
-          <p:cNvPr id="3" name="Notes Placeholder 2"/>
-          <p:cNvSpPr>
+          <p:cNvPr id="7" name="Slide Number Placeholder 6">
+            <a:extLst>
+              <a:ext uri="{FF2B5EF4-FFF2-40B4-BE49-F238E27FC236}">
+                <a16:creationId xmlns:a16="http://schemas.microsoft.com/office/drawing/2014/main" id="{5B543A9C-E520-124D-A26C-727E7A91B5A6}"/>
+              </a:ext>
+            </a:extLst>
+          </p:cNvPr>
+          <p:cNvSpPr txBox="1">
             <a:spLocks noGrp="1"/>
           </p:cNvSpPr>
           <p:nvPr>
-            <p:ph type="body" idx="1"/>
-          </p:nvPr>
-        </p:nvSpPr>
-        <p:spPr/>
-        <p:txBody>
-          <a:bodyPr/>
-          <a:lstStyle/>
-          <a:p>
-            <a:r>
-              <a:rPr lang="en-US" dirty="0"/>
-              <a:t>With that history in place, let’s consider some definitions – starting with the one advanced in the Dartmouth Proposal.  I like the Wallace Marshall definition…</a:t>
-            </a:r>
-          </a:p>
-        </p:txBody>
-      </p:sp>
-      <p:sp>
-        <p:nvSpPr>
-          <p:cNvPr id="4" name="Slide Number Placeholder 3"/>
-          <p:cNvSpPr>
-            <a:spLocks noGrp="1"/>
-          </p:cNvSpPr>
-          <p:nvPr>
             <p:ph type="sldNum" sz="quarter" idx="5"/>
           </p:nvPr>
         </p:nvSpPr>
-        <p:spPr/>
-        <p:txBody>
-          <a:bodyPr/>
-          <a:lstStyle/>
-          <a:p>
-            <a:fld id="{3148858F-F1DB-4027-9C85-CCA6849540DD}" type="slidenum">
-              <a:rPr lang="en-US" smtClean="0"/>
+        <p:spPr>
+          <a:ln/>
+        </p:spPr>
+        <p:txBody>
+          <a:bodyPr lIns="0" tIns="0" rIns="0" bIns="0" anchor="b" anchorCtr="0">
+            <a:noAutofit/>
+          </a:bodyPr>
+          <a:lstStyle/>
+          <a:p>
+            <a:pPr lvl="0"/>
+            <a:fld id="{F26ADB32-8A69-2C4E-BA54-385F30C1B140}" type="slidenum">
               <a:t>14</a:t>
             </a:fld>
             <a:endParaRPr lang="en-US"/>
           </a:p>
         </p:txBody>
       </p:sp>
+      <p:sp>
+        <p:nvSpPr>
+          <p:cNvPr id="2" name="Slide Image Placeholder 1">
+            <a:extLst>
+              <a:ext uri="{FF2B5EF4-FFF2-40B4-BE49-F238E27FC236}">
+                <a16:creationId xmlns:a16="http://schemas.microsoft.com/office/drawing/2014/main" id="{A02321D2-BA00-8D41-B3B0-CF9117442E2A}"/>
+              </a:ext>
+            </a:extLst>
+          </p:cNvPr>
+          <p:cNvSpPr>
+            <a:spLocks noGrp="1" noRot="1" noChangeAspect="1" noResize="1"/>
+          </p:cNvSpPr>
+          <p:nvPr>
+            <p:ph type="sldImg"/>
+          </p:nvPr>
+        </p:nvSpPr>
+        <p:spPr>
+          <a:xfrm>
+            <a:off x="565150" y="777875"/>
+            <a:ext cx="6827838" cy="3840163"/>
+          </a:xfrm>
+          <a:solidFill>
+            <a:srgbClr val="729FCF"/>
+          </a:solidFill>
+          <a:ln w="25400">
+            <a:solidFill>
+              <a:srgbClr val="3465A4"/>
+            </a:solidFill>
+            <a:prstDash val="solid"/>
+          </a:ln>
+        </p:spPr>
+      </p:sp>
+      <p:sp>
+        <p:nvSpPr>
+          <p:cNvPr id="3" name="Notes Placeholder 2">
+            <a:extLst>
+              <a:ext uri="{FF2B5EF4-FFF2-40B4-BE49-F238E27FC236}">
+                <a16:creationId xmlns:a16="http://schemas.microsoft.com/office/drawing/2014/main" id="{A04CBDCA-B8FC-AE47-9EA8-9C1755746D8B}"/>
+              </a:ext>
+            </a:extLst>
+          </p:cNvPr>
+          <p:cNvSpPr txBox="1">
+            <a:spLocks noGrp="1"/>
+          </p:cNvSpPr>
+          <p:nvPr>
+            <p:ph type="body" sz="quarter" idx="1"/>
+          </p:nvPr>
+        </p:nvSpPr>
+        <p:spPr>
+          <a:xfrm>
+            <a:off x="702310" y="4480004"/>
+            <a:ext cx="5618480" cy="3787554"/>
+          </a:xfrm>
+        </p:spPr>
+        <p:txBody>
+          <a:bodyPr>
+            <a:spAutoFit/>
+          </a:bodyPr>
+          <a:lstStyle/>
+          <a:p>
+            <a:pPr algn="l"/>
+            <a:r>
+              <a:rPr lang="en-US" b="0" i="0" dirty="0">
+                <a:solidFill>
+                  <a:srgbClr val="202122"/>
+                </a:solidFill>
+                <a:effectLst/>
+                <a:latin typeface="Arial" panose="020B0604020202020204" pitchFamily="34" charset="0"/>
+              </a:rPr>
+              <a:t>In 1955, the first conference on “artificial intelligence” was held at Dartmouth College.  It was attended by the leading computer science researchers of the day – John McCarthy, Marvin Minsky, Nathanial Rochester, and Claude Shannon.  </a:t>
+            </a:r>
+          </a:p>
+          <a:p>
+            <a:pPr algn="l"/>
+            <a:endParaRPr lang="en-US" b="0" i="0" dirty="0">
+              <a:solidFill>
+                <a:srgbClr val="202122"/>
+              </a:solidFill>
+              <a:effectLst/>
+              <a:latin typeface="Arial" panose="020B0604020202020204" pitchFamily="34" charset="0"/>
+            </a:endParaRPr>
+          </a:p>
+          <a:p>
+            <a:pPr marL="228600" indent="-228600" algn="l">
+              <a:buAutoNum type="arabicPeriod"/>
+            </a:pPr>
+            <a:r>
+              <a:rPr lang="en-US" b="0" i="0" dirty="0">
+                <a:solidFill>
+                  <a:srgbClr val="202122"/>
+                </a:solidFill>
+                <a:effectLst/>
+                <a:latin typeface="Arial" panose="020B0604020202020204" pitchFamily="34" charset="0"/>
+              </a:rPr>
+              <a:t>McCarthy coined the phrase “artificial intelligence” when he wrote the funding proposal for the Rockefeller Foundation.   This is where modern AI began.</a:t>
+            </a:r>
+          </a:p>
+          <a:p>
+            <a:pPr marL="228600" indent="-228600" algn="l">
+              <a:buAutoNum type="arabicPeriod"/>
+            </a:pPr>
+            <a:r>
+              <a:rPr lang="en-US" b="0" i="0" dirty="0">
+                <a:solidFill>
+                  <a:srgbClr val="202122"/>
+                </a:solidFill>
+                <a:effectLst/>
+                <a:latin typeface="Arial" panose="020B0604020202020204" pitchFamily="34" charset="0"/>
+              </a:rPr>
+              <a:t>McCarthy also provided a short definition.</a:t>
+            </a:r>
+          </a:p>
+          <a:p>
+            <a:pPr algn="l"/>
+            <a:endParaRPr lang="en-US" b="0" i="0" dirty="0">
+              <a:solidFill>
+                <a:srgbClr val="202122"/>
+              </a:solidFill>
+              <a:effectLst/>
+              <a:latin typeface="Arial" panose="020B0604020202020204" pitchFamily="34" charset="0"/>
+            </a:endParaRPr>
+          </a:p>
+          <a:p>
+            <a:pPr algn="l"/>
+            <a:r>
+              <a:rPr lang="en-US" b="0" i="0" dirty="0">
+                <a:solidFill>
+                  <a:srgbClr val="202122"/>
+                </a:solidFill>
+                <a:effectLst/>
+                <a:latin typeface="Arial" panose="020B0604020202020204" pitchFamily="34" charset="0"/>
+              </a:rPr>
+              <a:t>=====</a:t>
+            </a:r>
+          </a:p>
+          <a:p>
+            <a:pPr algn="l"/>
+            <a:r>
+              <a:rPr lang="en-US" b="0" i="0" dirty="0">
+                <a:solidFill>
+                  <a:srgbClr val="202122"/>
+                </a:solidFill>
+                <a:effectLst/>
+                <a:latin typeface="Arial" panose="020B0604020202020204" pitchFamily="34" charset="0"/>
+              </a:rPr>
+              <a:t>In early 1955, John McCarthy </a:t>
+            </a:r>
+            <a:r>
+              <a:rPr lang="en-US" b="0" i="0" u="none" strike="noStrike" dirty="0">
+                <a:solidFill>
+                  <a:srgbClr val="202122"/>
+                </a:solidFill>
+                <a:effectLst/>
+                <a:latin typeface="Arial" panose="020B0604020202020204" pitchFamily="34" charset="0"/>
+              </a:rPr>
+              <a:t>accepted a position as an Assistant Professor of Mathematics at Dartmouth College.  Soon after, he </a:t>
+            </a:r>
+            <a:r>
+              <a:rPr lang="en-US" b="0" i="0" dirty="0">
+                <a:solidFill>
+                  <a:srgbClr val="202122"/>
+                </a:solidFill>
+                <a:effectLst/>
+                <a:latin typeface="Arial" panose="020B0604020202020204" pitchFamily="34" charset="0"/>
+              </a:rPr>
+              <a:t>organized a group to discuss the future of thinking machines.  In September, he, Marvin Minsky, Nathanial Rochester, and Claude Shannon </a:t>
+            </a:r>
+            <a:r>
+              <a:rPr lang="en-US" b="0" i="0" u="none" strike="noStrike" dirty="0">
+                <a:solidFill>
+                  <a:srgbClr val="0645AD"/>
+                </a:solidFill>
+                <a:effectLst/>
+                <a:latin typeface="Arial" panose="020B0604020202020204" pitchFamily="34" charset="0"/>
+              </a:rPr>
+              <a:t>submitted a proposal to the Rockefeller Foundation, requesting funds to host the </a:t>
+            </a:r>
+            <a:r>
+              <a:rPr lang="en-US" b="0" i="1" u="none" strike="noStrike" dirty="0">
+                <a:solidFill>
+                  <a:srgbClr val="0645AD"/>
+                </a:solidFill>
+                <a:effectLst/>
+                <a:latin typeface="Arial" panose="020B0604020202020204" pitchFamily="34" charset="0"/>
+              </a:rPr>
+              <a:t>Dartmouth Summer Research Project on Artificial Intelligence</a:t>
+            </a:r>
+            <a:r>
+              <a:rPr lang="en-US" b="0" i="0" u="none" strike="noStrike" dirty="0">
+                <a:solidFill>
+                  <a:srgbClr val="0645AD"/>
+                </a:solidFill>
+                <a:effectLst/>
+                <a:latin typeface="Arial" panose="020B0604020202020204" pitchFamily="34" charset="0"/>
+              </a:rPr>
+              <a:t>. </a:t>
+            </a:r>
+            <a:r>
+              <a:rPr lang="en-US" b="0" i="0" dirty="0">
+                <a:solidFill>
+                  <a:srgbClr val="202122"/>
+                </a:solidFill>
+                <a:effectLst/>
+                <a:latin typeface="Arial" panose="020B0604020202020204" pitchFamily="34" charset="0"/>
+              </a:rPr>
+              <a:t>Fortunately, the foundation funded the proposal.  And today, this conference is credited with introducing the term 'artificial intelligence’ to the world.</a:t>
+            </a:r>
+            <a:endParaRPr lang="en-US" b="0" i="0" u="none" strike="noStrike" dirty="0">
+              <a:solidFill>
+                <a:srgbClr val="0645AD"/>
+              </a:solidFill>
+              <a:effectLst/>
+              <a:latin typeface="Arial" panose="020B0604020202020204" pitchFamily="34" charset="0"/>
+            </a:endParaRPr>
+          </a:p>
+          <a:p>
+            <a:pPr algn="l"/>
+            <a:endParaRPr lang="en-US" b="0" i="0" u="none" strike="noStrike" dirty="0">
+              <a:solidFill>
+                <a:srgbClr val="0645AD"/>
+              </a:solidFill>
+              <a:effectLst/>
+              <a:latin typeface="Arial" panose="020B0604020202020204" pitchFamily="34" charset="0"/>
+            </a:endParaRPr>
+          </a:p>
+          <a:p>
+            <a:endParaRPr lang="en-US" dirty="0"/>
+          </a:p>
+        </p:txBody>
+      </p:sp>
     </p:spTree>
     <p:extLst>
       <p:ext uri="{BB962C8B-B14F-4D97-AF65-F5344CB8AC3E}">
-        <p14:creationId xmlns:p14="http://schemas.microsoft.com/office/powerpoint/2010/main" val="1011519860"/>
+        <p14:creationId xmlns:p14="http://schemas.microsoft.com/office/powerpoint/2010/main" val="2400027281"/>
       </p:ext>
     </p:extLst>
   </p:cSld>
@@ -1454,7 +1546,7 @@
           <a:p>
             <a:r>
               <a:rPr lang="en-US" dirty="0"/>
-              <a:t>… and a couple more definitions.  </a:t>
+              <a:t>With that history in place, let’s consider some definitions – starting with the one advanced in the Dartmouth Proposal.  I like the Wallace Marshall definition…</a:t>
             </a:r>
           </a:p>
         </p:txBody>
@@ -1485,7 +1577,7 @@
     </p:spTree>
     <p:extLst>
       <p:ext uri="{BB962C8B-B14F-4D97-AF65-F5344CB8AC3E}">
-        <p14:creationId xmlns:p14="http://schemas.microsoft.com/office/powerpoint/2010/main" val="4028108833"/>
+        <p14:creationId xmlns:p14="http://schemas.microsoft.com/office/powerpoint/2010/main" val="1011519860"/>
       </p:ext>
     </p:extLst>
   </p:cSld>
@@ -1539,39 +1631,9 @@
           <a:bodyPr/>
           <a:lstStyle/>
           <a:p>
-            <a:pPr defTabSz="933237">
-              <a:defRPr/>
-            </a:pPr>
-            <a:r>
-              <a:rPr lang="en-US" dirty="0">
-                <a:latin typeface="Arial" pitchFamily="34"/>
-                <a:ea typeface="Arial" pitchFamily="34"/>
-                <a:cs typeface="Arial" pitchFamily="34"/>
-              </a:rPr>
-              <a:t>Okay – given these definitions, has your definition of A.I. changed from your response in our first exercise?  </a:t>
-            </a:r>
-          </a:p>
-          <a:p>
-            <a:pPr defTabSz="933237">
-              <a:defRPr/>
-            </a:pPr>
-            <a:endParaRPr lang="en-US" dirty="0">
-              <a:latin typeface="Arial" pitchFamily="34"/>
-              <a:ea typeface="Arial" pitchFamily="34"/>
-              <a:cs typeface="Arial" pitchFamily="34"/>
-            </a:endParaRPr>
-          </a:p>
-          <a:p>
-            <a:pPr defTabSz="933237">
-              <a:defRPr/>
-            </a:pPr>
-            <a:r>
-              <a:rPr lang="en-US" dirty="0">
-                <a:latin typeface="Arial" pitchFamily="34"/>
-                <a:ea typeface="Arial" pitchFamily="34"/>
-                <a:cs typeface="Arial" pitchFamily="34"/>
-              </a:rPr>
-              <a:t>Let’s discuss these questions in the breakout rooms. </a:t>
+            <a:r>
+              <a:rPr lang="en-US" dirty="0"/>
+              <a:t>… and a couple more definitions.  </a:t>
             </a:r>
           </a:p>
         </p:txBody>
@@ -1602,7 +1664,7 @@
     </p:spTree>
     <p:extLst>
       <p:ext uri="{BB962C8B-B14F-4D97-AF65-F5344CB8AC3E}">
-        <p14:creationId xmlns:p14="http://schemas.microsoft.com/office/powerpoint/2010/main" val="1284256817"/>
+        <p14:creationId xmlns:p14="http://schemas.microsoft.com/office/powerpoint/2010/main" val="4028108833"/>
       </p:ext>
     </p:extLst>
   </p:cSld>
@@ -1656,62 +1718,39 @@
           <a:bodyPr/>
           <a:lstStyle/>
           <a:p>
+            <a:pPr defTabSz="933237">
+              <a:defRPr/>
+            </a:pPr>
             <a:r>
               <a:rPr lang="en-US" dirty="0">
-                <a:latin typeface="Arial" pitchFamily="18"/>
+                <a:latin typeface="Arial" pitchFamily="34"/>
                 <a:ea typeface="Arial" pitchFamily="34"/>
                 <a:cs typeface="Arial" pitchFamily="34"/>
               </a:rPr>
-              <a:t>Another important name in AI is Alan Turing.  The Turing test of intelligence was first proposed by him in 1950, in an article entitled, </a:t>
-            </a:r>
-            <a:r>
-              <a:rPr lang="en-US" i="1" dirty="0">
-                <a:latin typeface="Arial" pitchFamily="18"/>
+              <a:t>Okay – given these definitions, has your definition of A.I. changed from your response in our first exercise?  </a:t>
+            </a:r>
+          </a:p>
+          <a:p>
+            <a:pPr defTabSz="933237">
+              <a:defRPr/>
+            </a:pPr>
+            <a:endParaRPr lang="en-US" dirty="0">
+              <a:latin typeface="Arial" pitchFamily="34"/>
+              <a:ea typeface="Arial" pitchFamily="34"/>
+              <a:cs typeface="Arial" pitchFamily="34"/>
+            </a:endParaRPr>
+          </a:p>
+          <a:p>
+            <a:pPr defTabSz="933237">
+              <a:defRPr/>
+            </a:pPr>
+            <a:r>
+              <a:rPr lang="en-US" dirty="0">
+                <a:latin typeface="Arial" pitchFamily="34"/>
                 <a:ea typeface="Arial" pitchFamily="34"/>
                 <a:cs typeface="Arial" pitchFamily="34"/>
               </a:rPr>
-              <a:t>Computing Machinery and Intelligence.  </a:t>
-            </a:r>
-            <a:r>
-              <a:rPr lang="en-US" dirty="0">
-                <a:latin typeface="Arial" pitchFamily="18"/>
-                <a:ea typeface="Arial" pitchFamily="34"/>
-                <a:cs typeface="Arial" pitchFamily="34"/>
-              </a:rPr>
-              <a:t>This is a foundational document in this field.</a:t>
-            </a:r>
-          </a:p>
-          <a:p>
-            <a:endParaRPr lang="en-US" dirty="0">
-              <a:latin typeface="Arial" pitchFamily="18"/>
-              <a:ea typeface="Arial" pitchFamily="34"/>
-              <a:cs typeface="Arial" pitchFamily="34"/>
-            </a:endParaRPr>
-          </a:p>
-          <a:p>
-            <a:r>
-              <a:rPr lang="en-US" dirty="0">
-                <a:latin typeface="Arial" pitchFamily="18"/>
-                <a:ea typeface="Arial" pitchFamily="34"/>
-                <a:cs typeface="Arial" pitchFamily="34"/>
-              </a:rPr>
-              <a:t>Turing, AM (1950) Computing Machinery and Intelligence. </a:t>
-            </a:r>
-            <a:r>
-              <a:rPr lang="en-US" i="1" dirty="0">
-                <a:latin typeface="Arial" pitchFamily="18"/>
-                <a:ea typeface="Arial" pitchFamily="34"/>
-                <a:cs typeface="Arial" pitchFamily="34"/>
-              </a:rPr>
-              <a:t>Mind</a:t>
-            </a:r>
-            <a:r>
-              <a:rPr lang="en-US" dirty="0">
-                <a:latin typeface="Arial" pitchFamily="18"/>
-                <a:ea typeface="Arial" pitchFamily="34"/>
-                <a:cs typeface="Arial" pitchFamily="34"/>
-              </a:rPr>
-              <a:t>: 54</a:t>
+              <a:t>Let’s discuss these questions in the breakout rooms. </a:t>
             </a:r>
           </a:p>
         </p:txBody>
@@ -1742,7 +1781,7 @@
     </p:spTree>
     <p:extLst>
       <p:ext uri="{BB962C8B-B14F-4D97-AF65-F5344CB8AC3E}">
-        <p14:creationId xmlns:p14="http://schemas.microsoft.com/office/powerpoint/2010/main" val="1860523921"/>
+        <p14:creationId xmlns:p14="http://schemas.microsoft.com/office/powerpoint/2010/main" val="1284256817"/>
       </p:ext>
     </p:extLst>
   </p:cSld>
@@ -1797,58 +1836,61 @@
           <a:lstStyle/>
           <a:p>
             <a:r>
-              <a:rPr lang="en-US" dirty="0"/>
-              <a:t>The Turing Test has been hugely influential since Turing first described it in 1950.  </a:t>
-            </a:r>
-          </a:p>
-          <a:p>
-            <a:endParaRPr lang="en-US" dirty="0"/>
-          </a:p>
-          <a:p>
-            <a:pPr marL="233309" indent="-233309">
-              <a:buAutoNum type="arabicPeriod"/>
-            </a:pPr>
-            <a:r>
-              <a:rPr lang="en-US" dirty="0"/>
-              <a:t>Turing got the idea from a Victorian parlor game where a man and a woman sat in a separate room.  The other players then passed a series of written questions to them and would try to guess the sex of the respondent by the answers they gave.</a:t>
-            </a:r>
-          </a:p>
-          <a:p>
-            <a:pPr marL="233309" indent="-233309">
-              <a:buAutoNum type="arabicPeriod"/>
-            </a:pPr>
-            <a:r>
-              <a:rPr lang="en-US" dirty="0"/>
-              <a:t>The Turing Test is a computer version of that game.  In the image here, we see a Human questioner in the middle, sending questions to both a computer and another human.  The interaction is purely in the form of text and answers: the human questioner types a question, and a response is displayed.  Now the task of that person is to determine whether the thing being interrogated is a person or a computer program.</a:t>
-            </a:r>
-          </a:p>
-          <a:p>
-            <a:pPr marL="233309" indent="-233309">
-              <a:buAutoNum type="arabicPeriod"/>
-            </a:pPr>
-            <a:r>
-              <a:rPr lang="en-US" dirty="0"/>
-              <a:t>Now, suppose that the thing being interrogated is indeed a computer program, but after some reasonable amount of time, the questioners cannot reliably tell whether they are interacting with a program or a person.  Then surely, Turing argued, you should accept that the program has some sort of human level intelligence because the system is doing something that makes it </a:t>
-            </a:r>
-            <a:r>
-              <a:rPr lang="en-US" b="1" dirty="0"/>
-              <a:t>indistinguishable </a:t>
-            </a:r>
-            <a:r>
-              <a:rPr lang="en-US" b="0" dirty="0"/>
-              <a:t>from the real thing.  The key word here is indistinguishable…</a:t>
-            </a:r>
-          </a:p>
-          <a:p>
-            <a:pPr marL="233309" indent="-233309">
-              <a:buAutoNum type="arabicPeriod"/>
-            </a:pPr>
-            <a:endParaRPr lang="en-US" b="0" dirty="0"/>
-          </a:p>
-          <a:p>
-            <a:r>
-              <a:rPr lang="en-US" dirty="0"/>
-              <a:t>https://searchenterpriseai.techtarget.com/definition/Turing-test</a:t>
+              <a:rPr lang="en-US" dirty="0">
+                <a:latin typeface="Arial" pitchFamily="18"/>
+                <a:ea typeface="Arial" pitchFamily="34"/>
+                <a:cs typeface="Arial" pitchFamily="34"/>
+              </a:rPr>
+              <a:t>Another important name in AI is Alan Turing.  The Turing test of intelligence was first proposed by him in 1950, in an article entitled, </a:t>
+            </a:r>
+            <a:r>
+              <a:rPr lang="en-US" i="1" dirty="0">
+                <a:latin typeface="Arial" pitchFamily="18"/>
+                <a:ea typeface="Arial" pitchFamily="34"/>
+                <a:cs typeface="Arial" pitchFamily="34"/>
+              </a:rPr>
+              <a:t>Computing Machinery and Intelligence.  </a:t>
+            </a:r>
+            <a:r>
+              <a:rPr lang="en-US" dirty="0">
+                <a:latin typeface="Arial" pitchFamily="18"/>
+                <a:ea typeface="Arial" pitchFamily="34"/>
+                <a:cs typeface="Arial" pitchFamily="34"/>
+              </a:rPr>
+              <a:t>This is a foundational document in this field.</a:t>
+            </a:r>
+          </a:p>
+          <a:p>
+            <a:endParaRPr lang="en-US" dirty="0">
+              <a:latin typeface="Arial" pitchFamily="18"/>
+              <a:ea typeface="Arial" pitchFamily="34"/>
+              <a:cs typeface="Arial" pitchFamily="34"/>
+            </a:endParaRPr>
+          </a:p>
+          <a:p>
+            <a:r>
+              <a:rPr lang="en-US" dirty="0">
+                <a:latin typeface="Arial" pitchFamily="18"/>
+                <a:ea typeface="Arial" pitchFamily="34"/>
+                <a:cs typeface="Arial" pitchFamily="34"/>
+              </a:rPr>
+              <a:t>Turing, AM (1950) Computing Machinery and Intelligence. </a:t>
+            </a:r>
+            <a:r>
+              <a:rPr lang="en-US" i="1" dirty="0">
+                <a:latin typeface="Arial" pitchFamily="18"/>
+                <a:ea typeface="Arial" pitchFamily="34"/>
+                <a:cs typeface="Arial" pitchFamily="34"/>
+              </a:rPr>
+              <a:t>Mind</a:t>
+            </a:r>
+            <a:r>
+              <a:rPr lang="en-US" dirty="0">
+                <a:latin typeface="Arial" pitchFamily="18"/>
+                <a:ea typeface="Arial" pitchFamily="34"/>
+                <a:cs typeface="Arial" pitchFamily="34"/>
+              </a:rPr>
+              <a:t>: 54</a:t>
             </a:r>
           </a:p>
         </p:txBody>
@@ -1879,7 +1921,7 @@
     </p:spTree>
     <p:extLst>
       <p:ext uri="{BB962C8B-B14F-4D97-AF65-F5344CB8AC3E}">
-        <p14:creationId xmlns:p14="http://schemas.microsoft.com/office/powerpoint/2010/main" val="2968338234"/>
+        <p14:creationId xmlns:p14="http://schemas.microsoft.com/office/powerpoint/2010/main" val="1860523921"/>
       </p:ext>
     </p:extLst>
   </p:cSld>
@@ -1934,58 +1976,58 @@
           <a:lstStyle/>
           <a:p>
             <a:r>
+              <a:rPr lang="en-US" dirty="0"/>
+              <a:t>The Turing Test has been hugely influential since Turing first described it in 1950.  </a:t>
+            </a:r>
+          </a:p>
+          <a:p>
+            <a:endParaRPr lang="en-US" dirty="0"/>
+          </a:p>
+          <a:p>
+            <a:pPr marL="233309" indent="-233309">
+              <a:buAutoNum type="arabicPeriod"/>
+            </a:pPr>
+            <a:r>
+              <a:rPr lang="en-US" dirty="0"/>
+              <a:t>Turing got the idea from a Victorian parlor game where a man and a woman sat in a separate room.  The other players then passed a series of written questions to them and would try to guess the sex of the respondent by the answers they gave.</a:t>
+            </a:r>
+          </a:p>
+          <a:p>
+            <a:pPr marL="233309" indent="-233309">
+              <a:buAutoNum type="arabicPeriod"/>
+            </a:pPr>
+            <a:r>
+              <a:rPr lang="en-US" dirty="0"/>
+              <a:t>The Turing Test is a computer version of that game.  In the image here, we see a Human questioner in the middle, sending questions to both a computer and another human.  The interaction is purely in the form of text and answers: the human questioner types a question, and a response is displayed.  Now the task of that person is to determine whether the thing being interrogated is a person or a computer program.</a:t>
+            </a:r>
+          </a:p>
+          <a:p>
+            <a:pPr marL="233309" indent="-233309">
+              <a:buAutoNum type="arabicPeriod"/>
+            </a:pPr>
+            <a:r>
+              <a:rPr lang="en-US" dirty="0"/>
+              <a:t>Now, suppose that the thing being interrogated is indeed a computer program, but after some reasonable amount of time, the questioners cannot reliably tell whether they are interacting with a program or a person.  Then surely, Turing argued, you should accept that the program has some sort of human level intelligence because the system is doing something that makes it </a:t>
+            </a:r>
+            <a:r>
+              <a:rPr lang="en-US" b="1" dirty="0"/>
+              <a:t>indistinguishable </a:t>
+            </a:r>
+            <a:r>
               <a:rPr lang="en-US" b="0" dirty="0"/>
-              <a:t>An early attempt at creating a conversational AI program was ELIZA.  ELIZA is a famous computer program written in the 1960’s by MIT computer scientist Joseph Weizenbaum.  The program mimics the role of a psychiatrist talking to a patient to get the interviewee to contemplate themselves.  Strangely, Weizenbaum discovered that many people preferred Eliza over a conversation with a real human-being.</a:t>
-            </a:r>
-          </a:p>
-          <a:p>
+              <a:t>from the real thing.  The key word here is indistinguishable…</a:t>
+            </a:r>
+          </a:p>
+          <a:p>
+            <a:pPr marL="233309" indent="-233309">
+              <a:buAutoNum type="arabicPeriod"/>
+            </a:pPr>
             <a:endParaRPr lang="en-US" b="0" dirty="0"/>
           </a:p>
           <a:p>
-            <a:pPr marL="0" marR="0" lvl="0" indent="0" algn="l" defTabSz="914400" rtl="0" eaLnBrk="1" fontAlgn="auto" latinLnBrk="0" hangingPunct="1">
-              <a:lnSpc>
-                <a:spcPct val="100000"/>
-              </a:lnSpc>
-              <a:spcBef>
-                <a:spcPts val="0"/>
-              </a:spcBef>
-              <a:spcAft>
-                <a:spcPts val="0"/>
-              </a:spcAft>
-              <a:buClrTx/>
-              <a:buSzTx/>
-              <a:buFontTx/>
-              <a:buNone/>
-              <a:tabLst/>
-              <a:defRPr/>
-            </a:pPr>
-            <a:r>
-              <a:rPr lang="en-US" b="0" dirty="0"/>
-              <a:t>ELIZA’s legacy lives on to this day.  In 1990, Hugh Loebner created the Loebner Prize.  Each year, the Loebner Prize invites the submission of computer programs to engage in the Turing test, attempting to convince a panel of judges that they are in fact people.  </a:t>
-            </a:r>
-          </a:p>
-          <a:p>
-            <a:endParaRPr lang="en-US" b="0" dirty="0"/>
-          </a:p>
-          <a:p>
-            <a:r>
-              <a:rPr lang="en-US" b="0" dirty="0"/>
-              <a:t>We’re going to give you time to chat with this year’s winner of the Loebner prize.  Her name is Kuki…</a:t>
-            </a:r>
-          </a:p>
-          <a:p>
-            <a:endParaRPr lang="en-US" b="0" dirty="0"/>
-          </a:p>
-          <a:p>
-            <a:r>
-              <a:rPr lang="en-US" b="0" dirty="0"/>
-              <a:t>=====</a:t>
-            </a:r>
-          </a:p>
-          <a:p>
-            <a:r>
-              <a:rPr lang="en-US" b="0" dirty="0"/>
-              <a:t>Woolridge concludes, “ELIZA is the direct ancestor of a phenomenon that makes AI researchers groan whenever it is mentioned: the internet chatbot.</a:t>
+            <a:r>
+              <a:rPr lang="en-US" dirty="0"/>
+              <a:t>https://searchenterpriseai.techtarget.com/definition/Turing-test</a:t>
             </a:r>
           </a:p>
         </p:txBody>
@@ -2016,7 +2058,7 @@
     </p:spTree>
     <p:extLst>
       <p:ext uri="{BB962C8B-B14F-4D97-AF65-F5344CB8AC3E}">
-        <p14:creationId xmlns:p14="http://schemas.microsoft.com/office/powerpoint/2010/main" val="4034031462"/>
+        <p14:creationId xmlns:p14="http://schemas.microsoft.com/office/powerpoint/2010/main" val="2968338234"/>
       </p:ext>
     </p:extLst>
   </p:cSld>
@@ -2155,6 +2197,143 @@
           <a:lstStyle/>
           <a:p>
             <a:r>
+              <a:rPr lang="en-US" b="0" dirty="0"/>
+              <a:t>An early attempt at creating a conversational AI program was ELIZA.  ELIZA is a famous computer program written in the 1960’s by MIT computer scientist Joseph Weizenbaum.  The program mimics the role of a psychiatrist talking to a patient to get the interviewee to contemplate themselves.  Strangely, Weizenbaum discovered that many people preferred Eliza over a conversation with a real human-being.</a:t>
+            </a:r>
+          </a:p>
+          <a:p>
+            <a:endParaRPr lang="en-US" b="0" dirty="0"/>
+          </a:p>
+          <a:p>
+            <a:pPr marL="0" marR="0" lvl="0" indent="0" algn="l" defTabSz="914400" rtl="0" eaLnBrk="1" fontAlgn="auto" latinLnBrk="0" hangingPunct="1">
+              <a:lnSpc>
+                <a:spcPct val="100000"/>
+              </a:lnSpc>
+              <a:spcBef>
+                <a:spcPts val="0"/>
+              </a:spcBef>
+              <a:spcAft>
+                <a:spcPts val="0"/>
+              </a:spcAft>
+              <a:buClrTx/>
+              <a:buSzTx/>
+              <a:buFontTx/>
+              <a:buNone/>
+              <a:tabLst/>
+              <a:defRPr/>
+            </a:pPr>
+            <a:r>
+              <a:rPr lang="en-US" b="0" dirty="0"/>
+              <a:t>ELIZA’s legacy lives on to this day.  In 1990, Hugh Loebner created the Loebner Prize.  Each year, the Loebner Prize invites the submission of computer programs to engage in the Turing test, attempting to convince a panel of judges that they are in fact people.  </a:t>
+            </a:r>
+          </a:p>
+          <a:p>
+            <a:endParaRPr lang="en-US" b="0" dirty="0"/>
+          </a:p>
+          <a:p>
+            <a:r>
+              <a:rPr lang="en-US" b="0" dirty="0"/>
+              <a:t>We’re going to give you time to chat with this year’s winner of the Loebner prize.  Her name is Kuki…</a:t>
+            </a:r>
+          </a:p>
+          <a:p>
+            <a:endParaRPr lang="en-US" b="0" dirty="0"/>
+          </a:p>
+          <a:p>
+            <a:r>
+              <a:rPr lang="en-US" b="0" dirty="0"/>
+              <a:t>=====</a:t>
+            </a:r>
+          </a:p>
+          <a:p>
+            <a:r>
+              <a:rPr lang="en-US" b="0" dirty="0"/>
+              <a:t>Woolridge concludes, “ELIZA is the direct ancestor of a phenomenon that makes AI researchers groan whenever it is mentioned: the internet chatbot.</a:t>
+            </a:r>
+          </a:p>
+        </p:txBody>
+      </p:sp>
+      <p:sp>
+        <p:nvSpPr>
+          <p:cNvPr id="4" name="Slide Number Placeholder 3"/>
+          <p:cNvSpPr>
+            <a:spLocks noGrp="1"/>
+          </p:cNvSpPr>
+          <p:nvPr>
+            <p:ph type="sldNum" sz="quarter" idx="5"/>
+          </p:nvPr>
+        </p:nvSpPr>
+        <p:spPr/>
+        <p:txBody>
+          <a:bodyPr/>
+          <a:lstStyle/>
+          <a:p>
+            <a:fld id="{3148858F-F1DB-4027-9C85-CCA6849540DD}" type="slidenum">
+              <a:rPr lang="en-US" smtClean="0"/>
+              <a:t>20</a:t>
+            </a:fld>
+            <a:endParaRPr lang="en-US"/>
+          </a:p>
+        </p:txBody>
+      </p:sp>
+    </p:spTree>
+    <p:extLst>
+      <p:ext uri="{BB962C8B-B14F-4D97-AF65-F5344CB8AC3E}">
+        <p14:creationId xmlns:p14="http://schemas.microsoft.com/office/powerpoint/2010/main" val="4034031462"/>
+      </p:ext>
+    </p:extLst>
+  </p:cSld>
+  <p:clrMapOvr>
+    <a:masterClrMapping/>
+  </p:clrMapOvr>
+</p:notes>
+</file>
+
+<file path=ppt/notesSlides/notesSlide21.xml><?xml version="1.0" encoding="utf-8"?>
+<p:notes xmlns:a="http://schemas.openxmlformats.org/drawingml/2006/main" xmlns:r="http://schemas.openxmlformats.org/officeDocument/2006/relationships" xmlns:p="http://schemas.openxmlformats.org/presentationml/2006/main">
+  <p:cSld>
+    <p:spTree>
+      <p:nvGrpSpPr>
+        <p:cNvPr id="1" name=""/>
+        <p:cNvGrpSpPr/>
+        <p:nvPr/>
+      </p:nvGrpSpPr>
+      <p:grpSpPr>
+        <a:xfrm>
+          <a:off x="0" y="0"/>
+          <a:ext cx="0" cy="0"/>
+          <a:chOff x="0" y="0"/>
+          <a:chExt cx="0" cy="0"/>
+        </a:xfrm>
+      </p:grpSpPr>
+      <p:sp>
+        <p:nvSpPr>
+          <p:cNvPr id="2" name="Slide Image Placeholder 1"/>
+          <p:cNvSpPr>
+            <a:spLocks noGrp="1" noRot="1" noChangeAspect="1"/>
+          </p:cNvSpPr>
+          <p:nvPr>
+            <p:ph type="sldImg"/>
+          </p:nvPr>
+        </p:nvSpPr>
+        <p:spPr/>
+      </p:sp>
+      <p:sp>
+        <p:nvSpPr>
+          <p:cNvPr id="3" name="Notes Placeholder 2"/>
+          <p:cNvSpPr>
+            <a:spLocks noGrp="1"/>
+          </p:cNvSpPr>
+          <p:nvPr>
+            <p:ph type="body" idx="1"/>
+          </p:nvPr>
+        </p:nvSpPr>
+        <p:spPr/>
+        <p:txBody>
+          <a:bodyPr/>
+          <a:lstStyle/>
+          <a:p>
+            <a:r>
               <a:rPr lang="en-US" dirty="0">
                 <a:latin typeface="Palatino Linotype" panose="02040502050505030304" pitchFamily="18" charset="0"/>
                 <a:ea typeface="Calibri" panose="020F0502020204030204" pitchFamily="34" charset="0"/>
@@ -2192,7 +2371,7 @@
           <a:p>
             <a:fld id="{3148858F-F1DB-4027-9C85-CCA6849540DD}" type="slidenum">
               <a:rPr lang="en-US" smtClean="0"/>
-              <a:t>20</a:t>
+              <a:t>21</a:t>
             </a:fld>
             <a:endParaRPr lang="en-US"/>
           </a:p>
@@ -2697,131 +2876,96 @@
           <a:bodyPr/>
           <a:lstStyle/>
           <a:p>
-            <a:pPr marL="233309" indent="-233309">
+            <a:pPr marL="0" indent="0">
+              <a:buNone/>
+            </a:pPr>
+            <a:r>
+              <a:rPr lang="en-US" b="1" i="0" dirty="0">
+                <a:solidFill>
+                  <a:srgbClr val="292929"/>
+                </a:solidFill>
+                <a:effectLst/>
+                <a:latin typeface="source-serif-pro"/>
+              </a:rPr>
+              <a:t>ILSVRC</a:t>
+            </a:r>
+            <a:r>
+              <a:rPr lang="en-US" b="0" i="0" dirty="0">
+                <a:solidFill>
+                  <a:srgbClr val="292929"/>
+                </a:solidFill>
+                <a:effectLst/>
+                <a:latin typeface="source-serif-pro"/>
+              </a:rPr>
+              <a:t>: Large Scale Visual Recognition Challenge  - uses the famous ImageNet dataset – 14 million labelled images.</a:t>
+            </a:r>
+            <a:endParaRPr lang="en-US" b="1" i="0" dirty="0">
+              <a:solidFill>
+                <a:srgbClr val="292929"/>
+              </a:solidFill>
+              <a:effectLst/>
+              <a:latin typeface="source-serif-pro"/>
+            </a:endParaRPr>
+          </a:p>
+          <a:p>
+            <a:pPr marL="0" indent="0">
+              <a:buNone/>
+            </a:pPr>
+            <a:endParaRPr lang="en-US" b="0" i="0" dirty="0">
+              <a:solidFill>
+                <a:srgbClr val="292929"/>
+              </a:solidFill>
+              <a:effectLst/>
+              <a:latin typeface="source-serif-pro"/>
+            </a:endParaRPr>
+          </a:p>
+          <a:p>
+            <a:pPr marL="228600" indent="-228600">
               <a:buAutoNum type="arabicPeriod"/>
             </a:pPr>
             <a:r>
-              <a:rPr lang="en-US" dirty="0"/>
-              <a:t>1</a:t>
-            </a:r>
-            <a:r>
-              <a:rPr lang="en-US" baseline="30000" dirty="0"/>
-              <a:t>st</a:t>
-            </a:r>
-            <a:r>
-              <a:rPr lang="en-US" dirty="0"/>
-              <a:t> AI winter: mid-1970’s – Marvin Minsky &amp; Seymour Papert argue in their book </a:t>
-            </a:r>
-            <a:r>
-              <a:rPr lang="en-US" i="1" dirty="0"/>
-              <a:t>(Perceptron) </a:t>
-            </a:r>
-            <a:r>
-              <a:rPr lang="en-US" dirty="0"/>
-              <a:t>that neural networks are a dead-end.</a:t>
-            </a:r>
-          </a:p>
-          <a:p>
-            <a:pPr marL="233309" indent="-233309">
+              <a:rPr lang="en-US" b="0" i="0" dirty="0">
+                <a:solidFill>
+                  <a:srgbClr val="292929"/>
+                </a:solidFill>
+                <a:effectLst/>
+                <a:latin typeface="source-serif-pro"/>
+              </a:rPr>
+              <a:t>The deep neural network breakthrough happened in 2012 – a roughly 10% decrease in image classification error (from 25.8% in 2011 to 16.4% in 2012).</a:t>
+            </a:r>
+          </a:p>
+          <a:p>
+            <a:pPr marL="228600" indent="-228600">
               <a:buAutoNum type="arabicPeriod"/>
             </a:pPr>
             <a:r>
-              <a:rPr lang="en-US" dirty="0"/>
-              <a:t>2</a:t>
-            </a:r>
-            <a:r>
-              <a:rPr lang="en-US" baseline="30000" dirty="0"/>
-              <a:t>nd</a:t>
-            </a:r>
-            <a:r>
-              <a:rPr lang="en-US" dirty="0"/>
-              <a:t> AI winter: early-1990’s – expert systems fail – too difficult to construct and maintain</a:t>
+              <a:rPr lang="en-US" b="0" i="0" dirty="0">
+                <a:solidFill>
+                  <a:srgbClr val="292929"/>
+                </a:solidFill>
+                <a:effectLst/>
+                <a:latin typeface="source-serif-pro"/>
+              </a:rPr>
+              <a:t>In 2015, state-of-the-art deep learning algorithms surpassed human level performance for image classification (5.1%) with an accuracy of 3.57%.</a:t>
+            </a:r>
+          </a:p>
+          <a:p>
+            <a:pPr marL="228600" indent="-228600">
+              <a:buAutoNum type="arabicPeriod"/>
+            </a:pPr>
+            <a:r>
+              <a:rPr lang="en-US" b="0" i="0" dirty="0">
+                <a:solidFill>
+                  <a:srgbClr val="292929"/>
+                </a:solidFill>
+                <a:effectLst/>
+                <a:latin typeface="source-serif-pro"/>
+              </a:rPr>
+              <a:t>Overall, the introduction of deep neural networks resulted in a 10-fold reduction in image classification error (from 25.8% in 2011 to 2.3% in 2017).</a:t>
             </a:r>
           </a:p>
           <a:p>
             <a:endParaRPr lang="en-US" dirty="0"/>
-          </a:p>
-          <a:p>
-            <a:r>
-              <a:rPr lang="en-US" dirty="0"/>
-              <a:t>Hype is the problem.  It’s about over-promising and under-delivering.  But here are some key points:</a:t>
-            </a:r>
-          </a:p>
-          <a:p>
-            <a:endParaRPr lang="en-US" dirty="0"/>
-          </a:p>
-          <a:p>
-            <a:pPr marL="174982" indent="-174982" hangingPunct="0">
-              <a:spcAft>
-                <a:spcPts val="1470"/>
-              </a:spcAft>
-              <a:buSzPct val="45000"/>
-              <a:buFont typeface="Courier New" panose="02070309020205020404" pitchFamily="49" charset="0"/>
-              <a:buChar char="o"/>
-            </a:pPr>
-            <a:r>
-              <a:rPr lang="en-US" dirty="0">
-                <a:latin typeface="Arial" pitchFamily="34"/>
-                <a:ea typeface="Arial" pitchFamily="34"/>
-                <a:cs typeface="Arial" pitchFamily="34"/>
-              </a:rPr>
-              <a:t> AI is seductive</a:t>
-            </a:r>
-          </a:p>
-          <a:p>
-            <a:pPr marL="174982" indent="-174982" hangingPunct="0">
-              <a:spcAft>
-                <a:spcPts val="1470"/>
-              </a:spcAft>
-              <a:buSzPct val="45000"/>
-              <a:buFont typeface="Courier New" panose="02070309020205020404" pitchFamily="49" charset="0"/>
-              <a:buChar char="o"/>
-            </a:pPr>
-            <a:r>
-              <a:rPr lang="en-US" dirty="0">
-                <a:latin typeface="Arial" pitchFamily="34"/>
-                <a:ea typeface="Arial" pitchFamily="34"/>
-                <a:cs typeface="Arial" pitchFamily="34"/>
-              </a:rPr>
-              <a:t> AI researchers have been making steady progress since the 1950s.</a:t>
-            </a:r>
-          </a:p>
-          <a:p>
-            <a:pPr marL="174982" indent="-174982" hangingPunct="0">
-              <a:spcAft>
-                <a:spcPts val="1470"/>
-              </a:spcAft>
-              <a:buSzPct val="45000"/>
-              <a:buFont typeface="Courier New" panose="02070309020205020404" pitchFamily="49" charset="0"/>
-              <a:buChar char="o"/>
-            </a:pPr>
-            <a:r>
-              <a:rPr lang="en-US" dirty="0">
-                <a:latin typeface="Arial" pitchFamily="34"/>
-                <a:ea typeface="Arial" pitchFamily="34"/>
-                <a:cs typeface="Arial" pitchFamily="34"/>
-              </a:rPr>
-              <a:t> AI winters aren’t really about AI failures per se.  AI technologies, including many “failures” are still widely used today.</a:t>
-            </a:r>
-          </a:p>
-          <a:p>
-            <a:pPr hangingPunct="0">
-              <a:spcAft>
-                <a:spcPts val="1470"/>
-              </a:spcAft>
-              <a:buSzPct val="45000"/>
-            </a:pPr>
-            <a:endParaRPr lang="en-US" dirty="0">
-              <a:latin typeface="Arial" pitchFamily="34"/>
-              <a:ea typeface="Arial" pitchFamily="34"/>
-              <a:cs typeface="Arial" pitchFamily="34"/>
-            </a:endParaRPr>
-          </a:p>
-          <a:p>
-            <a:r>
-              <a:rPr lang="en-US" dirty="0"/>
-              <a:t>Now for definitions…</a:t>
-            </a:r>
           </a:p>
         </p:txBody>
       </p:sp>
@@ -2851,7 +2995,7 @@
     </p:spTree>
     <p:extLst>
       <p:ext uri="{BB962C8B-B14F-4D97-AF65-F5344CB8AC3E}">
-        <p14:creationId xmlns:p14="http://schemas.microsoft.com/office/powerpoint/2010/main" val="1181104308"/>
+        <p14:creationId xmlns:p14="http://schemas.microsoft.com/office/powerpoint/2010/main" val="783379170"/>
       </p:ext>
     </p:extLst>
   </p:cSld>
@@ -2905,143 +3049,146 @@
           <a:bodyPr/>
           <a:lstStyle/>
           <a:p>
-            <a:pPr marL="233309" indent="-233309" defTabSz="933237">
-              <a:buFontTx/>
+            <a:pPr marL="0" indent="0">
+              <a:buNone/>
+            </a:pPr>
+            <a:r>
+              <a:rPr lang="en-US" dirty="0"/>
+              <a:t>Although deep learning has been on a tear since 2010, that has not always been the case for the field as a whole.</a:t>
+            </a:r>
+          </a:p>
+          <a:p>
+            <a:pPr marL="0" indent="0">
+              <a:buNone/>
+            </a:pPr>
+            <a:endParaRPr lang="en-US" dirty="0"/>
+          </a:p>
+          <a:p>
+            <a:pPr marL="233309" indent="-233309">
               <a:buAutoNum type="arabicPeriod"/>
-              <a:defRPr/>
             </a:pPr>
             <a:r>
-              <a:rPr lang="en-US" b="0" i="0" dirty="0">
-                <a:solidFill>
-                  <a:srgbClr val="202122"/>
-                </a:solidFill>
-                <a:effectLst/>
-                <a:latin typeface="Arial" panose="020B0604020202020204" pitchFamily="34" charset="0"/>
+              <a:rPr lang="en-US" dirty="0"/>
+              <a:t>1</a:t>
+            </a:r>
+            <a:r>
+              <a:rPr lang="en-US" baseline="30000" dirty="0"/>
+              <a:t>st</a:t>
+            </a:r>
+            <a:r>
+              <a:rPr lang="en-US" dirty="0"/>
+              <a:t> AI winter: mid-1970’s – Marvin Minsky &amp; Seymour Papert argue in their book </a:t>
+            </a:r>
+            <a:r>
+              <a:rPr lang="en-US" i="1" dirty="0"/>
+              <a:t>(Perceptron) </a:t>
+            </a:r>
+            <a:r>
+              <a:rPr lang="en-US" dirty="0"/>
+              <a:t>that neural networks are a dead-end.</a:t>
+            </a:r>
+          </a:p>
+          <a:p>
+            <a:pPr marL="233309" indent="-233309">
+              <a:buAutoNum type="arabicPeriod"/>
+            </a:pPr>
+            <a:r>
+              <a:rPr lang="en-US" dirty="0"/>
+              <a:t>2</a:t>
+            </a:r>
+            <a:r>
+              <a:rPr lang="en-US" baseline="30000" dirty="0"/>
+              <a:t>nd</a:t>
+            </a:r>
+            <a:r>
+              <a:rPr lang="en-US" dirty="0"/>
+              <a:t> AI winter: early-1990’s – expert systems fail – too difficult to construct and maintain</a:t>
+            </a:r>
+          </a:p>
+          <a:p>
+            <a:endParaRPr lang="en-US" dirty="0"/>
+          </a:p>
+          <a:p>
+            <a:r>
+              <a:rPr lang="en-US" dirty="0"/>
+              <a:t>Hype is the problem.  It’s about over-promising and under-delivering.  But here are some key points:</a:t>
+            </a:r>
+          </a:p>
+          <a:p>
+            <a:endParaRPr lang="en-US" dirty="0"/>
+          </a:p>
+          <a:p>
+            <a:pPr marL="174982" indent="-174982" hangingPunct="0">
+              <a:spcAft>
+                <a:spcPts val="1470"/>
+              </a:spcAft>
+              <a:buSzPct val="45000"/>
+              <a:buFont typeface="Courier New" panose="02070309020205020404" pitchFamily="49" charset="0"/>
+              <a:buChar char="o"/>
+            </a:pPr>
+            <a:r>
+              <a:rPr lang="en-US" dirty="0">
+                <a:latin typeface="Arial" pitchFamily="34"/>
+                <a:ea typeface="Arial" pitchFamily="34"/>
+                <a:cs typeface="Arial" pitchFamily="34"/>
               </a:rPr>
-              <a:t>Leading AI textbooks define the field of Artificial Intelligence as the study of “intelligent or rational agents” – any system that perceives its environment and takes actions that maximize its chance of achieving its goals.</a:t>
-            </a:r>
-          </a:p>
-          <a:p>
-            <a:pPr marL="233309" indent="-233309" defTabSz="933237">
-              <a:buFontTx/>
-              <a:buAutoNum type="arabicPeriod"/>
-              <a:defRPr/>
+              <a:t> AI is seductive</a:t>
+            </a:r>
+          </a:p>
+          <a:p>
+            <a:pPr marL="174982" indent="-174982" hangingPunct="0">
+              <a:spcAft>
+                <a:spcPts val="1470"/>
+              </a:spcAft>
+              <a:buSzPct val="45000"/>
+              <a:buFont typeface="Courier New" panose="02070309020205020404" pitchFamily="49" charset="0"/>
+              <a:buChar char="o"/>
             </a:pPr>
             <a:r>
-              <a:rPr lang="en-US" b="0" i="0" dirty="0">
-                <a:solidFill>
-                  <a:srgbClr val="202122"/>
-                </a:solidFill>
-                <a:effectLst/>
-                <a:latin typeface="Arial" panose="020B0604020202020204" pitchFamily="34" charset="0"/>
+              <a:rPr lang="en-US" dirty="0">
+                <a:latin typeface="Arial" pitchFamily="34"/>
+                <a:ea typeface="Arial" pitchFamily="34"/>
+                <a:cs typeface="Arial" pitchFamily="34"/>
               </a:rPr>
-              <a:t>Restatement of Russell &amp; Norvig’s definition – </a:t>
-            </a:r>
-            <a:r>
-              <a:rPr lang="en-US" b="0" i="1" dirty="0">
-                <a:solidFill>
-                  <a:srgbClr val="202122"/>
-                </a:solidFill>
-                <a:effectLst/>
-                <a:latin typeface="Arial" panose="020B0604020202020204" pitchFamily="34" charset="0"/>
+              <a:t> AI researchers have been making steady progress since the 1950s.</a:t>
+            </a:r>
+          </a:p>
+          <a:p>
+            <a:pPr marL="174982" indent="-174982" hangingPunct="0">
+              <a:spcAft>
+                <a:spcPts val="1470"/>
+              </a:spcAft>
+              <a:buSzPct val="45000"/>
+              <a:buFont typeface="Courier New" panose="02070309020205020404" pitchFamily="49" charset="0"/>
+              <a:buChar char="o"/>
+            </a:pPr>
+            <a:r>
+              <a:rPr lang="en-US" dirty="0">
+                <a:latin typeface="Arial" pitchFamily="34"/>
+                <a:ea typeface="Arial" pitchFamily="34"/>
+                <a:cs typeface="Arial" pitchFamily="34"/>
               </a:rPr>
-              <a:t>Artificial Intelligence: A Modern Approach</a:t>
-            </a:r>
-            <a:r>
-              <a:rPr lang="en-US" b="0" i="0" dirty="0">
-                <a:solidFill>
-                  <a:srgbClr val="202122"/>
-                </a:solidFill>
-                <a:effectLst/>
-                <a:latin typeface="Arial" panose="020B0604020202020204" pitchFamily="34" charset="0"/>
-              </a:rPr>
-              <a:t>, 2</a:t>
-            </a:r>
-            <a:r>
-              <a:rPr lang="en-US" b="0" i="0" baseline="30000" dirty="0">
-                <a:solidFill>
-                  <a:srgbClr val="202122"/>
-                </a:solidFill>
-                <a:effectLst/>
-                <a:latin typeface="Arial" panose="020B0604020202020204" pitchFamily="34" charset="0"/>
-              </a:rPr>
-              <a:t>nd</a:t>
-            </a:r>
-            <a:r>
-              <a:rPr lang="en-US" b="0" i="0" dirty="0">
-                <a:solidFill>
-                  <a:srgbClr val="202122"/>
-                </a:solidFill>
-                <a:effectLst/>
-                <a:latin typeface="Arial" panose="020B0604020202020204" pitchFamily="34" charset="0"/>
-              </a:rPr>
-              <a:t> edition – most widely used introductory text.</a:t>
-            </a:r>
-          </a:p>
-          <a:p>
-            <a:pPr marL="233309" indent="-233309" defTabSz="933237">
-              <a:buFontTx/>
-              <a:buAutoNum type="arabicPeriod"/>
-              <a:defRPr/>
+              <a:t> AI winters aren’t really about AI failures per se.  AI technologies, including many “failures” are still widely used today.</a:t>
+            </a:r>
+          </a:p>
+          <a:p>
+            <a:pPr hangingPunct="0">
+              <a:spcAft>
+                <a:spcPts val="1470"/>
+              </a:spcAft>
+              <a:buSzPct val="45000"/>
             </a:pPr>
-            <a:r>
-              <a:rPr lang="en-US" b="0" i="0" dirty="0">
-                <a:solidFill>
-                  <a:srgbClr val="202122"/>
-                </a:solidFill>
-                <a:effectLst/>
-                <a:latin typeface="Arial" panose="020B0604020202020204" pitchFamily="34" charset="0"/>
-              </a:rPr>
-              <a:t>AI system performance = humans in many cases.  </a:t>
-            </a:r>
-          </a:p>
-          <a:p>
-            <a:pPr marL="233309" indent="-233309" defTabSz="933237">
-              <a:buFontTx/>
-              <a:buAutoNum type="arabicPeriod"/>
-              <a:defRPr/>
-            </a:pPr>
-            <a:r>
-              <a:rPr lang="en-US" b="0" i="0" dirty="0">
-                <a:solidFill>
-                  <a:srgbClr val="202122"/>
-                </a:solidFill>
-                <a:effectLst/>
-                <a:latin typeface="Arial" panose="020B0604020202020204" pitchFamily="34" charset="0"/>
-              </a:rPr>
-              <a:t>Broad array of applications.</a:t>
-            </a:r>
-          </a:p>
-          <a:p>
-            <a:endParaRPr lang="en-US" dirty="0"/>
+            <a:endParaRPr lang="en-US" dirty="0">
+              <a:latin typeface="Arial" pitchFamily="34"/>
+              <a:ea typeface="Arial" pitchFamily="34"/>
+              <a:cs typeface="Arial" pitchFamily="34"/>
+            </a:endParaRPr>
           </a:p>
           <a:p>
             <a:r>
               <a:rPr lang="en-US" dirty="0"/>
-              <a:t>=====</a:t>
-            </a:r>
-          </a:p>
-          <a:p>
-            <a:pPr defTabSz="933237">
-              <a:defRPr/>
-            </a:pPr>
-            <a:r>
-              <a:rPr lang="en-US" b="0" i="0" dirty="0">
-                <a:solidFill>
-                  <a:srgbClr val="202122"/>
-                </a:solidFill>
-                <a:effectLst/>
-                <a:latin typeface="Arial" panose="020B0604020202020204" pitchFamily="34" charset="0"/>
-              </a:rPr>
-              <a:t>Leading AI textbooks define the field of Artificial Intelligence as the study of “intelligent agents”: any system that perceives its environment and takes actions that maximize its chance of achieving its goals.  Such systems are now able to perform tasks humans are good at; </a:t>
-            </a:r>
-            <a:r>
-              <a:rPr lang="en-US" dirty="0"/>
-              <a:t>for example, recognizing objects, making sense of speech, and decision making in a constrained environment.  As our computer programs have become more sophisticated, our ideas of which tasks require human intelligence have evolved. Thus, AI is now used in a wide variety of tasks.</a:t>
-            </a:r>
-          </a:p>
-          <a:p>
-            <a:endParaRPr lang="en-US" dirty="0"/>
+              <a:t>Now for definitions…</a:t>
+            </a:r>
           </a:p>
         </p:txBody>
       </p:sp>
@@ -3071,7 +3218,7 @@
     </p:spTree>
     <p:extLst>
       <p:ext uri="{BB962C8B-B14F-4D97-AF65-F5344CB8AC3E}">
-        <p14:creationId xmlns:p14="http://schemas.microsoft.com/office/powerpoint/2010/main" val="4120710171"/>
+        <p14:creationId xmlns:p14="http://schemas.microsoft.com/office/powerpoint/2010/main" val="1181104308"/>
       </p:ext>
     </p:extLst>
   </p:cSld>
@@ -3125,38 +3272,9 @@
           <a:bodyPr/>
           <a:lstStyle/>
           <a:p>
-            <a:r>
-              <a:rPr lang="en-US" dirty="0"/>
-              <a:t>… and here’s a definition of machine learning coined by Arthur Samuel in 1959.  This is concise and one of my personal favorites.  However, I also like this second definition: </a:t>
-            </a:r>
-            <a:r>
-              <a:rPr lang="en-US" i="1" dirty="0"/>
-              <a:t>Machine learning is the science (and art) of programming computers so they can learn from data</a:t>
-            </a:r>
-            <a:r>
-              <a:rPr lang="en-US" dirty="0"/>
-              <a:t>.  Now, the key word in that second definition is </a:t>
-            </a:r>
-            <a:r>
-              <a:rPr lang="en-US" b="1" dirty="0"/>
-              <a:t>data</a:t>
-            </a:r>
-            <a:r>
-              <a:rPr lang="en-US" dirty="0"/>
-              <a:t>.  In fact, deep learning is not possible without data.</a:t>
-            </a:r>
-          </a:p>
-          <a:p>
-            <a:endParaRPr lang="en-US" dirty="0"/>
-          </a:p>
-          <a:p>
-            <a:r>
-              <a:rPr lang="en-US" dirty="0"/>
-              <a:t>=====</a:t>
-            </a:r>
-          </a:p>
-          <a:p>
-            <a:pPr defTabSz="933237">
+            <a:pPr marL="233309" indent="-233309" defTabSz="933237">
+              <a:buFontTx/>
+              <a:buAutoNum type="arabicPeriod"/>
               <a:defRPr/>
             </a:pPr>
             <a:r>
@@ -3167,21 +3285,127 @@
                 <a:effectLst/>
                 <a:latin typeface="Arial" panose="020B0604020202020204" pitchFamily="34" charset="0"/>
               </a:rPr>
-              <a:t>Machine Learning </a:t>
-            </a:r>
+              <a:t>Leading AI textbooks define the field of Artificial Intelligence as the study of “intelligent or rational agents” – any system that perceives its environment and takes actions that maximize its chance of achieving its goals.</a:t>
+            </a:r>
+          </a:p>
+          <a:p>
+            <a:pPr marL="233309" indent="-233309" defTabSz="933237">
+              <a:buFontTx/>
+              <a:buAutoNum type="arabicPeriod"/>
+              <a:defRPr/>
+            </a:pPr>
             <a:r>
               <a:rPr lang="en-US" b="0" i="0" dirty="0">
                 <a:solidFill>
-                  <a:srgbClr val="000000"/>
+                  <a:srgbClr val="202122"/>
                 </a:solidFill>
                 <a:effectLst/>
-                <a:latin typeface="DINPro"/>
+                <a:latin typeface="Arial" panose="020B0604020202020204" pitchFamily="34" charset="0"/>
               </a:rPr>
-              <a:t>algorithms parse data, learn from it, and then make a prediction about something in the world. So rather than hand-coding software routines with a specific set of instructions to accomplish a particular task, the machine is “trained” using large amounts of data and algorithms that give it the ability to learn how to perform the task.</a:t>
+              <a:t>Restatement of Russell &amp; Norvig’s definition – </a:t>
+            </a:r>
+            <a:r>
+              <a:rPr lang="en-US" b="0" i="1" dirty="0">
+                <a:solidFill>
+                  <a:srgbClr val="202122"/>
+                </a:solidFill>
+                <a:effectLst/>
+                <a:latin typeface="Arial" panose="020B0604020202020204" pitchFamily="34" charset="0"/>
+              </a:rPr>
+              <a:t>Artificial Intelligence: A Modern Approach</a:t>
+            </a:r>
+            <a:r>
+              <a:rPr lang="en-US" b="0" i="0" dirty="0">
+                <a:solidFill>
+                  <a:srgbClr val="202122"/>
+                </a:solidFill>
+                <a:effectLst/>
+                <a:latin typeface="Arial" panose="020B0604020202020204" pitchFamily="34" charset="0"/>
+              </a:rPr>
+              <a:t>, 2</a:t>
+            </a:r>
+            <a:r>
+              <a:rPr lang="en-US" b="0" i="0" baseline="30000" dirty="0">
+                <a:solidFill>
+                  <a:srgbClr val="202122"/>
+                </a:solidFill>
+                <a:effectLst/>
+                <a:latin typeface="Arial" panose="020B0604020202020204" pitchFamily="34" charset="0"/>
+              </a:rPr>
+              <a:t>nd</a:t>
+            </a:r>
+            <a:r>
+              <a:rPr lang="en-US" b="0" i="0" dirty="0">
+                <a:solidFill>
+                  <a:srgbClr val="202122"/>
+                </a:solidFill>
+                <a:effectLst/>
+                <a:latin typeface="Arial" panose="020B0604020202020204" pitchFamily="34" charset="0"/>
+              </a:rPr>
+              <a:t> edition – most widely used introductory text.</a:t>
+            </a:r>
+          </a:p>
+          <a:p>
+            <a:pPr marL="233309" indent="-233309" defTabSz="933237">
+              <a:buFontTx/>
+              <a:buAutoNum type="arabicPeriod"/>
+              <a:defRPr/>
+            </a:pPr>
+            <a:r>
+              <a:rPr lang="en-US" b="0" i="0" dirty="0">
+                <a:solidFill>
+                  <a:srgbClr val="202122"/>
+                </a:solidFill>
+                <a:effectLst/>
+                <a:latin typeface="Arial" panose="020B0604020202020204" pitchFamily="34" charset="0"/>
+              </a:rPr>
+              <a:t>AI system performance = humans in many cases.  </a:t>
+            </a:r>
+          </a:p>
+          <a:p>
+            <a:pPr marL="233309" indent="-233309" defTabSz="933237">
+              <a:buFontTx/>
+              <a:buAutoNum type="arabicPeriod"/>
+              <a:defRPr/>
+            </a:pPr>
+            <a:r>
+              <a:rPr lang="en-US" b="0" i="0" dirty="0">
+                <a:solidFill>
+                  <a:srgbClr val="202122"/>
+                </a:solidFill>
+                <a:effectLst/>
+                <a:latin typeface="Arial" panose="020B0604020202020204" pitchFamily="34" charset="0"/>
+              </a:rPr>
+              <a:t>Broad array of applications.</a:t>
             </a:r>
           </a:p>
           <a:p>
             <a:endParaRPr lang="en-US" dirty="0"/>
+          </a:p>
+          <a:p>
+            <a:r>
+              <a:rPr lang="en-US" dirty="0"/>
+              <a:t>=====</a:t>
+            </a:r>
+          </a:p>
+          <a:p>
+            <a:pPr defTabSz="933237">
+              <a:defRPr/>
+            </a:pPr>
+            <a:r>
+              <a:rPr lang="en-US" b="0" i="0" dirty="0">
+                <a:solidFill>
+                  <a:srgbClr val="202122"/>
+                </a:solidFill>
+                <a:effectLst/>
+                <a:latin typeface="Arial" panose="020B0604020202020204" pitchFamily="34" charset="0"/>
+              </a:rPr>
+              <a:t>Leading AI textbooks define the field of Artificial Intelligence as the study of “intelligent agents”: any system that perceives its environment and takes actions that maximize its chance of achieving its goals.  Such systems are now able to perform tasks humans are good at; </a:t>
+            </a:r>
+            <a:r>
+              <a:rPr lang="en-US" dirty="0"/>
+              <a:t>for example, recognizing objects, making sense of speech, and decision making in a constrained environment.  As our computer programs have become more sophisticated, our ideas of which tasks require human intelligence have evolved. Thus, AI is now used in a wide variety of tasks.</a:t>
+            </a:r>
           </a:p>
           <a:p>
             <a:endParaRPr lang="en-US" dirty="0"/>
@@ -3214,7 +3438,7 @@
     </p:spTree>
     <p:extLst>
       <p:ext uri="{BB962C8B-B14F-4D97-AF65-F5344CB8AC3E}">
-        <p14:creationId xmlns:p14="http://schemas.microsoft.com/office/powerpoint/2010/main" val="2710535571"/>
+        <p14:creationId xmlns:p14="http://schemas.microsoft.com/office/powerpoint/2010/main" val="4120710171"/>
       </p:ext>
     </p:extLst>
   </p:cSld>
@@ -3268,95 +3492,60 @@
           <a:bodyPr/>
           <a:lstStyle/>
           <a:p>
-            <a:pPr marL="233309" indent="-233309">
-              <a:buAutoNum type="arabicPeriod"/>
-            </a:pPr>
             <a:r>
               <a:rPr lang="en-US" dirty="0"/>
-              <a:t>Again, deep learning is a subfield of machine learning with a focus on </a:t>
+              <a:t>… and here’s a definition of machine learning coined by Arthur Samuel in 1959.  This is concise and one of my personal favorites.  However, I also like this second definition: </a:t>
+            </a:r>
+            <a:r>
+              <a:rPr lang="en-US" i="1" dirty="0"/>
+              <a:t>Machine learning is the science (and art) of programming computers so they can learn from data</a:t>
+            </a:r>
+            <a:r>
+              <a:rPr lang="en-US" dirty="0"/>
+              <a:t>.  Now, the key word in that second definition is </a:t>
             </a:r>
             <a:r>
               <a:rPr lang="en-US" b="1" dirty="0"/>
-              <a:t>neural networks</a:t>
-            </a:r>
-          </a:p>
-          <a:p>
-            <a:pPr marL="233309" indent="-233309">
-              <a:buAutoNum type="arabicPeriod"/>
-            </a:pPr>
+              <a:t>data</a:t>
+            </a:r>
             <a:r>
               <a:rPr lang="en-US" dirty="0"/>
-              <a:t>A neural network is a special type of learning algorithm, inspired by the billions of interconnected neurons in the human brain.</a:t>
-            </a:r>
-          </a:p>
-          <a:p>
-            <a:pPr marL="233309" indent="-233309">
-              <a:buAutoNum type="arabicPeriod"/>
-            </a:pPr>
-            <a:r>
-              <a:rPr lang="en-US" dirty="0"/>
-              <a:t>In a NN, neurons are grouped together in layers – image of a multi-layered cake – if you have many layers, the cake is “deep” when viewed from above.</a:t>
-            </a:r>
-          </a:p>
-          <a:p>
-            <a:pPr marL="233309" indent="-233309">
-              <a:buAutoNum type="arabicPeriod"/>
-            </a:pPr>
+              <a:t>.  In fact, deep learning is not possible without data.</a:t>
+            </a:r>
+          </a:p>
+          <a:p>
             <a:endParaRPr lang="en-US" dirty="0"/>
           </a:p>
           <a:p>
-            <a:pPr marL="0" indent="0">
-              <a:buNone/>
-            </a:pPr>
             <a:r>
               <a:rPr lang="en-US" dirty="0"/>
               <a:t>=====</a:t>
             </a:r>
           </a:p>
           <a:p>
-            <a:pPr marL="0" indent="0">
-              <a:buNone/>
+            <a:pPr defTabSz="933237">
+              <a:defRPr/>
             </a:pPr>
             <a:r>
-              <a:rPr lang="en-US" dirty="0"/>
-              <a:t>Since 2010, deep learning became possible because:</a:t>
-            </a:r>
-          </a:p>
-          <a:p>
-            <a:pPr marL="699927" lvl="1" indent="-233309">
-              <a:buAutoNum type="arabicPeriod"/>
-            </a:pPr>
-            <a:r>
-              <a:rPr lang="en-US" dirty="0"/>
-              <a:t>Enhanced hardware – GPUs from Nvidia and other suppliers</a:t>
-            </a:r>
-          </a:p>
-          <a:p>
-            <a:pPr marL="699927" lvl="1" indent="-233309">
-              <a:buAutoNum type="arabicPeriod"/>
-            </a:pPr>
-            <a:r>
-              <a:rPr lang="en-US" dirty="0"/>
-              <a:t>Open AI software frameworks – Tensorflow, Pytorch, Keras, etc…</a:t>
-            </a:r>
-          </a:p>
-          <a:p>
-            <a:pPr marL="699927" lvl="1" indent="-233309">
-              <a:buAutoNum type="arabicPeriod"/>
-            </a:pPr>
-            <a:r>
-              <a:rPr lang="en-US" dirty="0"/>
-              <a:t>Big Data</a:t>
-            </a:r>
-          </a:p>
-          <a:p>
-            <a:pPr marL="233309" indent="-233309">
-              <a:buAutoNum type="arabicPeriod"/>
-            </a:pPr>
-            <a:endParaRPr lang="en-US" dirty="0"/>
-          </a:p>
-          <a:p>
-            <a:endParaRPr lang="en-US" dirty="0"/>
+              <a:rPr lang="en-US" b="0" i="0" dirty="0">
+                <a:solidFill>
+                  <a:srgbClr val="202122"/>
+                </a:solidFill>
+                <a:effectLst/>
+                <a:latin typeface="Arial" panose="020B0604020202020204" pitchFamily="34" charset="0"/>
+              </a:rPr>
+              <a:t>Machine Learning </a:t>
+            </a:r>
+            <a:r>
+              <a:rPr lang="en-US" b="0" i="0" dirty="0">
+                <a:solidFill>
+                  <a:srgbClr val="000000"/>
+                </a:solidFill>
+                <a:effectLst/>
+                <a:latin typeface="DINPro"/>
+              </a:rPr>
+              <a:t>algorithms parse data, learn from it, and then make a prediction about something in the world. So rather than hand-coding software routines with a specific set of instructions to accomplish a particular task, the machine is “trained” using large amounts of data and algorithms that give it the ability to learn how to perform the task.</a:t>
+            </a:r>
           </a:p>
           <a:p>
             <a:endParaRPr lang="en-US" dirty="0"/>
@@ -3392,7 +3581,7 @@
     </p:spTree>
     <p:extLst>
       <p:ext uri="{BB962C8B-B14F-4D97-AF65-F5344CB8AC3E}">
-        <p14:creationId xmlns:p14="http://schemas.microsoft.com/office/powerpoint/2010/main" val="658380389"/>
+        <p14:creationId xmlns:p14="http://schemas.microsoft.com/office/powerpoint/2010/main" val="2710535571"/>
       </p:ext>
     </p:extLst>
   </p:cSld>
@@ -3549,7 +3738,7 @@
           <a:p>
             <a:fld id="{C3F78080-8D0A-4BE8-A5B4-CB115102D524}" type="datetimeFigureOut">
               <a:rPr lang="en-US" smtClean="0"/>
-              <a:t>9/13/2022</a:t>
+              <a:t>9/23/2022</a:t>
             </a:fld>
             <a:endParaRPr lang="en-US"/>
           </a:p>
@@ -3747,7 +3936,7 @@
           <a:p>
             <a:fld id="{C3F78080-8D0A-4BE8-A5B4-CB115102D524}" type="datetimeFigureOut">
               <a:rPr lang="en-US" smtClean="0"/>
-              <a:t>9/13/2022</a:t>
+              <a:t>9/23/2022</a:t>
             </a:fld>
             <a:endParaRPr lang="en-US"/>
           </a:p>
@@ -3955,7 +4144,7 @@
           <a:p>
             <a:fld id="{C3F78080-8D0A-4BE8-A5B4-CB115102D524}" type="datetimeFigureOut">
               <a:rPr lang="en-US" smtClean="0"/>
-              <a:t>9/13/2022</a:t>
+              <a:t>9/23/2022</a:t>
             </a:fld>
             <a:endParaRPr lang="en-US"/>
           </a:p>
@@ -4153,7 +4342,7 @@
           <a:p>
             <a:fld id="{C3F78080-8D0A-4BE8-A5B4-CB115102D524}" type="datetimeFigureOut">
               <a:rPr lang="en-US" smtClean="0"/>
-              <a:t>9/13/2022</a:t>
+              <a:t>9/23/2022</a:t>
             </a:fld>
             <a:endParaRPr lang="en-US"/>
           </a:p>
@@ -4428,7 +4617,7 @@
           <a:p>
             <a:fld id="{C3F78080-8D0A-4BE8-A5B4-CB115102D524}" type="datetimeFigureOut">
               <a:rPr lang="en-US" smtClean="0"/>
-              <a:t>9/13/2022</a:t>
+              <a:t>9/23/2022</a:t>
             </a:fld>
             <a:endParaRPr lang="en-US"/>
           </a:p>
@@ -4693,7 +4882,7 @@
           <a:p>
             <a:fld id="{C3F78080-8D0A-4BE8-A5B4-CB115102D524}" type="datetimeFigureOut">
               <a:rPr lang="en-US" smtClean="0"/>
-              <a:t>9/13/2022</a:t>
+              <a:t>9/23/2022</a:t>
             </a:fld>
             <a:endParaRPr lang="en-US"/>
           </a:p>
@@ -5105,7 +5294,7 @@
           <a:p>
             <a:fld id="{C3F78080-8D0A-4BE8-A5B4-CB115102D524}" type="datetimeFigureOut">
               <a:rPr lang="en-US" smtClean="0"/>
-              <a:t>9/13/2022</a:t>
+              <a:t>9/23/2022</a:t>
             </a:fld>
             <a:endParaRPr lang="en-US"/>
           </a:p>
@@ -5246,7 +5435,7 @@
           <a:p>
             <a:fld id="{C3F78080-8D0A-4BE8-A5B4-CB115102D524}" type="datetimeFigureOut">
               <a:rPr lang="en-US" smtClean="0"/>
-              <a:t>9/13/2022</a:t>
+              <a:t>9/23/2022</a:t>
             </a:fld>
             <a:endParaRPr lang="en-US"/>
           </a:p>
@@ -5359,7 +5548,7 @@
           <a:p>
             <a:fld id="{C3F78080-8D0A-4BE8-A5B4-CB115102D524}" type="datetimeFigureOut">
               <a:rPr lang="en-US" smtClean="0"/>
-              <a:t>9/13/2022</a:t>
+              <a:t>9/23/2022</a:t>
             </a:fld>
             <a:endParaRPr lang="en-US"/>
           </a:p>
@@ -5670,7 +5859,7 @@
           <a:p>
             <a:fld id="{C3F78080-8D0A-4BE8-A5B4-CB115102D524}" type="datetimeFigureOut">
               <a:rPr lang="en-US" smtClean="0"/>
-              <a:t>9/13/2022</a:t>
+              <a:t>9/23/2022</a:t>
             </a:fld>
             <a:endParaRPr lang="en-US"/>
           </a:p>
@@ -5958,7 +6147,7 @@
           <a:p>
             <a:fld id="{C3F78080-8D0A-4BE8-A5B4-CB115102D524}" type="datetimeFigureOut">
               <a:rPr lang="en-US" smtClean="0"/>
-              <a:t>9/13/2022</a:t>
+              <a:t>9/23/2022</a:t>
             </a:fld>
             <a:endParaRPr lang="en-US"/>
           </a:p>
@@ -6199,7 +6388,7 @@
           <a:p>
             <a:fld id="{C3F78080-8D0A-4BE8-A5B4-CB115102D524}" type="datetimeFigureOut">
               <a:rPr lang="en-US" smtClean="0"/>
-              <a:t>9/13/2022</a:t>
+              <a:t>9/23/2022</a:t>
             </a:fld>
             <a:endParaRPr lang="en-US"/>
           </a:p>
@@ -6730,6 +6919,220 @@
           <a:chExt cx="0" cy="0"/>
         </a:xfrm>
       </p:grpSpPr>
+      <p:sp>
+        <p:nvSpPr>
+          <p:cNvPr id="2" name="Title 1">
+            <a:extLst>
+              <a:ext uri="{FF2B5EF4-FFF2-40B4-BE49-F238E27FC236}">
+                <a16:creationId xmlns:a16="http://schemas.microsoft.com/office/drawing/2014/main" id="{8306FF31-301F-43F0-8202-A782726E446A}"/>
+              </a:ext>
+            </a:extLst>
+          </p:cNvPr>
+          <p:cNvSpPr>
+            <a:spLocks noGrp="1"/>
+          </p:cNvSpPr>
+          <p:nvPr>
+            <p:ph type="title"/>
+          </p:nvPr>
+        </p:nvSpPr>
+        <p:spPr>
+          <a:xfrm>
+            <a:off x="618697" y="365127"/>
+            <a:ext cx="10735103" cy="827416"/>
+          </a:xfrm>
+        </p:spPr>
+        <p:txBody>
+          <a:bodyPr>
+            <a:normAutofit/>
+          </a:bodyPr>
+          <a:lstStyle/>
+          <a:p>
+            <a:pPr algn="ctr"/>
+            <a:r>
+              <a:rPr lang="en-US" sz="3600" dirty="0">
+                <a:latin typeface="Palatino Linotype" panose="02040502050505030304" pitchFamily="18" charset="0"/>
+                <a:cs typeface="Segoe UI Light" panose="020B0502040204020203" pitchFamily="34" charset="0"/>
+              </a:rPr>
+              <a:t>Deep Learning</a:t>
+            </a:r>
+          </a:p>
+        </p:txBody>
+      </p:sp>
+      <p:pic>
+        <p:nvPicPr>
+          <p:cNvPr id="1026" name="Picture 2" descr="Rainbow Layer Cake Recipe - BettyCrocker.com">
+            <a:extLst>
+              <a:ext uri="{FF2B5EF4-FFF2-40B4-BE49-F238E27FC236}">
+                <a16:creationId xmlns:a16="http://schemas.microsoft.com/office/drawing/2014/main" id="{6B01A55C-3E3D-4A68-8148-EBA141EEF8DA}"/>
+              </a:ext>
+            </a:extLst>
+          </p:cNvPr>
+          <p:cNvPicPr>
+            <a:picLocks noChangeAspect="1" noChangeArrowheads="1"/>
+          </p:cNvPicPr>
+          <p:nvPr/>
+        </p:nvPicPr>
+        <p:blipFill>
+          <a:blip r:embed="rId3">
+            <a:extLst>
+              <a:ext uri="{28A0092B-C50C-407E-A947-70E740481C1C}">
+                <a14:useLocalDpi xmlns:a14="http://schemas.microsoft.com/office/drawing/2010/main" val="0"/>
+              </a:ext>
+            </a:extLst>
+          </a:blip>
+          <a:srcRect/>
+          <a:stretch>
+            <a:fillRect/>
+          </a:stretch>
+        </p:blipFill>
+        <p:spPr bwMode="auto">
+          <a:xfrm>
+            <a:off x="3542880" y="2054605"/>
+            <a:ext cx="4886736" cy="2748789"/>
+          </a:xfrm>
+          <a:prstGeom prst="rect">
+            <a:avLst/>
+          </a:prstGeom>
+          <a:noFill/>
+          <a:ln w="6350">
+            <a:solidFill>
+              <a:schemeClr val="tx1">
+                <a:lumMod val="65000"/>
+                <a:lumOff val="35000"/>
+              </a:schemeClr>
+            </a:solidFill>
+          </a:ln>
+          <a:effectLst>
+            <a:outerShdw blurRad="50800" dist="38100" dir="2700000" algn="tl" rotWithShape="0">
+              <a:prstClr val="black">
+                <a:alpha val="40000"/>
+              </a:prstClr>
+            </a:outerShdw>
+          </a:effectLst>
+          <a:extLst>
+            <a:ext uri="{909E8E84-426E-40DD-AFC4-6F175D3DCCD1}">
+              <a14:hiddenFill xmlns:a14="http://schemas.microsoft.com/office/drawing/2010/main">
+                <a:solidFill>
+                  <a:srgbClr val="FFFFFF"/>
+                </a:solidFill>
+              </a14:hiddenFill>
+            </a:ext>
+          </a:extLst>
+        </p:spPr>
+      </p:pic>
+      <p:sp>
+        <p:nvSpPr>
+          <p:cNvPr id="4" name="TextBox 3">
+            <a:extLst>
+              <a:ext uri="{FF2B5EF4-FFF2-40B4-BE49-F238E27FC236}">
+                <a16:creationId xmlns:a16="http://schemas.microsoft.com/office/drawing/2014/main" id="{0B25E44E-8C42-4246-94DF-CC612E8605BA}"/>
+              </a:ext>
+            </a:extLst>
+          </p:cNvPr>
+          <p:cNvSpPr txBox="1"/>
+          <p:nvPr/>
+        </p:nvSpPr>
+        <p:spPr>
+          <a:xfrm>
+            <a:off x="0" y="6550223"/>
+            <a:ext cx="12192000" cy="307777"/>
+          </a:xfrm>
+          <a:prstGeom prst="rect">
+            <a:avLst/>
+          </a:prstGeom>
+          <a:noFill/>
+        </p:spPr>
+        <p:txBody>
+          <a:bodyPr wrap="square" rtlCol="0">
+            <a:spAutoFit/>
+          </a:bodyPr>
+          <a:lstStyle/>
+          <a:p>
+            <a:r>
+              <a:rPr lang="en-US" sz="1400" dirty="0">
+                <a:solidFill>
+                  <a:schemeClr val="tx1">
+                    <a:lumMod val="65000"/>
+                    <a:lumOff val="35000"/>
+                  </a:schemeClr>
+                </a:solidFill>
+                <a:latin typeface="+mj-lt"/>
+                <a:ea typeface="Verdana" panose="020B0604030504040204" pitchFamily="34" charset="0"/>
+              </a:rPr>
+              <a:t>Image Credit: </a:t>
+            </a:r>
+            <a:r>
+              <a:rPr lang="en-US" sz="1400" b="0" i="0" u="none" strike="noStrike" kern="1200" cap="none" dirty="0">
+                <a:ln>
+                  <a:noFill/>
+                </a:ln>
+                <a:solidFill>
+                  <a:schemeClr val="tx1">
+                    <a:lumMod val="65000"/>
+                    <a:lumOff val="35000"/>
+                  </a:schemeClr>
+                </a:solidFill>
+                <a:latin typeface="+mj-lt"/>
+                <a:ea typeface="Arial" pitchFamily="34"/>
+                <a:cs typeface="Arial" pitchFamily="34"/>
+              </a:rPr>
+              <a:t>https://www.bettycrocker.com/recipes/rainbow-layer-cake/4969fed8-141e-45f5-9a04-e03addd20fbb</a:t>
+            </a:r>
+            <a:endParaRPr lang="en-US" sz="1400" dirty="0">
+              <a:solidFill>
+                <a:schemeClr val="tx1">
+                  <a:lumMod val="65000"/>
+                  <a:lumOff val="35000"/>
+                </a:schemeClr>
+              </a:solidFill>
+              <a:latin typeface="+mj-lt"/>
+              <a:ea typeface="Verdana" panose="020B0604030504040204" pitchFamily="34" charset="0"/>
+            </a:endParaRPr>
+          </a:p>
+        </p:txBody>
+      </p:sp>
+    </p:spTree>
+    <p:extLst>
+      <p:ext uri="{BB962C8B-B14F-4D97-AF65-F5344CB8AC3E}">
+        <p14:creationId xmlns:p14="http://schemas.microsoft.com/office/powerpoint/2010/main" val="888845023"/>
+      </p:ext>
+    </p:extLst>
+  </p:cSld>
+  <p:clrMapOvr>
+    <a:masterClrMapping/>
+  </p:clrMapOvr>
+  <mc:AlternateContent xmlns:mc="http://schemas.openxmlformats.org/markup-compatibility/2006" xmlns:p14="http://schemas.microsoft.com/office/powerpoint/2010/main">
+    <mc:Choice Requires="p14">
+      <p:transition spd="med" p14:dur="700">
+        <p:fade/>
+      </p:transition>
+    </mc:Choice>
+    <mc:Fallback xmlns="">
+      <p:transition spd="med">
+        <p:fade/>
+      </p:transition>
+    </mc:Fallback>
+  </mc:AlternateContent>
+</p:sld>
+</file>
+
+<file path=ppt/slides/slide11.xml><?xml version="1.0" encoding="utf-8"?>
+<p:sld xmlns:a="http://schemas.openxmlformats.org/drawingml/2006/main" xmlns:r="http://schemas.openxmlformats.org/officeDocument/2006/relationships" xmlns:p="http://schemas.openxmlformats.org/presentationml/2006/main">
+  <p:cSld>
+    <p:spTree>
+      <p:nvGrpSpPr>
+        <p:cNvPr id="1" name=""/>
+        <p:cNvGrpSpPr/>
+        <p:nvPr/>
+      </p:nvGrpSpPr>
+      <p:grpSpPr>
+        <a:xfrm>
+          <a:off x="0" y="0"/>
+          <a:ext cx="0" cy="0"/>
+          <a:chOff x="0" y="0"/>
+          <a:chExt cx="0" cy="0"/>
+        </a:xfrm>
+      </p:grpSpPr>
       <p:pic>
         <p:nvPicPr>
           <p:cNvPr id="3" name="Picture 2">
@@ -6850,7 +7253,7 @@
 </p:sld>
 </file>
 
-<file path=ppt/slides/slide11.xml><?xml version="1.0" encoding="utf-8"?>
+<file path=ppt/slides/slide12.xml><?xml version="1.0" encoding="utf-8"?>
 <p:sld xmlns:a="http://schemas.openxmlformats.org/drawingml/2006/main" xmlns:r="http://schemas.openxmlformats.org/officeDocument/2006/relationships" xmlns:p="http://schemas.openxmlformats.org/presentationml/2006/main">
   <p:cSld>
     <p:spTree>
@@ -6964,7 +7367,7 @@
 </p:sld>
 </file>
 
-<file path=ppt/slides/slide12.xml><?xml version="1.0" encoding="utf-8"?>
+<file path=ppt/slides/slide13.xml><?xml version="1.0" encoding="utf-8"?>
 <p:sld xmlns:a="http://schemas.openxmlformats.org/drawingml/2006/main" xmlns:r="http://schemas.openxmlformats.org/officeDocument/2006/relationships" xmlns:p="http://schemas.openxmlformats.org/presentationml/2006/main">
   <p:cSld>
     <p:spTree>
@@ -7122,7 +7525,7 @@
 </p:sld>
 </file>
 
-<file path=ppt/slides/slide13.xml><?xml version="1.0" encoding="utf-8"?>
+<file path=ppt/slides/slide14.xml><?xml version="1.0" encoding="utf-8"?>
 <p:sld xmlns:a="http://schemas.openxmlformats.org/drawingml/2006/main" xmlns:r="http://schemas.openxmlformats.org/officeDocument/2006/relationships" xmlns:p="http://schemas.openxmlformats.org/presentationml/2006/main">
   <p:cSld>
     <p:spTree>
@@ -7862,7 +8265,7 @@
 </p:sld>
 </file>
 
-<file path=ppt/slides/slide14.xml><?xml version="1.0" encoding="utf-8"?>
+<file path=ppt/slides/slide15.xml><?xml version="1.0" encoding="utf-8"?>
 <p:sld xmlns:a="http://schemas.openxmlformats.org/drawingml/2006/main" xmlns:r="http://schemas.openxmlformats.org/officeDocument/2006/relationships" xmlns:p="http://schemas.openxmlformats.org/presentationml/2006/main">
   <p:cSld>
     <p:spTree>
@@ -8139,230 +8542,6 @@
     <p:extLst>
       <p:ext uri="{BB962C8B-B14F-4D97-AF65-F5344CB8AC3E}">
         <p14:creationId xmlns:p14="http://schemas.microsoft.com/office/powerpoint/2010/main" val="55415511"/>
-      </p:ext>
-    </p:extLst>
-  </p:cSld>
-  <p:clrMapOvr>
-    <a:masterClrMapping/>
-  </p:clrMapOvr>
-  <mc:AlternateContent xmlns:mc="http://schemas.openxmlformats.org/markup-compatibility/2006" xmlns:p14="http://schemas.microsoft.com/office/powerpoint/2010/main">
-    <mc:Choice Requires="p14">
-      <p:transition spd="med" p14:dur="700">
-        <p:fade/>
-      </p:transition>
-    </mc:Choice>
-    <mc:Fallback xmlns="">
-      <p:transition spd="med">
-        <p:fade/>
-      </p:transition>
-    </mc:Fallback>
-  </mc:AlternateContent>
-</p:sld>
-</file>
-
-<file path=ppt/slides/slide15.xml><?xml version="1.0" encoding="utf-8"?>
-<p:sld xmlns:a="http://schemas.openxmlformats.org/drawingml/2006/main" xmlns:r="http://schemas.openxmlformats.org/officeDocument/2006/relationships" xmlns:p="http://schemas.openxmlformats.org/presentationml/2006/main">
-  <p:cSld>
-    <p:spTree>
-      <p:nvGrpSpPr>
-        <p:cNvPr id="1" name=""/>
-        <p:cNvGrpSpPr/>
-        <p:nvPr/>
-      </p:nvGrpSpPr>
-      <p:grpSpPr>
-        <a:xfrm>
-          <a:off x="0" y="0"/>
-          <a:ext cx="0" cy="0"/>
-          <a:chOff x="0" y="0"/>
-          <a:chExt cx="0" cy="0"/>
-        </a:xfrm>
-      </p:grpSpPr>
-      <p:sp>
-        <p:nvSpPr>
-          <p:cNvPr id="5" name="TextBox 4">
-            <a:extLst>
-              <a:ext uri="{FF2B5EF4-FFF2-40B4-BE49-F238E27FC236}">
-                <a16:creationId xmlns:a16="http://schemas.microsoft.com/office/drawing/2014/main" id="{202BF5D3-E0FE-421D-887E-591AC19A8449}"/>
-              </a:ext>
-            </a:extLst>
-          </p:cNvPr>
-          <p:cNvSpPr txBox="1"/>
-          <p:nvPr/>
-        </p:nvSpPr>
-        <p:spPr>
-          <a:xfrm>
-            <a:off x="1107743" y="2095301"/>
-            <a:ext cx="9976513" cy="2667397"/>
-          </a:xfrm>
-          <a:prstGeom prst="rect">
-            <a:avLst/>
-          </a:prstGeom>
-          <a:noFill/>
-        </p:spPr>
-        <p:txBody>
-          <a:bodyPr wrap="square">
-            <a:spAutoFit/>
-          </a:bodyPr>
-          <a:lstStyle/>
-          <a:p>
-            <a:pPr marL="0" marR="0" lvl="0" indent="0" algn="l" hangingPunct="0">
-              <a:lnSpc>
-                <a:spcPct val="100000"/>
-              </a:lnSpc>
-              <a:spcBef>
-                <a:spcPts val="0"/>
-              </a:spcBef>
-              <a:spcAft>
-                <a:spcPts val="1440"/>
-              </a:spcAft>
-              <a:buSzPct val="45000"/>
-              <a:tabLst/>
-            </a:pPr>
-            <a:r>
-              <a:rPr lang="en-US" sz="1800" b="1" i="0" u="none" strike="noStrike" kern="1200" cap="none" dirty="0">
-                <a:ln>
-                  <a:noFill/>
-                </a:ln>
-                <a:solidFill>
-                  <a:srgbClr val="4B83B5"/>
-                </a:solidFill>
-                <a:latin typeface="Arial" pitchFamily="34"/>
-                <a:ea typeface="Arial" pitchFamily="34"/>
-                <a:cs typeface="Arial" pitchFamily="34"/>
-              </a:rPr>
-              <a:t>Allen Newell</a:t>
-            </a:r>
-            <a:r>
-              <a:rPr lang="en-US" sz="1800" b="0" i="0" u="none" strike="noStrike" kern="1200" cap="none" dirty="0">
-                <a:ln>
-                  <a:noFill/>
-                </a:ln>
-                <a:solidFill>
-                  <a:srgbClr val="4B83B5"/>
-                </a:solidFill>
-                <a:latin typeface="Arial" pitchFamily="34"/>
-                <a:ea typeface="Arial" pitchFamily="34"/>
-                <a:cs typeface="Arial" pitchFamily="34"/>
-              </a:rPr>
-              <a:t> </a:t>
-            </a:r>
-            <a:r>
-              <a:rPr lang="en-US" sz="1800" b="0" i="0" u="none" strike="noStrike" kern="1200" cap="none" dirty="0">
-                <a:ln>
-                  <a:noFill/>
-                </a:ln>
-                <a:latin typeface="Arial" pitchFamily="34"/>
-                <a:ea typeface="Arial" pitchFamily="34"/>
-                <a:cs typeface="Arial" pitchFamily="34"/>
-              </a:rPr>
-              <a:t>(1990): An intelligent system “operates in real-time; exploits vast amounts of knowledge; tolerates erroneous, unexpected, and possibly unknown inputs; uses symbols and abstractions; communicates using some form of natural language; learns from the environment; and exhibits adaptive goal-oriented behavior.”</a:t>
-            </a:r>
-          </a:p>
-          <a:p>
-            <a:pPr marL="0" marR="0" lvl="0" indent="0" algn="l" hangingPunct="0">
-              <a:lnSpc>
-                <a:spcPct val="100000"/>
-              </a:lnSpc>
-              <a:spcBef>
-                <a:spcPts val="0"/>
-              </a:spcBef>
-              <a:spcAft>
-                <a:spcPts val="1440"/>
-              </a:spcAft>
-              <a:buSzPct val="45000"/>
-              <a:tabLst/>
-            </a:pPr>
-            <a:endParaRPr lang="en-US" sz="1800" b="0" i="0" u="none" strike="noStrike" kern="1200" cap="none" dirty="0">
-              <a:ln>
-                <a:noFill/>
-              </a:ln>
-              <a:latin typeface="Arial" pitchFamily="34"/>
-              <a:ea typeface="Arial" pitchFamily="34"/>
-              <a:cs typeface="Arial" pitchFamily="34"/>
-            </a:endParaRPr>
-          </a:p>
-          <a:p>
-            <a:pPr marL="0" marR="0" lvl="0" indent="0" algn="l" hangingPunct="0">
-              <a:lnSpc>
-                <a:spcPct val="100000"/>
-              </a:lnSpc>
-              <a:spcBef>
-                <a:spcPts val="0"/>
-              </a:spcBef>
-              <a:spcAft>
-                <a:spcPts val="1440"/>
-              </a:spcAft>
-              <a:buSzPct val="45000"/>
-              <a:tabLst/>
-            </a:pPr>
-            <a:r>
-              <a:rPr lang="en-US" sz="1800" b="1" i="0" u="none" strike="noStrike" kern="1200" cap="none" dirty="0">
-                <a:ln>
-                  <a:noFill/>
-                </a:ln>
-                <a:solidFill>
-                  <a:srgbClr val="4B83B5"/>
-                </a:solidFill>
-                <a:latin typeface="Arial" pitchFamily="34"/>
-                <a:ea typeface="Arial" pitchFamily="34"/>
-                <a:cs typeface="Arial" pitchFamily="34"/>
-              </a:rPr>
-              <a:t>Ray Kurzweil</a:t>
-            </a:r>
-            <a:r>
-              <a:rPr lang="en-US" sz="1800" b="0" i="0" u="none" strike="noStrike" kern="1200" cap="none" dirty="0">
-                <a:ln>
-                  <a:noFill/>
-                </a:ln>
-                <a:solidFill>
-                  <a:srgbClr val="4B83B5"/>
-                </a:solidFill>
-                <a:latin typeface="Arial" pitchFamily="34"/>
-                <a:ea typeface="Arial" pitchFamily="34"/>
-                <a:cs typeface="Arial" pitchFamily="34"/>
-              </a:rPr>
-              <a:t> </a:t>
-            </a:r>
-            <a:r>
-              <a:rPr lang="en-US" sz="1800" b="0" i="0" u="none" strike="noStrike" kern="1200" cap="none" dirty="0">
-                <a:ln>
-                  <a:noFill/>
-                </a:ln>
-                <a:latin typeface="Arial" pitchFamily="34"/>
-                <a:ea typeface="Arial" pitchFamily="34"/>
-                <a:cs typeface="Arial" pitchFamily="34"/>
-              </a:rPr>
-              <a:t>(1990): “In summary, there appears to be no </a:t>
-            </a:r>
-            <a:r>
-              <a:rPr lang="en-US" sz="1800" b="0" i="1" u="none" strike="noStrike" kern="1200" cap="none" dirty="0">
-                <a:ln>
-                  <a:noFill/>
-                </a:ln>
-                <a:latin typeface="Arial" pitchFamily="34"/>
-                <a:ea typeface="Arial" pitchFamily="34"/>
-                <a:cs typeface="Arial" pitchFamily="34"/>
-              </a:rPr>
-              <a:t>simple</a:t>
-            </a:r>
-            <a:r>
-              <a:rPr lang="en-US" sz="1800" b="0" i="0" u="none" strike="noStrike" kern="1200" cap="none" dirty="0">
-                <a:ln>
-                  <a:noFill/>
-                </a:ln>
-                <a:latin typeface="Arial" pitchFamily="34"/>
-                <a:ea typeface="Arial" pitchFamily="34"/>
-                <a:cs typeface="Arial" pitchFamily="34"/>
-              </a:rPr>
-              <a:t> definition of intelligence that is satisfactory to most observers, and most would-be definers of intelligence end up with long checklists of its attributes.”</a:t>
-            </a:r>
-          </a:p>
-        </p:txBody>
-      </p:sp>
-    </p:spTree>
-    <p:extLst>
-      <p:ext uri="{BB962C8B-B14F-4D97-AF65-F5344CB8AC3E}">
-        <p14:creationId xmlns:p14="http://schemas.microsoft.com/office/powerpoint/2010/main" val="2498052185"/>
       </p:ext>
     </p:extLst>
   </p:cSld>
@@ -8403,34 +8582,33 @@
       </p:grpSpPr>
       <p:sp>
         <p:nvSpPr>
-          <p:cNvPr id="4" name="Title 1">
+          <p:cNvPr id="5" name="TextBox 4">
             <a:extLst>
               <a:ext uri="{FF2B5EF4-FFF2-40B4-BE49-F238E27FC236}">
-                <a16:creationId xmlns:a16="http://schemas.microsoft.com/office/drawing/2014/main" id="{6680213F-0526-4F87-BFD0-77AFE4C83667}"/>
+                <a16:creationId xmlns:a16="http://schemas.microsoft.com/office/drawing/2014/main" id="{202BF5D3-E0FE-421D-887E-591AC19A8449}"/>
               </a:ext>
             </a:extLst>
           </p:cNvPr>
-          <p:cNvSpPr>
-            <a:spLocks noGrp="1"/>
-          </p:cNvSpPr>
-          <p:nvPr>
-            <p:ph type="title"/>
-          </p:nvPr>
+          <p:cNvSpPr txBox="1"/>
+          <p:nvPr/>
         </p:nvSpPr>
         <p:spPr>
           <a:xfrm>
-            <a:off x="0" y="271472"/>
-            <a:ext cx="12192000" cy="1500188"/>
+            <a:off x="1107743" y="2095301"/>
+            <a:ext cx="9976513" cy="2667397"/>
           </a:xfrm>
+          <a:prstGeom prst="rect">
+            <a:avLst/>
+          </a:prstGeom>
           <a:noFill/>
         </p:spPr>
         <p:txBody>
-          <a:bodyPr>
-            <a:normAutofit/>
+          <a:bodyPr wrap="square">
+            <a:spAutoFit/>
           </a:bodyPr>
           <a:lstStyle/>
           <a:p>
-            <a:pPr marL="0" marR="0" lvl="0" indent="0" algn="ctr" hangingPunct="0">
+            <a:pPr marL="0" marR="0" lvl="0" indent="0" algn="l" hangingPunct="0">
               <a:lnSpc>
                 <a:spcPct val="100000"/>
               </a:lnSpc>
@@ -8440,131 +8618,146 @@
               <a:spcAft>
                 <a:spcPts val="1440"/>
               </a:spcAft>
-              <a:buNone/>
+              <a:buSzPct val="45000"/>
               <a:tabLst/>
             </a:pPr>
             <a:r>
-              <a:rPr lang="en-US" sz="2800" b="0" i="0" u="none" strike="noStrike" kern="1200" cap="none" dirty="0">
-                <a:ln>
-                  <a:noFill/>
-                </a:ln>
-                <a:latin typeface="Palatino Linotype" panose="02040502050505030304" pitchFamily="18" charset="0"/>
-                <a:ea typeface="Arial" pitchFamily="34"/>
-                <a:cs typeface="Arial" pitchFamily="34"/>
-              </a:rPr>
-              <a:t>What do you think?  What is the defining feature of “intelligence”?</a:t>
-            </a:r>
-          </a:p>
-        </p:txBody>
-      </p:sp>
-      <p:pic>
-        <p:nvPicPr>
-          <p:cNvPr id="7" name="Picture 6">
-            <a:extLst>
-              <a:ext uri="{FF2B5EF4-FFF2-40B4-BE49-F238E27FC236}">
-                <a16:creationId xmlns:a16="http://schemas.microsoft.com/office/drawing/2014/main" id="{D64AE8E3-29B7-4073-93F4-02E3DBB765A8}"/>
-              </a:ext>
-            </a:extLst>
-          </p:cNvPr>
-          <p:cNvPicPr>
-            <a:picLocks noChangeAspect="1"/>
-          </p:cNvPicPr>
-          <p:nvPr/>
-        </p:nvPicPr>
-        <p:blipFill>
-          <a:blip r:embed="rId3">
-            <a:extLst>
-              <a:ext uri="{28A0092B-C50C-407E-A947-70E740481C1C}">
-                <a14:useLocalDpi xmlns:a14="http://schemas.microsoft.com/office/drawing/2010/main" val="0"/>
-              </a:ext>
-            </a:extLst>
-          </a:blip>
-          <a:stretch>
-            <a:fillRect/>
-          </a:stretch>
-        </p:blipFill>
-        <p:spPr>
-          <a:xfrm>
-            <a:off x="191238" y="2018319"/>
-            <a:ext cx="11809523" cy="4825397"/>
-          </a:xfrm>
-          <a:prstGeom prst="rect">
-            <a:avLst/>
-          </a:prstGeom>
-        </p:spPr>
-      </p:pic>
-      <p:sp>
-        <p:nvSpPr>
-          <p:cNvPr id="5" name="TextBox 4">
-            <a:extLst>
-              <a:ext uri="{FF2B5EF4-FFF2-40B4-BE49-F238E27FC236}">
-                <a16:creationId xmlns:a16="http://schemas.microsoft.com/office/drawing/2014/main" id="{38313A4B-4189-4EC0-A3D0-505C6303CCF9}"/>
-              </a:ext>
-            </a:extLst>
-          </p:cNvPr>
-          <p:cNvSpPr txBox="1"/>
-          <p:nvPr/>
-        </p:nvSpPr>
-        <p:spPr>
-          <a:xfrm>
-            <a:off x="0" y="6550223"/>
-            <a:ext cx="12192000" cy="523220"/>
-          </a:xfrm>
-          <a:prstGeom prst="rect">
-            <a:avLst/>
-          </a:prstGeom>
-          <a:noFill/>
-        </p:spPr>
-        <p:txBody>
-          <a:bodyPr wrap="square" rtlCol="0">
-            <a:spAutoFit/>
-          </a:bodyPr>
-          <a:lstStyle/>
-          <a:p>
-            <a:r>
-              <a:rPr lang="en-US" sz="1400" dirty="0">
-                <a:solidFill>
-                  <a:schemeClr val="tx1">
-                    <a:lumMod val="65000"/>
-                    <a:lumOff val="35000"/>
-                  </a:schemeClr>
-                </a:solidFill>
-                <a:latin typeface="+mj-lt"/>
-                <a:ea typeface="Verdana" panose="020B0604030504040204" pitchFamily="34" charset="0"/>
-              </a:rPr>
-              <a:t>Image Credit: </a:t>
-            </a:r>
-            <a:r>
-              <a:rPr lang="en-US" sz="1400" b="0" i="0" u="none" strike="noStrike" kern="1200" cap="none" dirty="0">
+              <a:rPr lang="en-US" sz="1800" b="1" i="0" u="none" strike="noStrike" kern="1200" cap="none" dirty="0">
                 <a:ln>
                   <a:noFill/>
                 </a:ln>
                 <a:solidFill>
-                  <a:schemeClr val="tx1">
-                    <a:lumMod val="65000"/>
-                    <a:lumOff val="35000"/>
-                  </a:schemeClr>
+                  <a:srgbClr val="4B83B5"/>
                 </a:solidFill>
-                <a:latin typeface="+mj-lt"/>
+                <a:latin typeface="Arial" pitchFamily="34"/>
                 <a:ea typeface="Arial" pitchFamily="34"/>
                 <a:cs typeface="Arial" pitchFamily="34"/>
               </a:rPr>
-              <a:t>https://worqiq.com/2018/09/open-to-think-pure-thinking-power/</a:t>
-            </a:r>
-          </a:p>
-          <a:p>
-            <a:r>
-              <a:rPr lang="en-US" sz="1400" dirty="0">
+              <a:t>Allen Newell</a:t>
+            </a:r>
+            <a:r>
+              <a:rPr lang="en-US" sz="1800" b="0" i="0" u="none" strike="noStrike" kern="1200" cap="none" dirty="0">
+                <a:ln>
+                  <a:noFill/>
+                </a:ln>
                 <a:solidFill>
-                  <a:schemeClr val="tx1">
-                    <a:lumMod val="65000"/>
-                    <a:lumOff val="35000"/>
-                  </a:schemeClr>
+                  <a:srgbClr val="4B83B5"/>
                 </a:solidFill>
-                <a:latin typeface="+mj-lt"/>
-                <a:ea typeface="Verdana" panose="020B0604030504040204" pitchFamily="34" charset="0"/>
+                <a:latin typeface="Arial" pitchFamily="34"/>
+                <a:ea typeface="Arial" pitchFamily="34"/>
+                <a:cs typeface="Arial" pitchFamily="34"/>
               </a:rPr>
               <a:t> </a:t>
+            </a:r>
+            <a:r>
+              <a:rPr lang="en-US" sz="1800" b="0" i="0" u="none" strike="noStrike" kern="1200" cap="none" dirty="0">
+                <a:ln>
+                  <a:noFill/>
+                </a:ln>
+                <a:latin typeface="Arial" pitchFamily="34"/>
+                <a:ea typeface="Arial" pitchFamily="34"/>
+                <a:cs typeface="Arial" pitchFamily="34"/>
+              </a:rPr>
+              <a:t>(1990): An intelligent system “operates in real-time; exploits vast amounts of knowledge; tolerates erroneous, unexpected, and possibly unknown inputs; uses symbols and abstractions; communicates using some form of natural language; learns from the environment; and exhibits adaptive goal-oriented behavior.”</a:t>
+            </a:r>
+          </a:p>
+          <a:p>
+            <a:pPr marL="0" marR="0" lvl="0" indent="0" algn="l" hangingPunct="0">
+              <a:lnSpc>
+                <a:spcPct val="100000"/>
+              </a:lnSpc>
+              <a:spcBef>
+                <a:spcPts val="0"/>
+              </a:spcBef>
+              <a:spcAft>
+                <a:spcPts val="1440"/>
+              </a:spcAft>
+              <a:buSzPct val="45000"/>
+              <a:tabLst/>
+            </a:pPr>
+            <a:endParaRPr lang="en-US" sz="1800" b="0" i="0" u="none" strike="noStrike" kern="1200" cap="none" dirty="0">
+              <a:ln>
+                <a:noFill/>
+              </a:ln>
+              <a:latin typeface="Arial" pitchFamily="34"/>
+              <a:ea typeface="Arial" pitchFamily="34"/>
+              <a:cs typeface="Arial" pitchFamily="34"/>
+            </a:endParaRPr>
+          </a:p>
+          <a:p>
+            <a:pPr marL="0" marR="0" lvl="0" indent="0" algn="l" hangingPunct="0">
+              <a:lnSpc>
+                <a:spcPct val="100000"/>
+              </a:lnSpc>
+              <a:spcBef>
+                <a:spcPts val="0"/>
+              </a:spcBef>
+              <a:spcAft>
+                <a:spcPts val="1440"/>
+              </a:spcAft>
+              <a:buSzPct val="45000"/>
+              <a:tabLst/>
+            </a:pPr>
+            <a:r>
+              <a:rPr lang="en-US" sz="1800" b="1" i="0" u="none" strike="noStrike" kern="1200" cap="none" dirty="0">
+                <a:ln>
+                  <a:noFill/>
+                </a:ln>
+                <a:solidFill>
+                  <a:srgbClr val="4B83B5"/>
+                </a:solidFill>
+                <a:latin typeface="Arial" pitchFamily="34"/>
+                <a:ea typeface="Arial" pitchFamily="34"/>
+                <a:cs typeface="Arial" pitchFamily="34"/>
+              </a:rPr>
+              <a:t>Ray Kurzweil</a:t>
+            </a:r>
+            <a:r>
+              <a:rPr lang="en-US" sz="1800" b="0" i="0" u="none" strike="noStrike" kern="1200" cap="none" dirty="0">
+                <a:ln>
+                  <a:noFill/>
+                </a:ln>
+                <a:solidFill>
+                  <a:srgbClr val="4B83B5"/>
+                </a:solidFill>
+                <a:latin typeface="Arial" pitchFamily="34"/>
+                <a:ea typeface="Arial" pitchFamily="34"/>
+                <a:cs typeface="Arial" pitchFamily="34"/>
+              </a:rPr>
+              <a:t> </a:t>
+            </a:r>
+            <a:r>
+              <a:rPr lang="en-US" sz="1800" b="0" i="0" u="none" strike="noStrike" kern="1200" cap="none" dirty="0">
+                <a:ln>
+                  <a:noFill/>
+                </a:ln>
+                <a:latin typeface="Arial" pitchFamily="34"/>
+                <a:ea typeface="Arial" pitchFamily="34"/>
+                <a:cs typeface="Arial" pitchFamily="34"/>
+              </a:rPr>
+              <a:t>(1990): “In summary, there appears to be no </a:t>
+            </a:r>
+            <a:r>
+              <a:rPr lang="en-US" sz="1800" b="0" i="1" u="none" strike="noStrike" kern="1200" cap="none" dirty="0">
+                <a:ln>
+                  <a:noFill/>
+                </a:ln>
+                <a:latin typeface="Arial" pitchFamily="34"/>
+                <a:ea typeface="Arial" pitchFamily="34"/>
+                <a:cs typeface="Arial" pitchFamily="34"/>
+              </a:rPr>
+              <a:t>simple</a:t>
+            </a:r>
+            <a:r>
+              <a:rPr lang="en-US" sz="1800" b="0" i="0" u="none" strike="noStrike" kern="1200" cap="none" dirty="0">
+                <a:ln>
+                  <a:noFill/>
+                </a:ln>
+                <a:latin typeface="Arial" pitchFamily="34"/>
+                <a:ea typeface="Arial" pitchFamily="34"/>
+                <a:cs typeface="Arial" pitchFamily="34"/>
+              </a:rPr>
+              <a:t> definition of intelligence that is satisfactory to most observers, and most would-be definers of intelligence end up with long checklists of its attributes.”</a:t>
             </a:r>
           </a:p>
         </p:txBody>
@@ -8572,7 +8765,7 @@
     </p:spTree>
     <p:extLst>
       <p:ext uri="{BB962C8B-B14F-4D97-AF65-F5344CB8AC3E}">
-        <p14:creationId xmlns:p14="http://schemas.microsoft.com/office/powerpoint/2010/main" val="2600672581"/>
+        <p14:creationId xmlns:p14="http://schemas.microsoft.com/office/powerpoint/2010/main" val="2498052185"/>
       </p:ext>
     </p:extLst>
   </p:cSld>
@@ -8611,21 +8804,75 @@
           <a:chExt cx="0" cy="0"/>
         </a:xfrm>
       </p:grpSpPr>
+      <p:sp>
+        <p:nvSpPr>
+          <p:cNvPr id="4" name="Title 1">
+            <a:extLst>
+              <a:ext uri="{FF2B5EF4-FFF2-40B4-BE49-F238E27FC236}">
+                <a16:creationId xmlns:a16="http://schemas.microsoft.com/office/drawing/2014/main" id="{6680213F-0526-4F87-BFD0-77AFE4C83667}"/>
+              </a:ext>
+            </a:extLst>
+          </p:cNvPr>
+          <p:cNvSpPr>
+            <a:spLocks noGrp="1"/>
+          </p:cNvSpPr>
+          <p:nvPr>
+            <p:ph type="title"/>
+          </p:nvPr>
+        </p:nvSpPr>
+        <p:spPr>
+          <a:xfrm>
+            <a:off x="0" y="271472"/>
+            <a:ext cx="12192000" cy="1500188"/>
+          </a:xfrm>
+          <a:noFill/>
+        </p:spPr>
+        <p:txBody>
+          <a:bodyPr>
+            <a:normAutofit/>
+          </a:bodyPr>
+          <a:lstStyle/>
+          <a:p>
+            <a:pPr marL="0" marR="0" lvl="0" indent="0" algn="ctr" hangingPunct="0">
+              <a:lnSpc>
+                <a:spcPct val="100000"/>
+              </a:lnSpc>
+              <a:spcBef>
+                <a:spcPts val="0"/>
+              </a:spcBef>
+              <a:spcAft>
+                <a:spcPts val="1440"/>
+              </a:spcAft>
+              <a:buNone/>
+              <a:tabLst/>
+            </a:pPr>
+            <a:r>
+              <a:rPr lang="en-US" sz="2800" b="0" i="0" u="none" strike="noStrike" kern="1200" cap="none" dirty="0">
+                <a:ln>
+                  <a:noFill/>
+                </a:ln>
+                <a:latin typeface="Palatino Linotype" panose="02040502050505030304" pitchFamily="18" charset="0"/>
+                <a:ea typeface="Arial" pitchFamily="34"/>
+                <a:cs typeface="Arial" pitchFamily="34"/>
+              </a:rPr>
+              <a:t>What do you think?  What is the defining feature of “intelligence”?</a:t>
+            </a:r>
+          </a:p>
+        </p:txBody>
+      </p:sp>
       <p:pic>
         <p:nvPicPr>
-          <p:cNvPr id="6" name="Content Placeholder 5">
+          <p:cNvPr id="7" name="Picture 6">
             <a:extLst>
               <a:ext uri="{FF2B5EF4-FFF2-40B4-BE49-F238E27FC236}">
-                <a16:creationId xmlns:a16="http://schemas.microsoft.com/office/drawing/2014/main" id="{0F37756A-9B35-4F19-B2A5-2E41774808F9}"/>
+                <a16:creationId xmlns:a16="http://schemas.microsoft.com/office/drawing/2014/main" id="{D64AE8E3-29B7-4073-93F4-02E3DBB765A8}"/>
               </a:ext>
             </a:extLst>
           </p:cNvPr>
           <p:cNvPicPr>
-            <a:picLocks noGrp="1" noChangeAspect="1"/>
+            <a:picLocks noChangeAspect="1"/>
           </p:cNvPicPr>
-          <p:nvPr>
-            <p:ph idx="1"/>
-          </p:nvPr>
+          <p:nvPr/>
         </p:nvPicPr>
         <p:blipFill>
           <a:blip r:embed="rId3">
@@ -8641,17 +8888,20 @@
         </p:blipFill>
         <p:spPr>
           <a:xfrm>
-            <a:off x="4645908" y="1900858"/>
-            <a:ext cx="2900183" cy="3056284"/>
+            <a:off x="191238" y="2018319"/>
+            <a:ext cx="11809523" cy="4825397"/>
           </a:xfrm>
+          <a:prstGeom prst="rect">
+            <a:avLst/>
+          </a:prstGeom>
         </p:spPr>
       </p:pic>
       <p:sp>
         <p:nvSpPr>
-          <p:cNvPr id="3" name="TextBox 2">
+          <p:cNvPr id="5" name="TextBox 4">
             <a:extLst>
               <a:ext uri="{FF2B5EF4-FFF2-40B4-BE49-F238E27FC236}">
-                <a16:creationId xmlns:a16="http://schemas.microsoft.com/office/drawing/2014/main" id="{B4D9A26C-FC21-4659-AAC5-142DB285F178}"/>
+                <a16:creationId xmlns:a16="http://schemas.microsoft.com/office/drawing/2014/main" id="{38313A4B-4189-4EC0-A3D0-505C6303CCF9}"/>
               </a:ext>
             </a:extLst>
           </p:cNvPr>
@@ -8661,7 +8911,7 @@
         <p:spPr>
           <a:xfrm>
             <a:off x="0" y="6550223"/>
-            <a:ext cx="12192000" cy="307777"/>
+            <a:ext cx="12192000" cy="523220"/>
           </a:xfrm>
           <a:prstGeom prst="rect">
             <a:avLst/>
@@ -8674,9 +8924,6 @@
           </a:bodyPr>
           <a:lstStyle/>
           <a:p>
-            <a:pPr marL="0" indent="0">
-              <a:buNone/>
-            </a:pPr>
             <a:r>
               <a:rPr lang="en-US" sz="1400" dirty="0">
                 <a:solidFill>
@@ -8691,7 +8938,10 @@
               <a:t>Image Credit: </a:t>
             </a:r>
             <a:r>
-              <a:rPr lang="en-US" sz="1400" b="0" dirty="0">
+              <a:rPr lang="en-US" sz="1400" b="0" i="0" u="none" strike="noStrike" kern="1200" cap="none" dirty="0">
+                <a:ln>
+                  <a:noFill/>
+                </a:ln>
                 <a:solidFill>
                   <a:schemeClr val="tx1">
                     <a:lumMod val="65000"/>
@@ -8699,43 +8949,25 @@
                   </a:schemeClr>
                 </a:solidFill>
                 <a:latin typeface="+mj-lt"/>
+                <a:ea typeface="Arial" pitchFamily="34"/>
+                <a:cs typeface="Arial" pitchFamily="34"/>
               </a:rPr>
-              <a:t>https://www.dreamstime.com/alan-turing-famous-vector-sketch-portrait-isolated-image189405803</a:t>
-            </a:r>
-          </a:p>
-        </p:txBody>
-      </p:sp>
-      <p:sp>
-        <p:nvSpPr>
-          <p:cNvPr id="4" name="TextBox 3">
-            <a:extLst>
-              <a:ext uri="{FF2B5EF4-FFF2-40B4-BE49-F238E27FC236}">
-                <a16:creationId xmlns:a16="http://schemas.microsoft.com/office/drawing/2014/main" id="{7CC0C968-FC43-5749-D5CC-A1728B3AC5C8}"/>
-              </a:ext>
-            </a:extLst>
-          </p:cNvPr>
-          <p:cNvSpPr txBox="1"/>
-          <p:nvPr/>
-        </p:nvSpPr>
-        <p:spPr>
-          <a:xfrm>
-            <a:off x="5395962" y="5515347"/>
-            <a:ext cx="1686764" cy="473423"/>
-          </a:xfrm>
-          <a:prstGeom prst="rect">
-            <a:avLst/>
-          </a:prstGeom>
-          <a:noFill/>
-        </p:spPr>
-        <p:txBody>
-          <a:bodyPr wrap="square" rtlCol="0">
-            <a:spAutoFit/>
-          </a:bodyPr>
-          <a:lstStyle/>
-          <a:p>
-            <a:r>
-              <a:rPr lang="en-US" sz="2400" dirty="0"/>
-              <a:t>Alan Turing</a:t>
+              <a:t>https://worqiq.com/2018/09/open-to-think-pure-thinking-power/</a:t>
+            </a:r>
+          </a:p>
+          <a:p>
+            <a:r>
+              <a:rPr lang="en-US" sz="1400" dirty="0">
+                <a:solidFill>
+                  <a:schemeClr val="tx1">
+                    <a:lumMod val="65000"/>
+                    <a:lumOff val="35000"/>
+                  </a:schemeClr>
+                </a:solidFill>
+                <a:latin typeface="+mj-lt"/>
+                <a:ea typeface="Verdana" panose="020B0604030504040204" pitchFamily="34" charset="0"/>
+              </a:rPr>
+              <a:t> </a:t>
             </a:r>
           </a:p>
         </p:txBody>
@@ -8743,7 +8975,7 @@
     </p:spTree>
     <p:extLst>
       <p:ext uri="{BB962C8B-B14F-4D97-AF65-F5344CB8AC3E}">
-        <p14:creationId xmlns:p14="http://schemas.microsoft.com/office/powerpoint/2010/main" val="3529707185"/>
+        <p14:creationId xmlns:p14="http://schemas.microsoft.com/office/powerpoint/2010/main" val="2600672581"/>
       </p:ext>
     </p:extLst>
   </p:cSld>
@@ -8784,17 +9016,19 @@
       </p:grpSpPr>
       <p:pic>
         <p:nvPicPr>
-          <p:cNvPr id="11" name="Picture 10" descr="Timeline&#10;&#10;Description automatically generated">
+          <p:cNvPr id="6" name="Content Placeholder 5">
             <a:extLst>
               <a:ext uri="{FF2B5EF4-FFF2-40B4-BE49-F238E27FC236}">
-                <a16:creationId xmlns:a16="http://schemas.microsoft.com/office/drawing/2014/main" id="{1B1F8104-0AF1-4BDA-AACA-CAB442AE7B83}"/>
+                <a16:creationId xmlns:a16="http://schemas.microsoft.com/office/drawing/2014/main" id="{0F37756A-9B35-4F19-B2A5-2E41774808F9}"/>
               </a:ext>
             </a:extLst>
           </p:cNvPr>
           <p:cNvPicPr>
-            <a:picLocks noChangeAspect="1"/>
+            <a:picLocks noGrp="1" noChangeAspect="1"/>
           </p:cNvPicPr>
-          <p:nvPr/>
+          <p:nvPr>
+            <p:ph idx="1"/>
+          </p:nvPr>
         </p:nvPicPr>
         <p:blipFill>
           <a:blip r:embed="rId3">
@@ -8810,27 +9044,9 @@
         </p:blipFill>
         <p:spPr>
           <a:xfrm>
-            <a:off x="1570120" y="484354"/>
-            <a:ext cx="9051760" cy="5889291"/>
+            <a:off x="4645908" y="1900858"/>
+            <a:ext cx="2900183" cy="3056284"/>
           </a:xfrm>
-          <a:prstGeom prst="rect">
-            <a:avLst/>
-          </a:prstGeom>
-          <a:ln w="3175">
-            <a:solidFill>
-              <a:schemeClr val="tx1">
-                <a:lumMod val="75000"/>
-                <a:lumOff val="25000"/>
-              </a:schemeClr>
-            </a:solidFill>
-          </a:ln>
-          <a:effectLst>
-            <a:outerShdw blurRad="50800" dist="38100" dir="2700000" algn="tl" rotWithShape="0">
-              <a:prstClr val="black">
-                <a:alpha val="40000"/>
-              </a:prstClr>
-            </a:outerShdw>
-          </a:effectLst>
         </p:spPr>
       </p:pic>
       <p:sp>
@@ -8838,7 +9054,7 @@
           <p:cNvPr id="3" name="TextBox 2">
             <a:extLst>
               <a:ext uri="{FF2B5EF4-FFF2-40B4-BE49-F238E27FC236}">
-                <a16:creationId xmlns:a16="http://schemas.microsoft.com/office/drawing/2014/main" id="{258E030E-9A33-448B-BB6F-D15B1E2CDD9A}"/>
+                <a16:creationId xmlns:a16="http://schemas.microsoft.com/office/drawing/2014/main" id="{B4D9A26C-FC21-4659-AAC5-142DB285F178}"/>
               </a:ext>
             </a:extLst>
           </p:cNvPr>
@@ -8861,6 +9077,9 @@
           </a:bodyPr>
           <a:lstStyle/>
           <a:p>
+            <a:pPr marL="0" indent="0">
+              <a:buNone/>
+            </a:pPr>
             <a:r>
               <a:rPr lang="en-US" sz="1400" dirty="0">
                 <a:solidFill>
@@ -8875,10 +9094,51 @@
               <a:t>Image Credit: </a:t>
             </a:r>
             <a:r>
-              <a:rPr lang="en-US" sz="1400" dirty="0">
+              <a:rPr lang="en-US" sz="1400" b="0" dirty="0">
+                <a:solidFill>
+                  <a:schemeClr val="tx1">
+                    <a:lumMod val="65000"/>
+                    <a:lumOff val="35000"/>
+                  </a:schemeClr>
+                </a:solidFill>
                 <a:latin typeface="+mj-lt"/>
               </a:rPr>
-              <a:t>https://searchenterpriseai.techtarget.com/definition/Turing-test</a:t>
+              <a:t>https://www.dreamstime.com/alan-turing-famous-vector-sketch-portrait-isolated-image189405803</a:t>
+            </a:r>
+          </a:p>
+        </p:txBody>
+      </p:sp>
+      <p:sp>
+        <p:nvSpPr>
+          <p:cNvPr id="4" name="TextBox 3">
+            <a:extLst>
+              <a:ext uri="{FF2B5EF4-FFF2-40B4-BE49-F238E27FC236}">
+                <a16:creationId xmlns:a16="http://schemas.microsoft.com/office/drawing/2014/main" id="{7CC0C968-FC43-5749-D5CC-A1728B3AC5C8}"/>
+              </a:ext>
+            </a:extLst>
+          </p:cNvPr>
+          <p:cNvSpPr txBox="1"/>
+          <p:nvPr/>
+        </p:nvSpPr>
+        <p:spPr>
+          <a:xfrm>
+            <a:off x="5395962" y="5515347"/>
+            <a:ext cx="1686764" cy="473423"/>
+          </a:xfrm>
+          <a:prstGeom prst="rect">
+            <a:avLst/>
+          </a:prstGeom>
+          <a:noFill/>
+        </p:spPr>
+        <p:txBody>
+          <a:bodyPr wrap="square" rtlCol="0">
+            <a:spAutoFit/>
+          </a:bodyPr>
+          <a:lstStyle/>
+          <a:p>
+            <a:r>
+              <a:rPr lang="en-US" sz="2400" dirty="0"/>
+              <a:t>Alan Turing</a:t>
             </a:r>
           </a:p>
         </p:txBody>
@@ -8886,7 +9146,7 @@
     </p:spTree>
     <p:extLst>
       <p:ext uri="{BB962C8B-B14F-4D97-AF65-F5344CB8AC3E}">
-        <p14:creationId xmlns:p14="http://schemas.microsoft.com/office/powerpoint/2010/main" val="2172348735"/>
+        <p14:creationId xmlns:p14="http://schemas.microsoft.com/office/powerpoint/2010/main" val="3529707185"/>
       </p:ext>
     </p:extLst>
   </p:cSld>
@@ -8925,24 +9185,73 @@
           <a:chExt cx="0" cy="0"/>
         </a:xfrm>
       </p:grpSpPr>
-      <p:sp>
-        <p:nvSpPr>
-          <p:cNvPr id="8" name="Title 1">
+      <p:pic>
+        <p:nvPicPr>
+          <p:cNvPr id="11" name="Picture 10" descr="Timeline&#10;&#10;Description automatically generated">
             <a:extLst>
               <a:ext uri="{FF2B5EF4-FFF2-40B4-BE49-F238E27FC236}">
-                <a16:creationId xmlns:a16="http://schemas.microsoft.com/office/drawing/2014/main" id="{16C8D218-2D56-40BC-AC60-89E854D3E63B}"/>
+                <a16:creationId xmlns:a16="http://schemas.microsoft.com/office/drawing/2014/main" id="{1B1F8104-0AF1-4BDA-AACA-CAB442AE7B83}"/>
               </a:ext>
             </a:extLst>
           </p:cNvPr>
-          <p:cNvSpPr txBox="1">
-            <a:spLocks/>
-          </p:cNvSpPr>
+          <p:cNvPicPr>
+            <a:picLocks noChangeAspect="1"/>
+          </p:cNvPicPr>
           <p:nvPr/>
-        </p:nvSpPr>
+        </p:nvPicPr>
+        <p:blipFill>
+          <a:blip r:embed="rId3">
+            <a:extLst>
+              <a:ext uri="{28A0092B-C50C-407E-A947-70E740481C1C}">
+                <a14:useLocalDpi xmlns:a14="http://schemas.microsoft.com/office/drawing/2010/main" val="0"/>
+              </a:ext>
+            </a:extLst>
+          </a:blip>
+          <a:stretch>
+            <a:fillRect/>
+          </a:stretch>
+        </p:blipFill>
         <p:spPr>
           <a:xfrm>
-            <a:off x="838200" y="2678906"/>
-            <a:ext cx="10515600" cy="1500188"/>
+            <a:off x="1570120" y="484354"/>
+            <a:ext cx="9051760" cy="5889291"/>
+          </a:xfrm>
+          <a:prstGeom prst="rect">
+            <a:avLst/>
+          </a:prstGeom>
+          <a:ln w="3175">
+            <a:solidFill>
+              <a:schemeClr val="tx1">
+                <a:lumMod val="75000"/>
+                <a:lumOff val="25000"/>
+              </a:schemeClr>
+            </a:solidFill>
+          </a:ln>
+          <a:effectLst>
+            <a:outerShdw blurRad="50800" dist="38100" dir="2700000" algn="tl" rotWithShape="0">
+              <a:prstClr val="black">
+                <a:alpha val="40000"/>
+              </a:prstClr>
+            </a:outerShdw>
+          </a:effectLst>
+        </p:spPr>
+      </p:pic>
+      <p:sp>
+        <p:nvSpPr>
+          <p:cNvPr id="3" name="TextBox 2">
+            <a:extLst>
+              <a:ext uri="{FF2B5EF4-FFF2-40B4-BE49-F238E27FC236}">
+                <a16:creationId xmlns:a16="http://schemas.microsoft.com/office/drawing/2014/main" id="{258E030E-9A33-448B-BB6F-D15B1E2CDD9A}"/>
+              </a:ext>
+            </a:extLst>
+          </p:cNvPr>
+          <p:cNvSpPr txBox="1"/>
+          <p:nvPr/>
+        </p:nvSpPr>
+        <p:spPr>
+          <a:xfrm>
+            <a:off x="0" y="6550223"/>
+            <a:ext cx="12192000" cy="307777"/>
           </a:xfrm>
           <a:prstGeom prst="rect">
             <a:avLst/>
@@ -8950,72 +9259,37 @@
           <a:noFill/>
         </p:spPr>
         <p:txBody>
-          <a:bodyPr vert="horz" lIns="91440" tIns="45720" rIns="91440" bIns="45720" rtlCol="0" anchor="ctr">
-            <a:normAutofit/>
+          <a:bodyPr wrap="square" rtlCol="0">
+            <a:spAutoFit/>
           </a:bodyPr>
-          <a:lstStyle>
-            <a:lvl1pPr algn="l" defTabSz="914400" rtl="0" eaLnBrk="1" latinLnBrk="0" hangingPunct="1">
-              <a:lnSpc>
-                <a:spcPct val="90000"/>
-              </a:lnSpc>
-              <a:spcBef>
-                <a:spcPct val="0"/>
-              </a:spcBef>
-              <a:buNone/>
-              <a:defRPr sz="4400" kern="1200">
+          <a:lstStyle/>
+          <a:p>
+            <a:r>
+              <a:rPr lang="en-US" sz="1400" dirty="0">
                 <a:solidFill>
-                  <a:schemeClr val="tx1"/>
+                  <a:schemeClr val="tx1">
+                    <a:lumMod val="65000"/>
+                    <a:lumOff val="35000"/>
+                  </a:schemeClr>
                 </a:solidFill>
                 <a:latin typeface="+mj-lt"/>
-                <a:ea typeface="+mj-ea"/>
-                <a:cs typeface="+mj-cs"/>
-              </a:defRPr>
-            </a:lvl1pPr>
-          </a:lstStyle>
-          <a:p>
-            <a:pPr algn="ctr"/>
-            <a:r>
-              <a:rPr lang="en-US" sz="5400" dirty="0">
-                <a:solidFill>
-                  <a:srgbClr val="30335C"/>
-                </a:solidFill>
-                <a:latin typeface="Palatino Linotype" panose="02040502050505030304" pitchFamily="18" charset="0"/>
-                <a:cs typeface="Segoe UI Light" panose="020B0502040204020203" pitchFamily="34" charset="0"/>
+                <a:ea typeface="Verdana" panose="020B0604030504040204" pitchFamily="34" charset="0"/>
               </a:rPr>
-              <a:t>ELIZA</a:t>
-            </a:r>
-          </a:p>
-        </p:txBody>
-      </p:sp>
-      <p:sp>
-        <p:nvSpPr>
-          <p:cNvPr id="5" name="Title 4">
-            <a:extLst>
-              <a:ext uri="{FF2B5EF4-FFF2-40B4-BE49-F238E27FC236}">
-                <a16:creationId xmlns:a16="http://schemas.microsoft.com/office/drawing/2014/main" id="{D2C58B67-0AB1-4C0E-9AC7-05C4FEFA7EDA}"/>
-              </a:ext>
-            </a:extLst>
-          </p:cNvPr>
-          <p:cNvSpPr>
-            <a:spLocks noGrp="1"/>
-          </p:cNvSpPr>
-          <p:nvPr>
-            <p:ph type="title"/>
-          </p:nvPr>
-        </p:nvSpPr>
-        <p:spPr/>
-        <p:txBody>
-          <a:bodyPr/>
-          <a:lstStyle/>
-          <a:p>
-            <a:endParaRPr lang="en-US"/>
+              <a:t>Image Credit: </a:t>
+            </a:r>
+            <a:r>
+              <a:rPr lang="en-US" sz="1400" dirty="0">
+                <a:latin typeface="+mj-lt"/>
+              </a:rPr>
+              <a:t>https://searchenterpriseai.techtarget.com/definition/Turing-test</a:t>
+            </a:r>
           </a:p>
         </p:txBody>
       </p:sp>
     </p:spTree>
     <p:extLst>
       <p:ext uri="{BB962C8B-B14F-4D97-AF65-F5344CB8AC3E}">
-        <p14:creationId xmlns:p14="http://schemas.microsoft.com/office/powerpoint/2010/main" val="1226819478"/>
+        <p14:creationId xmlns:p14="http://schemas.microsoft.com/office/powerpoint/2010/main" val="2172348735"/>
       </p:ext>
     </p:extLst>
   </p:cSld>
@@ -9604,6 +9878,135 @@
 </file>
 
 <file path=ppt/slides/slide20.xml><?xml version="1.0" encoding="utf-8"?>
+<p:sld xmlns:a="http://schemas.openxmlformats.org/drawingml/2006/main" xmlns:r="http://schemas.openxmlformats.org/officeDocument/2006/relationships" xmlns:p="http://schemas.openxmlformats.org/presentationml/2006/main">
+  <p:cSld>
+    <p:spTree>
+      <p:nvGrpSpPr>
+        <p:cNvPr id="1" name=""/>
+        <p:cNvGrpSpPr/>
+        <p:nvPr/>
+      </p:nvGrpSpPr>
+      <p:grpSpPr>
+        <a:xfrm>
+          <a:off x="0" y="0"/>
+          <a:ext cx="0" cy="0"/>
+          <a:chOff x="0" y="0"/>
+          <a:chExt cx="0" cy="0"/>
+        </a:xfrm>
+      </p:grpSpPr>
+      <p:sp>
+        <p:nvSpPr>
+          <p:cNvPr id="8" name="Title 1">
+            <a:extLst>
+              <a:ext uri="{FF2B5EF4-FFF2-40B4-BE49-F238E27FC236}">
+                <a16:creationId xmlns:a16="http://schemas.microsoft.com/office/drawing/2014/main" id="{16C8D218-2D56-40BC-AC60-89E854D3E63B}"/>
+              </a:ext>
+            </a:extLst>
+          </p:cNvPr>
+          <p:cNvSpPr txBox="1">
+            <a:spLocks/>
+          </p:cNvSpPr>
+          <p:nvPr/>
+        </p:nvSpPr>
+        <p:spPr>
+          <a:xfrm>
+            <a:off x="838200" y="2678906"/>
+            <a:ext cx="10515600" cy="1500188"/>
+          </a:xfrm>
+          <a:prstGeom prst="rect">
+            <a:avLst/>
+          </a:prstGeom>
+          <a:noFill/>
+        </p:spPr>
+        <p:txBody>
+          <a:bodyPr vert="horz" lIns="91440" tIns="45720" rIns="91440" bIns="45720" rtlCol="0" anchor="ctr">
+            <a:normAutofit/>
+          </a:bodyPr>
+          <a:lstStyle>
+            <a:lvl1pPr algn="l" defTabSz="914400" rtl="0" eaLnBrk="1" latinLnBrk="0" hangingPunct="1">
+              <a:lnSpc>
+                <a:spcPct val="90000"/>
+              </a:lnSpc>
+              <a:spcBef>
+                <a:spcPct val="0"/>
+              </a:spcBef>
+              <a:buNone/>
+              <a:defRPr sz="4400" kern="1200">
+                <a:solidFill>
+                  <a:schemeClr val="tx1"/>
+                </a:solidFill>
+                <a:latin typeface="+mj-lt"/>
+                <a:ea typeface="+mj-ea"/>
+                <a:cs typeface="+mj-cs"/>
+              </a:defRPr>
+            </a:lvl1pPr>
+          </a:lstStyle>
+          <a:p>
+            <a:pPr algn="ctr"/>
+            <a:r>
+              <a:rPr lang="en-US" sz="5400" dirty="0">
+                <a:solidFill>
+                  <a:srgbClr val="30335C"/>
+                </a:solidFill>
+                <a:latin typeface="Palatino Linotype" panose="02040502050505030304" pitchFamily="18" charset="0"/>
+                <a:cs typeface="Segoe UI Light" panose="020B0502040204020203" pitchFamily="34" charset="0"/>
+              </a:rPr>
+              <a:t>ELIZA</a:t>
+            </a:r>
+          </a:p>
+        </p:txBody>
+      </p:sp>
+      <p:sp>
+        <p:nvSpPr>
+          <p:cNvPr id="5" name="Title 4">
+            <a:extLst>
+              <a:ext uri="{FF2B5EF4-FFF2-40B4-BE49-F238E27FC236}">
+                <a16:creationId xmlns:a16="http://schemas.microsoft.com/office/drawing/2014/main" id="{D2C58B67-0AB1-4C0E-9AC7-05C4FEFA7EDA}"/>
+              </a:ext>
+            </a:extLst>
+          </p:cNvPr>
+          <p:cNvSpPr>
+            <a:spLocks noGrp="1"/>
+          </p:cNvSpPr>
+          <p:nvPr>
+            <p:ph type="title"/>
+          </p:nvPr>
+        </p:nvSpPr>
+        <p:spPr/>
+        <p:txBody>
+          <a:bodyPr/>
+          <a:lstStyle/>
+          <a:p>
+            <a:endParaRPr lang="en-US"/>
+          </a:p>
+        </p:txBody>
+      </p:sp>
+    </p:spTree>
+    <p:extLst>
+      <p:ext uri="{BB962C8B-B14F-4D97-AF65-F5344CB8AC3E}">
+        <p14:creationId xmlns:p14="http://schemas.microsoft.com/office/powerpoint/2010/main" val="1226819478"/>
+      </p:ext>
+    </p:extLst>
+  </p:cSld>
+  <p:clrMapOvr>
+    <a:masterClrMapping/>
+  </p:clrMapOvr>
+  <mc:AlternateContent xmlns:mc="http://schemas.openxmlformats.org/markup-compatibility/2006" xmlns:p14="http://schemas.microsoft.com/office/powerpoint/2010/main">
+    <mc:Choice Requires="p14">
+      <p:transition spd="med" p14:dur="700">
+        <p:fade/>
+      </p:transition>
+    </mc:Choice>
+    <mc:Fallback xmlns="">
+      <p:transition spd="med">
+        <p:fade/>
+      </p:transition>
+    </mc:Fallback>
+  </mc:AlternateContent>
+</p:sld>
+</file>
+
+<file path=ppt/slides/slide21.xml><?xml version="1.0" encoding="utf-8"?>
 <p:sld xmlns:a="http://schemas.openxmlformats.org/drawingml/2006/main" xmlns:r="http://schemas.openxmlformats.org/officeDocument/2006/relationships" xmlns:p="http://schemas.openxmlformats.org/presentationml/2006/main">
   <p:cSld>
     <p:spTree>
@@ -10336,7 +10739,7 @@
                 <a:latin typeface="Palatino Linotype" panose="02040502050505030304" pitchFamily="18" charset="0"/>
                 <a:cs typeface="Segoe UI Light" panose="020B0502040204020203" pitchFamily="34" charset="0"/>
               </a:rPr>
-              <a:t>DL / ML Comparison</a:t>
+              <a:t>ML / DL Comparison</a:t>
             </a:r>
           </a:p>
         </p:txBody>
@@ -10355,7 +10758,7 @@
         </p:nvSpPr>
         <p:spPr>
           <a:xfrm>
-            <a:off x="6845092" y="1601708"/>
+            <a:off x="1083388" y="1651708"/>
             <a:ext cx="3673097" cy="646331"/>
           </a:xfrm>
           <a:prstGeom prst="rect">
@@ -10394,7 +10797,7 @@
         </p:nvSpPr>
         <p:spPr>
           <a:xfrm>
-            <a:off x="1084888" y="1601708"/>
+            <a:off x="6845092" y="1632704"/>
             <a:ext cx="3673097" cy="646331"/>
           </a:xfrm>
           <a:prstGeom prst="rect">
@@ -10433,7 +10836,7 @@
         </p:nvSpPr>
         <p:spPr>
           <a:xfrm>
-            <a:off x="1084888" y="2282742"/>
+            <a:off x="6845092" y="2279035"/>
             <a:ext cx="3797084" cy="584775"/>
           </a:xfrm>
           <a:prstGeom prst="rect">
@@ -10479,7 +10882,7 @@
         </p:nvSpPr>
         <p:spPr>
           <a:xfrm>
-            <a:off x="6845092" y="2248039"/>
+            <a:off x="1083388" y="2296168"/>
             <a:ext cx="3797084" cy="584775"/>
           </a:xfrm>
           <a:prstGeom prst="rect">
@@ -10525,7 +10928,7 @@
         </p:nvSpPr>
         <p:spPr>
           <a:xfrm>
-            <a:off x="1084887" y="2929072"/>
+            <a:off x="6852839" y="2927836"/>
             <a:ext cx="4262033" cy="584775"/>
           </a:xfrm>
           <a:prstGeom prst="rect">
@@ -10571,7 +10974,7 @@
         </p:nvSpPr>
         <p:spPr>
           <a:xfrm>
-            <a:off x="6845092" y="2929072"/>
+            <a:off x="1083388" y="2924266"/>
             <a:ext cx="3797084" cy="584775"/>
           </a:xfrm>
           <a:prstGeom prst="rect">
@@ -10617,7 +11020,7 @@
         </p:nvSpPr>
         <p:spPr>
           <a:xfrm>
-            <a:off x="1084887" y="3582692"/>
+            <a:off x="6845092" y="3512300"/>
             <a:ext cx="4262033" cy="584775"/>
           </a:xfrm>
           <a:prstGeom prst="rect">
@@ -10663,7 +11066,7 @@
         </p:nvSpPr>
         <p:spPr>
           <a:xfrm>
-            <a:off x="6845092" y="3579109"/>
+            <a:off x="1084888" y="3523533"/>
             <a:ext cx="4422182" cy="584775"/>
           </a:xfrm>
           <a:prstGeom prst="rect">
@@ -11041,6 +11444,173 @@
       </p:grpSpPr>
       <p:pic>
         <p:nvPicPr>
+          <p:cNvPr id="1026" name="Picture 2" descr="Bridging the reality gap between AI and Industry 4.0 | by Philip Montsho |  Becoming Human: Artificial Intelligence Magazine | Becoming Human:  Artificial Intelligence Magazine">
+            <a:extLst>
+              <a:ext uri="{FF2B5EF4-FFF2-40B4-BE49-F238E27FC236}">
+                <a16:creationId xmlns:a16="http://schemas.microsoft.com/office/drawing/2014/main" id="{1E595646-C140-E0CA-4161-9FF94CC2AC2A}"/>
+              </a:ext>
+            </a:extLst>
+          </p:cNvPr>
+          <p:cNvPicPr>
+            <a:picLocks noChangeAspect="1" noChangeArrowheads="1"/>
+          </p:cNvPicPr>
+          <p:nvPr/>
+        </p:nvPicPr>
+        <p:blipFill>
+          <a:blip r:embed="rId3">
+            <a:extLst>
+              <a:ext uri="{28A0092B-C50C-407E-A947-70E740481C1C}">
+                <a14:useLocalDpi xmlns:a14="http://schemas.microsoft.com/office/drawing/2010/main" val="0"/>
+              </a:ext>
+            </a:extLst>
+          </a:blip>
+          <a:srcRect/>
+          <a:stretch>
+            <a:fillRect/>
+          </a:stretch>
+        </p:blipFill>
+        <p:spPr bwMode="auto">
+          <a:xfrm>
+            <a:off x="924546" y="982317"/>
+            <a:ext cx="10342908" cy="4596848"/>
+          </a:xfrm>
+          <a:prstGeom prst="rect">
+            <a:avLst/>
+          </a:prstGeom>
+          <a:noFill/>
+          <a:extLst>
+            <a:ext uri="{909E8E84-426E-40DD-AFC4-6F175D3DCCD1}">
+              <a14:hiddenFill xmlns:a14="http://schemas.microsoft.com/office/drawing/2010/main">
+                <a:solidFill>
+                  <a:srgbClr val="FFFFFF"/>
+                </a:solidFill>
+              </a14:hiddenFill>
+            </a:ext>
+          </a:extLst>
+        </p:spPr>
+      </p:pic>
+      <p:sp>
+        <p:nvSpPr>
+          <p:cNvPr id="3" name="TextBox 2">
+            <a:extLst>
+              <a:ext uri="{FF2B5EF4-FFF2-40B4-BE49-F238E27FC236}">
+                <a16:creationId xmlns:a16="http://schemas.microsoft.com/office/drawing/2014/main" id="{CAF93B47-B4F3-20B1-6A44-46C92F41CC8B}"/>
+              </a:ext>
+            </a:extLst>
+          </p:cNvPr>
+          <p:cNvSpPr txBox="1"/>
+          <p:nvPr/>
+        </p:nvSpPr>
+        <p:spPr>
+          <a:xfrm>
+            <a:off x="0" y="6550223"/>
+            <a:ext cx="12192000" cy="307777"/>
+          </a:xfrm>
+          <a:prstGeom prst="rect">
+            <a:avLst/>
+          </a:prstGeom>
+          <a:noFill/>
+        </p:spPr>
+        <p:txBody>
+          <a:bodyPr wrap="square" rtlCol="0">
+            <a:spAutoFit/>
+          </a:bodyPr>
+          <a:lstStyle/>
+          <a:p>
+            <a:r>
+              <a:rPr lang="en-US" sz="1400" dirty="0">
+                <a:solidFill>
+                  <a:schemeClr val="bg2">
+                    <a:lumMod val="50000"/>
+                  </a:schemeClr>
+                </a:solidFill>
+                <a:latin typeface="+mj-lt"/>
+                <a:ea typeface="Verdana" panose="020B0604030504040204" pitchFamily="34" charset="0"/>
+              </a:rPr>
+              <a:t>Source: </a:t>
+            </a:r>
+            <a:r>
+              <a:rPr lang="en-US" sz="1400" dirty="0">
+                <a:solidFill>
+                  <a:schemeClr val="bg2">
+                    <a:lumMod val="50000"/>
+                  </a:schemeClr>
+                </a:solidFill>
+              </a:rPr>
+              <a:t>https://becominghuman.ai/a-summary-of-industry-ready-state-of-the-art-computer-vision-techniques-a7f2b893de2f</a:t>
+            </a:r>
+          </a:p>
+        </p:txBody>
+      </p:sp>
+      <p:sp>
+        <p:nvSpPr>
+          <p:cNvPr id="2" name="TextBox 1">
+            <a:extLst>
+              <a:ext uri="{FF2B5EF4-FFF2-40B4-BE49-F238E27FC236}">
+                <a16:creationId xmlns:a16="http://schemas.microsoft.com/office/drawing/2014/main" id="{B42FCFAA-38BB-0612-9738-8019802D5990}"/>
+              </a:ext>
+            </a:extLst>
+          </p:cNvPr>
+          <p:cNvSpPr txBox="1"/>
+          <p:nvPr/>
+        </p:nvSpPr>
+        <p:spPr>
+          <a:xfrm>
+            <a:off x="2000250" y="982317"/>
+            <a:ext cx="8173904" cy="584775"/>
+          </a:xfrm>
+          <a:prstGeom prst="rect">
+            <a:avLst/>
+          </a:prstGeom>
+          <a:solidFill>
+            <a:schemeClr val="bg1"/>
+          </a:solidFill>
+        </p:spPr>
+        <p:txBody>
+          <a:bodyPr wrap="none" rtlCol="0">
+            <a:spAutoFit/>
+          </a:bodyPr>
+          <a:lstStyle/>
+          <a:p>
+            <a:r>
+              <a:rPr lang="en-US" sz="3200" dirty="0"/>
+              <a:t>ILSVRC Competition Classification Error Rate (%)</a:t>
+            </a:r>
+          </a:p>
+        </p:txBody>
+      </p:sp>
+    </p:spTree>
+    <p:extLst>
+      <p:ext uri="{BB962C8B-B14F-4D97-AF65-F5344CB8AC3E}">
+        <p14:creationId xmlns:p14="http://schemas.microsoft.com/office/powerpoint/2010/main" val="418936047"/>
+      </p:ext>
+    </p:extLst>
+  </p:cSld>
+  <p:clrMapOvr>
+    <a:masterClrMapping/>
+  </p:clrMapOvr>
+</p:sld>
+</file>
+
+<file path=ppt/slides/slide7.xml><?xml version="1.0" encoding="utf-8"?>
+<p:sld xmlns:a="http://schemas.openxmlformats.org/drawingml/2006/main" xmlns:r="http://schemas.openxmlformats.org/officeDocument/2006/relationships" xmlns:p="http://schemas.openxmlformats.org/presentationml/2006/main">
+  <p:cSld>
+    <p:spTree>
+      <p:nvGrpSpPr>
+        <p:cNvPr id="1" name=""/>
+        <p:cNvGrpSpPr/>
+        <p:nvPr/>
+      </p:nvGrpSpPr>
+      <p:grpSpPr>
+        <a:xfrm>
+          <a:off x="0" y="0"/>
+          <a:ext cx="0" cy="0"/>
+          <a:chOff x="0" y="0"/>
+          <a:chExt cx="0" cy="0"/>
+        </a:xfrm>
+      </p:grpSpPr>
+      <p:pic>
+        <p:nvPicPr>
           <p:cNvPr id="1026" name="Picture 2" descr="History of AI Winters - History of AI Winters | Actuaries Digital">
             <a:extLst>
               <a:ext uri="{FF2B5EF4-FFF2-40B4-BE49-F238E27FC236}">
@@ -11164,166 +11734,6 @@
     <p:extLst>
       <p:ext uri="{BB962C8B-B14F-4D97-AF65-F5344CB8AC3E}">
         <p14:creationId xmlns:p14="http://schemas.microsoft.com/office/powerpoint/2010/main" val="3151695521"/>
-      </p:ext>
-    </p:extLst>
-  </p:cSld>
-  <p:clrMapOvr>
-    <a:masterClrMapping/>
-  </p:clrMapOvr>
-  <mc:AlternateContent xmlns:mc="http://schemas.openxmlformats.org/markup-compatibility/2006" xmlns:p14="http://schemas.microsoft.com/office/powerpoint/2010/main">
-    <mc:Choice Requires="p14">
-      <p:transition spd="med" p14:dur="700">
-        <p:fade/>
-      </p:transition>
-    </mc:Choice>
-    <mc:Fallback xmlns="">
-      <p:transition spd="med">
-        <p:fade/>
-      </p:transition>
-    </mc:Fallback>
-  </mc:AlternateContent>
-</p:sld>
-</file>
-
-<file path=ppt/slides/slide7.xml><?xml version="1.0" encoding="utf-8"?>
-<p:sld xmlns:a="http://schemas.openxmlformats.org/drawingml/2006/main" xmlns:r="http://schemas.openxmlformats.org/officeDocument/2006/relationships" xmlns:p="http://schemas.openxmlformats.org/presentationml/2006/main">
-  <p:cSld>
-    <p:spTree>
-      <p:nvGrpSpPr>
-        <p:cNvPr id="1" name=""/>
-        <p:cNvGrpSpPr/>
-        <p:nvPr/>
-      </p:nvGrpSpPr>
-      <p:grpSpPr>
-        <a:xfrm>
-          <a:off x="0" y="0"/>
-          <a:ext cx="0" cy="0"/>
-          <a:chOff x="0" y="0"/>
-          <a:chExt cx="0" cy="0"/>
-        </a:xfrm>
-      </p:grpSpPr>
-      <p:sp>
-        <p:nvSpPr>
-          <p:cNvPr id="2" name="Title 1">
-            <a:extLst>
-              <a:ext uri="{FF2B5EF4-FFF2-40B4-BE49-F238E27FC236}">
-                <a16:creationId xmlns:a16="http://schemas.microsoft.com/office/drawing/2014/main" id="{8306FF31-301F-43F0-8202-A782726E446A}"/>
-              </a:ext>
-            </a:extLst>
-          </p:cNvPr>
-          <p:cNvSpPr>
-            <a:spLocks noGrp="1"/>
-          </p:cNvSpPr>
-          <p:nvPr>
-            <p:ph type="title"/>
-          </p:nvPr>
-        </p:nvSpPr>
-        <p:spPr>
-          <a:xfrm>
-            <a:off x="618697" y="365127"/>
-            <a:ext cx="10735103" cy="827416"/>
-          </a:xfrm>
-        </p:spPr>
-        <p:txBody>
-          <a:bodyPr>
-            <a:normAutofit/>
-          </a:bodyPr>
-          <a:lstStyle/>
-          <a:p>
-            <a:pPr algn="ctr"/>
-            <a:endParaRPr lang="en-US" sz="3600" dirty="0">
-              <a:latin typeface="Palatino Linotype" panose="02040502050505030304" pitchFamily="18" charset="0"/>
-              <a:cs typeface="Segoe UI Light" panose="020B0502040204020203" pitchFamily="34" charset="0"/>
-            </a:endParaRPr>
-          </a:p>
-        </p:txBody>
-      </p:sp>
-      <p:sp>
-        <p:nvSpPr>
-          <p:cNvPr id="4" name="Content Placeholder 3">
-            <a:extLst>
-              <a:ext uri="{FF2B5EF4-FFF2-40B4-BE49-F238E27FC236}">
-                <a16:creationId xmlns:a16="http://schemas.microsoft.com/office/drawing/2014/main" id="{4E4AB757-90A1-4A72-AC15-A8FE775EA8EA}"/>
-              </a:ext>
-            </a:extLst>
-          </p:cNvPr>
-          <p:cNvSpPr>
-            <a:spLocks noGrp="1"/>
-          </p:cNvSpPr>
-          <p:nvPr>
-            <p:ph idx="1"/>
-          </p:nvPr>
-        </p:nvSpPr>
-        <p:spPr>
-          <a:xfrm>
-            <a:off x="838200" y="1490346"/>
-            <a:ext cx="10515600" cy="4351338"/>
-          </a:xfrm>
-        </p:spPr>
-        <p:txBody>
-          <a:bodyPr/>
-          <a:lstStyle/>
-          <a:p>
-            <a:pPr marL="0" indent="0">
-              <a:buNone/>
-            </a:pPr>
-            <a:endParaRPr lang="en-US" b="0" i="0" dirty="0">
-              <a:solidFill>
-                <a:srgbClr val="202122"/>
-              </a:solidFill>
-              <a:effectLst/>
-              <a:latin typeface="Palatino Linotype" panose="02040502050505030304" pitchFamily="18" charset="0"/>
-            </a:endParaRPr>
-          </a:p>
-          <a:p>
-            <a:pPr marL="0" indent="0">
-              <a:buNone/>
-            </a:pPr>
-            <a:endParaRPr lang="en-US" dirty="0">
-              <a:solidFill>
-                <a:srgbClr val="202122"/>
-              </a:solidFill>
-              <a:latin typeface="Palatino Linotype" panose="02040502050505030304" pitchFamily="18" charset="0"/>
-            </a:endParaRPr>
-          </a:p>
-          <a:p>
-            <a:pPr marL="0" indent="0">
-              <a:buNone/>
-            </a:pPr>
-            <a:r>
-              <a:rPr lang="en-US" b="0" i="0" dirty="0">
-                <a:solidFill>
-                  <a:srgbClr val="202122"/>
-                </a:solidFill>
-                <a:effectLst/>
-                <a:latin typeface="Palatino Linotype" panose="02040502050505030304" pitchFamily="18" charset="0"/>
-              </a:rPr>
-              <a:t>Artificial Intelligence is the study of “rational agents”: any system that perceives its environment and takes actions that maximize its chance of achieving its goals.</a:t>
-            </a:r>
-          </a:p>
-          <a:p>
-            <a:pPr marL="0" indent="0">
-              <a:buNone/>
-            </a:pPr>
-            <a:r>
-              <a:rPr lang="en-US" dirty="0">
-                <a:solidFill>
-                  <a:srgbClr val="202122"/>
-                </a:solidFill>
-                <a:latin typeface="Palatino Linotype" panose="02040502050505030304" pitchFamily="18" charset="0"/>
-              </a:rPr>
-              <a:t>						-- Russell &amp; Norvig (2003)</a:t>
-            </a:r>
-            <a:endParaRPr lang="en-US" dirty="0">
-              <a:latin typeface="Palatino Linotype" panose="02040502050505030304" pitchFamily="18" charset="0"/>
-            </a:endParaRPr>
-          </a:p>
-        </p:txBody>
-      </p:sp>
-    </p:spTree>
-    <p:extLst>
-      <p:ext uri="{BB962C8B-B14F-4D97-AF65-F5344CB8AC3E}">
-        <p14:creationId xmlns:p14="http://schemas.microsoft.com/office/powerpoint/2010/main" val="2515421536"/>
       </p:ext>
     </p:extLst>
   </p:cSld>
@@ -11427,65 +11837,63 @@
             <a:pPr marL="0" indent="0">
               <a:buNone/>
             </a:pPr>
-            <a:endParaRPr lang="en-US" dirty="0"/>
+            <a:endParaRPr lang="en-US" b="0" i="0" dirty="0">
+              <a:solidFill>
+                <a:srgbClr val="202122"/>
+              </a:solidFill>
+              <a:effectLst/>
+              <a:latin typeface="Palatino Linotype" panose="02040502050505030304" pitchFamily="18" charset="0"/>
+            </a:endParaRPr>
           </a:p>
           <a:p>
             <a:pPr marL="0" indent="0">
               <a:buNone/>
             </a:pPr>
-            <a:r>
-              <a:rPr lang="en-US" sz="2800" dirty="0">
-                <a:latin typeface="Palatino Linotype" panose="02040502050505030304" pitchFamily="18" charset="0"/>
-              </a:rPr>
-              <a:t>Machine learning is the field of study that gives computers the ability to learn without being explicitly programmed.</a:t>
-            </a:r>
+            <a:endParaRPr lang="en-US" dirty="0">
+              <a:solidFill>
+                <a:srgbClr val="202122"/>
+              </a:solidFill>
+              <a:latin typeface="Palatino Linotype" panose="02040502050505030304" pitchFamily="18" charset="0"/>
+            </a:endParaRPr>
           </a:p>
           <a:p>
             <a:pPr marL="0" indent="0">
               <a:buNone/>
             </a:pPr>
             <a:r>
-              <a:rPr lang="en-US" sz="2800" dirty="0">
+              <a:rPr lang="en-US" b="0" i="0" dirty="0">
+                <a:solidFill>
+                  <a:srgbClr val="202122"/>
+                </a:solidFill>
+                <a:effectLst/>
                 <a:latin typeface="Palatino Linotype" panose="02040502050505030304" pitchFamily="18" charset="0"/>
               </a:rPr>
-              <a:t>						-- Arthur Samuel (1959)</a:t>
+              <a:t>Artificial Intelligence is the study of “rational agents”: any system that perceives its environment and takes actions that maximize its chance of achieving its goals.</a:t>
             </a:r>
           </a:p>
           <a:p>
             <a:pPr marL="0" indent="0">
-              <a:buFont typeface="Arial" panose="020B0604020202020204" pitchFamily="34" charset="0"/>
               <a:buNone/>
             </a:pPr>
+            <a:r>
+              <a:rPr lang="en-US" dirty="0">
+                <a:solidFill>
+                  <a:srgbClr val="202122"/>
+                </a:solidFill>
+                <a:latin typeface="Palatino Linotype" panose="02040502050505030304" pitchFamily="18" charset="0"/>
+              </a:rPr>
+              <a:t>						-- Russell &amp; Norvig (2003)</a:t>
+            </a:r>
             <a:endParaRPr lang="en-US" dirty="0">
               <a:latin typeface="Palatino Linotype" panose="02040502050505030304" pitchFamily="18" charset="0"/>
             </a:endParaRPr>
           </a:p>
-          <a:p>
-            <a:pPr marL="0" indent="0">
-              <a:buFont typeface="Arial" panose="020B0604020202020204" pitchFamily="34" charset="0"/>
-              <a:buNone/>
-            </a:pPr>
-            <a:r>
-              <a:rPr lang="en-US" dirty="0">
-                <a:latin typeface="Palatino Linotype" panose="02040502050505030304" pitchFamily="18" charset="0"/>
-              </a:rPr>
-              <a:t>Machine learning is the science and art of programming computers so they can learn from data.</a:t>
-            </a:r>
-          </a:p>
-          <a:p>
-            <a:pPr marL="0" indent="0" algn="ctr">
-              <a:buNone/>
-            </a:pPr>
-            <a:endParaRPr lang="en-US" dirty="0">
-              <a:latin typeface="+mj-lt"/>
-            </a:endParaRPr>
-          </a:p>
         </p:txBody>
       </p:sp>
     </p:spTree>
     <p:extLst>
       <p:ext uri="{BB962C8B-B14F-4D97-AF65-F5344CB8AC3E}">
-        <p14:creationId xmlns:p14="http://schemas.microsoft.com/office/powerpoint/2010/main" val="1876161777"/>
+        <p14:creationId xmlns:p14="http://schemas.microsoft.com/office/powerpoint/2010/main" val="2515421536"/>
       </p:ext>
     </p:extLst>
   </p:cSld>
@@ -11553,145 +11961,93 @@
           <a:lstStyle/>
           <a:p>
             <a:pPr algn="ctr"/>
-            <a:r>
-              <a:rPr lang="en-US" sz="3600" dirty="0">
-                <a:latin typeface="Palatino Linotype" panose="02040502050505030304" pitchFamily="18" charset="0"/>
-                <a:cs typeface="Segoe UI Light" panose="020B0502040204020203" pitchFamily="34" charset="0"/>
-              </a:rPr>
-              <a:t>Deep Learning</a:t>
-            </a:r>
-          </a:p>
-        </p:txBody>
-      </p:sp>
-      <p:pic>
-        <p:nvPicPr>
-          <p:cNvPr id="1026" name="Picture 2" descr="Rainbow Layer Cake Recipe - BettyCrocker.com">
+            <a:endParaRPr lang="en-US" sz="3600" dirty="0">
+              <a:latin typeface="Palatino Linotype" panose="02040502050505030304" pitchFamily="18" charset="0"/>
+              <a:cs typeface="Segoe UI Light" panose="020B0502040204020203" pitchFamily="34" charset="0"/>
+            </a:endParaRPr>
+          </a:p>
+        </p:txBody>
+      </p:sp>
+      <p:sp>
+        <p:nvSpPr>
+          <p:cNvPr id="4" name="Content Placeholder 3">
             <a:extLst>
               <a:ext uri="{FF2B5EF4-FFF2-40B4-BE49-F238E27FC236}">
-                <a16:creationId xmlns:a16="http://schemas.microsoft.com/office/drawing/2014/main" id="{6B01A55C-3E3D-4A68-8148-EBA141EEF8DA}"/>
+                <a16:creationId xmlns:a16="http://schemas.microsoft.com/office/drawing/2014/main" id="{4E4AB757-90A1-4A72-AC15-A8FE775EA8EA}"/>
               </a:ext>
             </a:extLst>
           </p:cNvPr>
-          <p:cNvPicPr>
-            <a:picLocks noChangeAspect="1" noChangeArrowheads="1"/>
-          </p:cNvPicPr>
-          <p:nvPr/>
-        </p:nvPicPr>
-        <p:blipFill>
-          <a:blip r:embed="rId3">
-            <a:extLst>
-              <a:ext uri="{28A0092B-C50C-407E-A947-70E740481C1C}">
-                <a14:useLocalDpi xmlns:a14="http://schemas.microsoft.com/office/drawing/2010/main" val="0"/>
-              </a:ext>
-            </a:extLst>
-          </a:blip>
-          <a:srcRect/>
-          <a:stretch>
-            <a:fillRect/>
-          </a:stretch>
-        </p:blipFill>
-        <p:spPr bwMode="auto">
-          <a:xfrm>
-            <a:off x="3542880" y="2054605"/>
-            <a:ext cx="4886736" cy="2748789"/>
-          </a:xfrm>
-          <a:prstGeom prst="rect">
-            <a:avLst/>
-          </a:prstGeom>
-          <a:noFill/>
-          <a:ln w="6350">
-            <a:solidFill>
-              <a:schemeClr val="tx1">
-                <a:lumMod val="65000"/>
-                <a:lumOff val="35000"/>
-              </a:schemeClr>
-            </a:solidFill>
-          </a:ln>
-          <a:effectLst>
-            <a:outerShdw blurRad="50800" dist="38100" dir="2700000" algn="tl" rotWithShape="0">
-              <a:prstClr val="black">
-                <a:alpha val="40000"/>
-              </a:prstClr>
-            </a:outerShdw>
-          </a:effectLst>
-          <a:extLst>
-            <a:ext uri="{909E8E84-426E-40DD-AFC4-6F175D3DCCD1}">
-              <a14:hiddenFill xmlns:a14="http://schemas.microsoft.com/office/drawing/2010/main">
-                <a:solidFill>
-                  <a:srgbClr val="FFFFFF"/>
-                </a:solidFill>
-              </a14:hiddenFill>
-            </a:ext>
-          </a:extLst>
-        </p:spPr>
-      </p:pic>
-      <p:sp>
-        <p:nvSpPr>
-          <p:cNvPr id="4" name="TextBox 3">
-            <a:extLst>
-              <a:ext uri="{FF2B5EF4-FFF2-40B4-BE49-F238E27FC236}">
-                <a16:creationId xmlns:a16="http://schemas.microsoft.com/office/drawing/2014/main" id="{0B25E44E-8C42-4246-94DF-CC612E8605BA}"/>
-              </a:ext>
-            </a:extLst>
-          </p:cNvPr>
-          <p:cNvSpPr txBox="1"/>
-          <p:nvPr/>
+          <p:cNvSpPr>
+            <a:spLocks noGrp="1"/>
+          </p:cNvSpPr>
+          <p:nvPr>
+            <p:ph idx="1"/>
+          </p:nvPr>
         </p:nvSpPr>
         <p:spPr>
           <a:xfrm>
-            <a:off x="0" y="6550223"/>
-            <a:ext cx="12192000" cy="307777"/>
+            <a:off x="838200" y="1490346"/>
+            <a:ext cx="10515600" cy="4351338"/>
           </a:xfrm>
-          <a:prstGeom prst="rect">
-            <a:avLst/>
-          </a:prstGeom>
-          <a:noFill/>
         </p:spPr>
         <p:txBody>
-          <a:bodyPr wrap="square" rtlCol="0">
-            <a:spAutoFit/>
-          </a:bodyPr>
-          <a:lstStyle/>
-          <a:p>
-            <a:r>
-              <a:rPr lang="en-US" sz="1400" dirty="0">
-                <a:solidFill>
-                  <a:schemeClr val="tx1">
-                    <a:lumMod val="65000"/>
-                    <a:lumOff val="35000"/>
-                  </a:schemeClr>
-                </a:solidFill>
-                <a:latin typeface="+mj-lt"/>
-                <a:ea typeface="Verdana" panose="020B0604030504040204" pitchFamily="34" charset="0"/>
+          <a:bodyPr/>
+          <a:lstStyle/>
+          <a:p>
+            <a:pPr marL="0" indent="0">
+              <a:buNone/>
+            </a:pPr>
+            <a:endParaRPr lang="en-US" dirty="0"/>
+          </a:p>
+          <a:p>
+            <a:pPr marL="0" indent="0">
+              <a:buNone/>
+            </a:pPr>
+            <a:r>
+              <a:rPr lang="en-US" sz="2800" dirty="0">
+                <a:latin typeface="Palatino Linotype" panose="02040502050505030304" pitchFamily="18" charset="0"/>
               </a:rPr>
-              <a:t>Image Credit: </a:t>
-            </a:r>
-            <a:r>
-              <a:rPr lang="en-US" sz="1400" b="0" i="0" u="none" strike="noStrike" kern="1200" cap="none" dirty="0">
-                <a:ln>
-                  <a:noFill/>
-                </a:ln>
-                <a:solidFill>
-                  <a:schemeClr val="tx1">
-                    <a:lumMod val="65000"/>
-                    <a:lumOff val="35000"/>
-                  </a:schemeClr>
-                </a:solidFill>
-                <a:latin typeface="+mj-lt"/>
-                <a:ea typeface="Arial" pitchFamily="34"/>
-                <a:cs typeface="Arial" pitchFamily="34"/>
+              <a:t>Machine learning is the field of study that gives computers the ability to learn without being explicitly programmed.</a:t>
+            </a:r>
+          </a:p>
+          <a:p>
+            <a:pPr marL="0" indent="0">
+              <a:buNone/>
+            </a:pPr>
+            <a:r>
+              <a:rPr lang="en-US" sz="2800" dirty="0">
+                <a:latin typeface="Palatino Linotype" panose="02040502050505030304" pitchFamily="18" charset="0"/>
               </a:rPr>
-              <a:t>https://www.bettycrocker.com/recipes/rainbow-layer-cake/4969fed8-141e-45f5-9a04-e03addd20fbb</a:t>
-            </a:r>
-            <a:endParaRPr lang="en-US" sz="1400" dirty="0">
-              <a:solidFill>
-                <a:schemeClr val="tx1">
-                  <a:lumMod val="65000"/>
-                  <a:lumOff val="35000"/>
-                </a:schemeClr>
-              </a:solidFill>
+              <a:t>						-- Arthur Samuel (1959)</a:t>
+            </a:r>
+          </a:p>
+          <a:p>
+            <a:pPr marL="0" indent="0">
+              <a:buFont typeface="Arial" panose="020B0604020202020204" pitchFamily="34" charset="0"/>
+              <a:buNone/>
+            </a:pPr>
+            <a:endParaRPr lang="en-US" dirty="0">
+              <a:latin typeface="Palatino Linotype" panose="02040502050505030304" pitchFamily="18" charset="0"/>
+            </a:endParaRPr>
+          </a:p>
+          <a:p>
+            <a:pPr marL="0" indent="0">
+              <a:buFont typeface="Arial" panose="020B0604020202020204" pitchFamily="34" charset="0"/>
+              <a:buNone/>
+            </a:pPr>
+            <a:r>
+              <a:rPr lang="en-US" dirty="0">
+                <a:latin typeface="Palatino Linotype" panose="02040502050505030304" pitchFamily="18" charset="0"/>
+              </a:rPr>
+              <a:t>Machine learning is the science and art of programming computers so they can learn from data.</a:t>
+            </a:r>
+          </a:p>
+          <a:p>
+            <a:pPr marL="0" indent="0" algn="ctr">
+              <a:buNone/>
+            </a:pPr>
+            <a:endParaRPr lang="en-US" dirty="0">
               <a:latin typeface="+mj-lt"/>
-              <a:ea typeface="Verdana" panose="020B0604030504040204" pitchFamily="34" charset="0"/>
             </a:endParaRPr>
           </a:p>
         </p:txBody>
@@ -11699,7 +12055,7 @@
     </p:spTree>
     <p:extLst>
       <p:ext uri="{BB962C8B-B14F-4D97-AF65-F5344CB8AC3E}">
-        <p14:creationId xmlns:p14="http://schemas.microsoft.com/office/powerpoint/2010/main" val="888845023"/>
+        <p14:creationId xmlns:p14="http://schemas.microsoft.com/office/powerpoint/2010/main" val="1876161777"/>
       </p:ext>
     </p:extLst>
   </p:cSld>

</xml_diff>